<commit_message>
Added nested loops and unroll loop
</commit_message>
<xml_diff>
--- a/2024-2025/slides_pptx/3_loops.pptx
+++ b/2024-2025/slides_pptx/3_loops.pptx
@@ -5,22 +5,28 @@
     <p:sldMasterId id="2147483660" r:id="rId1"/>
   </p:sldMasterIdLst>
   <p:notesMasterIdLst>
-    <p:notesMasterId r:id="rId15"/>
+    <p:notesMasterId r:id="rId21"/>
   </p:notesMasterIdLst>
   <p:sldIdLst>
     <p:sldId id="256" r:id="rId2"/>
     <p:sldId id="274" r:id="rId3"/>
     <p:sldId id="268" r:id="rId4"/>
     <p:sldId id="275" r:id="rId5"/>
-    <p:sldId id="291" r:id="rId6"/>
-    <p:sldId id="267" r:id="rId7"/>
-    <p:sldId id="276" r:id="rId8"/>
-    <p:sldId id="289" r:id="rId9"/>
-    <p:sldId id="284" r:id="rId10"/>
-    <p:sldId id="283" r:id="rId11"/>
-    <p:sldId id="273" r:id="rId12"/>
-    <p:sldId id="278" r:id="rId13"/>
-    <p:sldId id="290" r:id="rId14"/>
+    <p:sldId id="267" r:id="rId6"/>
+    <p:sldId id="276" r:id="rId7"/>
+    <p:sldId id="289" r:id="rId8"/>
+    <p:sldId id="284" r:id="rId9"/>
+    <p:sldId id="283" r:id="rId10"/>
+    <p:sldId id="273" r:id="rId11"/>
+    <p:sldId id="278" r:id="rId12"/>
+    <p:sldId id="285" r:id="rId13"/>
+    <p:sldId id="287" r:id="rId14"/>
+    <p:sldId id="288" r:id="rId15"/>
+    <p:sldId id="279" r:id="rId16"/>
+    <p:sldId id="293" r:id="rId17"/>
+    <p:sldId id="282" r:id="rId18"/>
+    <p:sldId id="292" r:id="rId19"/>
+    <p:sldId id="290" r:id="rId20"/>
   </p:sldIdLst>
   <p:sldSz cx="12192000" cy="6858000"/>
   <p:notesSz cx="6858000" cy="9144000"/>
@@ -221,7 +227,7 @@
           <a:p>
             <a:fld id="{85EF5437-F444-4613-A039-4AD69D91C86A}" type="datetimeFigureOut">
               <a:rPr lang="ru-RU" smtClean="0"/>
-              <a:t>22.09.2024</a:t>
+              <a:t>29.09.2024</a:t>
             </a:fld>
             <a:endParaRPr lang="ru-RU"/>
           </a:p>
@@ -646,7 +652,7 @@
     </p:spTree>
     <p:extLst>
       <p:ext uri="{BB962C8B-B14F-4D97-AF65-F5344CB8AC3E}">
-        <p14:creationId xmlns:p14="http://schemas.microsoft.com/office/powerpoint/2010/main" val="2916898948"/>
+        <p14:creationId xmlns:p14="http://schemas.microsoft.com/office/powerpoint/2010/main" val="3947972158"/>
       </p:ext>
     </p:extLst>
   </p:cSld>
@@ -730,7 +736,7 @@
     </p:spTree>
     <p:extLst>
       <p:ext uri="{BB962C8B-B14F-4D97-AF65-F5344CB8AC3E}">
-        <p14:creationId xmlns:p14="http://schemas.microsoft.com/office/powerpoint/2010/main" val="3947972158"/>
+        <p14:creationId xmlns:p14="http://schemas.microsoft.com/office/powerpoint/2010/main" val="403083052"/>
       </p:ext>
     </p:extLst>
   </p:cSld>
@@ -814,7 +820,7 @@
     </p:spTree>
     <p:extLst>
       <p:ext uri="{BB962C8B-B14F-4D97-AF65-F5344CB8AC3E}">
-        <p14:creationId xmlns:p14="http://schemas.microsoft.com/office/powerpoint/2010/main" val="403083052"/>
+        <p14:creationId xmlns:p14="http://schemas.microsoft.com/office/powerpoint/2010/main" val="1088169880"/>
       </p:ext>
     </p:extLst>
   </p:cSld>
@@ -890,6 +896,510 @@
             <a:fld id="{207EAB29-8E86-49C7-96F5-7C9D72076108}" type="slidenum">
               <a:rPr lang="ru-RU" smtClean="0"/>
               <a:t>13</a:t>
+            </a:fld>
+            <a:endParaRPr lang="ru-RU"/>
+          </a:p>
+        </p:txBody>
+      </p:sp>
+    </p:spTree>
+    <p:extLst>
+      <p:ext uri="{BB962C8B-B14F-4D97-AF65-F5344CB8AC3E}">
+        <p14:creationId xmlns:p14="http://schemas.microsoft.com/office/powerpoint/2010/main" val="105173870"/>
+      </p:ext>
+    </p:extLst>
+  </p:cSld>
+  <p:clrMapOvr>
+    <a:masterClrMapping/>
+  </p:clrMapOvr>
+</p:notes>
+</file>
+
+<file path=ppt/notesSlides/notesSlide14.xml><?xml version="1.0" encoding="utf-8"?>
+<p:notes xmlns:a="http://schemas.openxmlformats.org/drawingml/2006/main" xmlns:r="http://schemas.openxmlformats.org/officeDocument/2006/relationships" xmlns:p="http://schemas.openxmlformats.org/presentationml/2006/main">
+  <p:cSld>
+    <p:spTree>
+      <p:nvGrpSpPr>
+        <p:cNvPr id="1" name=""/>
+        <p:cNvGrpSpPr/>
+        <p:nvPr/>
+      </p:nvGrpSpPr>
+      <p:grpSpPr>
+        <a:xfrm>
+          <a:off x="0" y="0"/>
+          <a:ext cx="0" cy="0"/>
+          <a:chOff x="0" y="0"/>
+          <a:chExt cx="0" cy="0"/>
+        </a:xfrm>
+      </p:grpSpPr>
+      <p:sp>
+        <p:nvSpPr>
+          <p:cNvPr id="2" name="Образ слайда 1"/>
+          <p:cNvSpPr>
+            <a:spLocks noGrp="1" noRot="1" noChangeAspect="1"/>
+          </p:cNvSpPr>
+          <p:nvPr>
+            <p:ph type="sldImg"/>
+          </p:nvPr>
+        </p:nvSpPr>
+        <p:spPr/>
+      </p:sp>
+      <p:sp>
+        <p:nvSpPr>
+          <p:cNvPr id="3" name="Заметки 2"/>
+          <p:cNvSpPr>
+            <a:spLocks noGrp="1"/>
+          </p:cNvSpPr>
+          <p:nvPr>
+            <p:ph type="body" idx="1"/>
+          </p:nvPr>
+        </p:nvSpPr>
+        <p:spPr/>
+        <p:txBody>
+          <a:bodyPr/>
+          <a:lstStyle/>
+          <a:p>
+            <a:endParaRPr lang="ru-RU" dirty="0"/>
+          </a:p>
+        </p:txBody>
+      </p:sp>
+      <p:sp>
+        <p:nvSpPr>
+          <p:cNvPr id="4" name="Номер слайда 3"/>
+          <p:cNvSpPr>
+            <a:spLocks noGrp="1"/>
+          </p:cNvSpPr>
+          <p:nvPr>
+            <p:ph type="sldNum" sz="quarter" idx="10"/>
+          </p:nvPr>
+        </p:nvSpPr>
+        <p:spPr/>
+        <p:txBody>
+          <a:bodyPr/>
+          <a:lstStyle/>
+          <a:p>
+            <a:fld id="{207EAB29-8E86-49C7-96F5-7C9D72076108}" type="slidenum">
+              <a:rPr lang="ru-RU" smtClean="0"/>
+              <a:t>14</a:t>
+            </a:fld>
+            <a:endParaRPr lang="ru-RU"/>
+          </a:p>
+        </p:txBody>
+      </p:sp>
+    </p:spTree>
+    <p:extLst>
+      <p:ext uri="{BB962C8B-B14F-4D97-AF65-F5344CB8AC3E}">
+        <p14:creationId xmlns:p14="http://schemas.microsoft.com/office/powerpoint/2010/main" val="1037507869"/>
+      </p:ext>
+    </p:extLst>
+  </p:cSld>
+  <p:clrMapOvr>
+    <a:masterClrMapping/>
+  </p:clrMapOvr>
+</p:notes>
+</file>
+
+<file path=ppt/notesSlides/notesSlide15.xml><?xml version="1.0" encoding="utf-8"?>
+<p:notes xmlns:a="http://schemas.openxmlformats.org/drawingml/2006/main" xmlns:r="http://schemas.openxmlformats.org/officeDocument/2006/relationships" xmlns:p="http://schemas.openxmlformats.org/presentationml/2006/main">
+  <p:cSld>
+    <p:spTree>
+      <p:nvGrpSpPr>
+        <p:cNvPr id="1" name=""/>
+        <p:cNvGrpSpPr/>
+        <p:nvPr/>
+      </p:nvGrpSpPr>
+      <p:grpSpPr>
+        <a:xfrm>
+          <a:off x="0" y="0"/>
+          <a:ext cx="0" cy="0"/>
+          <a:chOff x="0" y="0"/>
+          <a:chExt cx="0" cy="0"/>
+        </a:xfrm>
+      </p:grpSpPr>
+      <p:sp>
+        <p:nvSpPr>
+          <p:cNvPr id="2" name="Образ слайда 1"/>
+          <p:cNvSpPr>
+            <a:spLocks noGrp="1" noRot="1" noChangeAspect="1"/>
+          </p:cNvSpPr>
+          <p:nvPr>
+            <p:ph type="sldImg"/>
+          </p:nvPr>
+        </p:nvSpPr>
+        <p:spPr/>
+      </p:sp>
+      <p:sp>
+        <p:nvSpPr>
+          <p:cNvPr id="3" name="Заметки 2"/>
+          <p:cNvSpPr>
+            <a:spLocks noGrp="1"/>
+          </p:cNvSpPr>
+          <p:nvPr>
+            <p:ph type="body" idx="1"/>
+          </p:nvPr>
+        </p:nvSpPr>
+        <p:spPr/>
+        <p:txBody>
+          <a:bodyPr/>
+          <a:lstStyle/>
+          <a:p>
+            <a:endParaRPr lang="ru-RU" dirty="0"/>
+          </a:p>
+        </p:txBody>
+      </p:sp>
+      <p:sp>
+        <p:nvSpPr>
+          <p:cNvPr id="4" name="Номер слайда 3"/>
+          <p:cNvSpPr>
+            <a:spLocks noGrp="1"/>
+          </p:cNvSpPr>
+          <p:nvPr>
+            <p:ph type="sldNum" sz="quarter" idx="10"/>
+          </p:nvPr>
+        </p:nvSpPr>
+        <p:spPr/>
+        <p:txBody>
+          <a:bodyPr/>
+          <a:lstStyle/>
+          <a:p>
+            <a:fld id="{207EAB29-8E86-49C7-96F5-7C9D72076108}" type="slidenum">
+              <a:rPr lang="ru-RU" smtClean="0"/>
+              <a:t>15</a:t>
+            </a:fld>
+            <a:endParaRPr lang="ru-RU"/>
+          </a:p>
+        </p:txBody>
+      </p:sp>
+    </p:spTree>
+    <p:extLst>
+      <p:ext uri="{BB962C8B-B14F-4D97-AF65-F5344CB8AC3E}">
+        <p14:creationId xmlns:p14="http://schemas.microsoft.com/office/powerpoint/2010/main" val="1307866541"/>
+      </p:ext>
+    </p:extLst>
+  </p:cSld>
+  <p:clrMapOvr>
+    <a:masterClrMapping/>
+  </p:clrMapOvr>
+</p:notes>
+</file>
+
+<file path=ppt/notesSlides/notesSlide16.xml><?xml version="1.0" encoding="utf-8"?>
+<p:notes xmlns:a="http://schemas.openxmlformats.org/drawingml/2006/main" xmlns:r="http://schemas.openxmlformats.org/officeDocument/2006/relationships" xmlns:p="http://schemas.openxmlformats.org/presentationml/2006/main">
+  <p:cSld>
+    <p:spTree>
+      <p:nvGrpSpPr>
+        <p:cNvPr id="1" name=""/>
+        <p:cNvGrpSpPr/>
+        <p:nvPr/>
+      </p:nvGrpSpPr>
+      <p:grpSpPr>
+        <a:xfrm>
+          <a:off x="0" y="0"/>
+          <a:ext cx="0" cy="0"/>
+          <a:chOff x="0" y="0"/>
+          <a:chExt cx="0" cy="0"/>
+        </a:xfrm>
+      </p:grpSpPr>
+      <p:sp>
+        <p:nvSpPr>
+          <p:cNvPr id="2" name="Образ слайда 1"/>
+          <p:cNvSpPr>
+            <a:spLocks noGrp="1" noRot="1" noChangeAspect="1"/>
+          </p:cNvSpPr>
+          <p:nvPr>
+            <p:ph type="sldImg"/>
+          </p:nvPr>
+        </p:nvSpPr>
+        <p:spPr/>
+      </p:sp>
+      <p:sp>
+        <p:nvSpPr>
+          <p:cNvPr id="3" name="Заметки 2"/>
+          <p:cNvSpPr>
+            <a:spLocks noGrp="1"/>
+          </p:cNvSpPr>
+          <p:nvPr>
+            <p:ph type="body" idx="1"/>
+          </p:nvPr>
+        </p:nvSpPr>
+        <p:spPr/>
+        <p:txBody>
+          <a:bodyPr/>
+          <a:lstStyle/>
+          <a:p>
+            <a:endParaRPr lang="ru-RU" dirty="0"/>
+          </a:p>
+        </p:txBody>
+      </p:sp>
+      <p:sp>
+        <p:nvSpPr>
+          <p:cNvPr id="4" name="Номер слайда 3"/>
+          <p:cNvSpPr>
+            <a:spLocks noGrp="1"/>
+          </p:cNvSpPr>
+          <p:nvPr>
+            <p:ph type="sldNum" sz="quarter" idx="10"/>
+          </p:nvPr>
+        </p:nvSpPr>
+        <p:spPr/>
+        <p:txBody>
+          <a:bodyPr/>
+          <a:lstStyle/>
+          <a:p>
+            <a:fld id="{207EAB29-8E86-49C7-96F5-7C9D72076108}" type="slidenum">
+              <a:rPr lang="ru-RU" smtClean="0"/>
+              <a:t>16</a:t>
+            </a:fld>
+            <a:endParaRPr lang="ru-RU"/>
+          </a:p>
+        </p:txBody>
+      </p:sp>
+    </p:spTree>
+    <p:extLst>
+      <p:ext uri="{BB962C8B-B14F-4D97-AF65-F5344CB8AC3E}">
+        <p14:creationId xmlns:p14="http://schemas.microsoft.com/office/powerpoint/2010/main" val="3146961948"/>
+      </p:ext>
+    </p:extLst>
+  </p:cSld>
+  <p:clrMapOvr>
+    <a:masterClrMapping/>
+  </p:clrMapOvr>
+</p:notes>
+</file>
+
+<file path=ppt/notesSlides/notesSlide17.xml><?xml version="1.0" encoding="utf-8"?>
+<p:notes xmlns:a="http://schemas.openxmlformats.org/drawingml/2006/main" xmlns:r="http://schemas.openxmlformats.org/officeDocument/2006/relationships" xmlns:p="http://schemas.openxmlformats.org/presentationml/2006/main">
+  <p:cSld>
+    <p:spTree>
+      <p:nvGrpSpPr>
+        <p:cNvPr id="1" name=""/>
+        <p:cNvGrpSpPr/>
+        <p:nvPr/>
+      </p:nvGrpSpPr>
+      <p:grpSpPr>
+        <a:xfrm>
+          <a:off x="0" y="0"/>
+          <a:ext cx="0" cy="0"/>
+          <a:chOff x="0" y="0"/>
+          <a:chExt cx="0" cy="0"/>
+        </a:xfrm>
+      </p:grpSpPr>
+      <p:sp>
+        <p:nvSpPr>
+          <p:cNvPr id="2" name="Образ слайда 1"/>
+          <p:cNvSpPr>
+            <a:spLocks noGrp="1" noRot="1" noChangeAspect="1"/>
+          </p:cNvSpPr>
+          <p:nvPr>
+            <p:ph type="sldImg"/>
+          </p:nvPr>
+        </p:nvSpPr>
+        <p:spPr/>
+      </p:sp>
+      <p:sp>
+        <p:nvSpPr>
+          <p:cNvPr id="3" name="Заметки 2"/>
+          <p:cNvSpPr>
+            <a:spLocks noGrp="1"/>
+          </p:cNvSpPr>
+          <p:nvPr>
+            <p:ph type="body" idx="1"/>
+          </p:nvPr>
+        </p:nvSpPr>
+        <p:spPr/>
+        <p:txBody>
+          <a:bodyPr/>
+          <a:lstStyle/>
+          <a:p>
+            <a:endParaRPr lang="ru-RU" dirty="0"/>
+          </a:p>
+        </p:txBody>
+      </p:sp>
+      <p:sp>
+        <p:nvSpPr>
+          <p:cNvPr id="4" name="Номер слайда 3"/>
+          <p:cNvSpPr>
+            <a:spLocks noGrp="1"/>
+          </p:cNvSpPr>
+          <p:nvPr>
+            <p:ph type="sldNum" sz="quarter" idx="10"/>
+          </p:nvPr>
+        </p:nvSpPr>
+        <p:spPr/>
+        <p:txBody>
+          <a:bodyPr/>
+          <a:lstStyle/>
+          <a:p>
+            <a:fld id="{207EAB29-8E86-49C7-96F5-7C9D72076108}" type="slidenum">
+              <a:rPr lang="ru-RU" smtClean="0"/>
+              <a:t>17</a:t>
+            </a:fld>
+            <a:endParaRPr lang="ru-RU"/>
+          </a:p>
+        </p:txBody>
+      </p:sp>
+    </p:spTree>
+    <p:extLst>
+      <p:ext uri="{BB962C8B-B14F-4D97-AF65-F5344CB8AC3E}">
+        <p14:creationId xmlns:p14="http://schemas.microsoft.com/office/powerpoint/2010/main" val="3211514024"/>
+      </p:ext>
+    </p:extLst>
+  </p:cSld>
+  <p:clrMapOvr>
+    <a:masterClrMapping/>
+  </p:clrMapOvr>
+</p:notes>
+</file>
+
+<file path=ppt/notesSlides/notesSlide18.xml><?xml version="1.0" encoding="utf-8"?>
+<p:notes xmlns:a="http://schemas.openxmlformats.org/drawingml/2006/main" xmlns:r="http://schemas.openxmlformats.org/officeDocument/2006/relationships" xmlns:p="http://schemas.openxmlformats.org/presentationml/2006/main">
+  <p:cSld>
+    <p:spTree>
+      <p:nvGrpSpPr>
+        <p:cNvPr id="1" name=""/>
+        <p:cNvGrpSpPr/>
+        <p:nvPr/>
+      </p:nvGrpSpPr>
+      <p:grpSpPr>
+        <a:xfrm>
+          <a:off x="0" y="0"/>
+          <a:ext cx="0" cy="0"/>
+          <a:chOff x="0" y="0"/>
+          <a:chExt cx="0" cy="0"/>
+        </a:xfrm>
+      </p:grpSpPr>
+      <p:sp>
+        <p:nvSpPr>
+          <p:cNvPr id="2" name="Образ слайда 1"/>
+          <p:cNvSpPr>
+            <a:spLocks noGrp="1" noRot="1" noChangeAspect="1"/>
+          </p:cNvSpPr>
+          <p:nvPr>
+            <p:ph type="sldImg"/>
+          </p:nvPr>
+        </p:nvSpPr>
+        <p:spPr/>
+      </p:sp>
+      <p:sp>
+        <p:nvSpPr>
+          <p:cNvPr id="3" name="Заметки 2"/>
+          <p:cNvSpPr>
+            <a:spLocks noGrp="1"/>
+          </p:cNvSpPr>
+          <p:nvPr>
+            <p:ph type="body" idx="1"/>
+          </p:nvPr>
+        </p:nvSpPr>
+        <p:spPr/>
+        <p:txBody>
+          <a:bodyPr/>
+          <a:lstStyle/>
+          <a:p>
+            <a:endParaRPr lang="ru-RU" dirty="0"/>
+          </a:p>
+        </p:txBody>
+      </p:sp>
+      <p:sp>
+        <p:nvSpPr>
+          <p:cNvPr id="4" name="Номер слайда 3"/>
+          <p:cNvSpPr>
+            <a:spLocks noGrp="1"/>
+          </p:cNvSpPr>
+          <p:nvPr>
+            <p:ph type="sldNum" sz="quarter" idx="10"/>
+          </p:nvPr>
+        </p:nvSpPr>
+        <p:spPr/>
+        <p:txBody>
+          <a:bodyPr/>
+          <a:lstStyle/>
+          <a:p>
+            <a:fld id="{207EAB29-8E86-49C7-96F5-7C9D72076108}" type="slidenum">
+              <a:rPr lang="ru-RU" smtClean="0"/>
+              <a:t>18</a:t>
+            </a:fld>
+            <a:endParaRPr lang="ru-RU"/>
+          </a:p>
+        </p:txBody>
+      </p:sp>
+    </p:spTree>
+    <p:extLst>
+      <p:ext uri="{BB962C8B-B14F-4D97-AF65-F5344CB8AC3E}">
+        <p14:creationId xmlns:p14="http://schemas.microsoft.com/office/powerpoint/2010/main" val="2579588745"/>
+      </p:ext>
+    </p:extLst>
+  </p:cSld>
+  <p:clrMapOvr>
+    <a:masterClrMapping/>
+  </p:clrMapOvr>
+</p:notes>
+</file>
+
+<file path=ppt/notesSlides/notesSlide19.xml><?xml version="1.0" encoding="utf-8"?>
+<p:notes xmlns:a="http://schemas.openxmlformats.org/drawingml/2006/main" xmlns:r="http://schemas.openxmlformats.org/officeDocument/2006/relationships" xmlns:p="http://schemas.openxmlformats.org/presentationml/2006/main">
+  <p:cSld>
+    <p:spTree>
+      <p:nvGrpSpPr>
+        <p:cNvPr id="1" name=""/>
+        <p:cNvGrpSpPr/>
+        <p:nvPr/>
+      </p:nvGrpSpPr>
+      <p:grpSpPr>
+        <a:xfrm>
+          <a:off x="0" y="0"/>
+          <a:ext cx="0" cy="0"/>
+          <a:chOff x="0" y="0"/>
+          <a:chExt cx="0" cy="0"/>
+        </a:xfrm>
+      </p:grpSpPr>
+      <p:sp>
+        <p:nvSpPr>
+          <p:cNvPr id="2" name="Образ слайда 1"/>
+          <p:cNvSpPr>
+            <a:spLocks noGrp="1" noRot="1" noChangeAspect="1"/>
+          </p:cNvSpPr>
+          <p:nvPr>
+            <p:ph type="sldImg"/>
+          </p:nvPr>
+        </p:nvSpPr>
+        <p:spPr/>
+      </p:sp>
+      <p:sp>
+        <p:nvSpPr>
+          <p:cNvPr id="3" name="Заметки 2"/>
+          <p:cNvSpPr>
+            <a:spLocks noGrp="1"/>
+          </p:cNvSpPr>
+          <p:nvPr>
+            <p:ph type="body" idx="1"/>
+          </p:nvPr>
+        </p:nvSpPr>
+        <p:spPr/>
+        <p:txBody>
+          <a:bodyPr/>
+          <a:lstStyle/>
+          <a:p>
+            <a:endParaRPr lang="ru-RU" dirty="0"/>
+          </a:p>
+        </p:txBody>
+      </p:sp>
+      <p:sp>
+        <p:nvSpPr>
+          <p:cNvPr id="4" name="Номер слайда 3"/>
+          <p:cNvSpPr>
+            <a:spLocks noGrp="1"/>
+          </p:cNvSpPr>
+          <p:nvPr>
+            <p:ph type="sldNum" sz="quarter" idx="10"/>
+          </p:nvPr>
+        </p:nvSpPr>
+        <p:spPr/>
+        <p:txBody>
+          <a:bodyPr/>
+          <a:lstStyle/>
+          <a:p>
+            <a:fld id="{207EAB29-8E86-49C7-96F5-7C9D72076108}" type="slidenum">
+              <a:rPr lang="ru-RU" smtClean="0"/>
+              <a:t>19</a:t>
             </a:fld>
             <a:endParaRPr lang="ru-RU"/>
           </a:p>
@@ -1234,7 +1744,7 @@
     </p:spTree>
     <p:extLst>
       <p:ext uri="{BB962C8B-B14F-4D97-AF65-F5344CB8AC3E}">
-        <p14:creationId xmlns:p14="http://schemas.microsoft.com/office/powerpoint/2010/main" val="3998828536"/>
+        <p14:creationId xmlns:p14="http://schemas.microsoft.com/office/powerpoint/2010/main" val="4173125122"/>
       </p:ext>
     </p:extLst>
   </p:cSld>
@@ -1318,7 +1828,7 @@
     </p:spTree>
     <p:extLst>
       <p:ext uri="{BB962C8B-B14F-4D97-AF65-F5344CB8AC3E}">
-        <p14:creationId xmlns:p14="http://schemas.microsoft.com/office/powerpoint/2010/main" val="4173125122"/>
+        <p14:creationId xmlns:p14="http://schemas.microsoft.com/office/powerpoint/2010/main" val="3144790732"/>
       </p:ext>
     </p:extLst>
   </p:cSld>
@@ -1402,7 +1912,7 @@
     </p:spTree>
     <p:extLst>
       <p:ext uri="{BB962C8B-B14F-4D97-AF65-F5344CB8AC3E}">
-        <p14:creationId xmlns:p14="http://schemas.microsoft.com/office/powerpoint/2010/main" val="3144790732"/>
+        <p14:creationId xmlns:p14="http://schemas.microsoft.com/office/powerpoint/2010/main" val="1510259865"/>
       </p:ext>
     </p:extLst>
   </p:cSld>
@@ -1486,7 +1996,7 @@
     </p:spTree>
     <p:extLst>
       <p:ext uri="{BB962C8B-B14F-4D97-AF65-F5344CB8AC3E}">
-        <p14:creationId xmlns:p14="http://schemas.microsoft.com/office/powerpoint/2010/main" val="1510259865"/>
+        <p14:creationId xmlns:p14="http://schemas.microsoft.com/office/powerpoint/2010/main" val="913135345"/>
       </p:ext>
     </p:extLst>
   </p:cSld>
@@ -1570,7 +2080,7 @@
     </p:spTree>
     <p:extLst>
       <p:ext uri="{BB962C8B-B14F-4D97-AF65-F5344CB8AC3E}">
-        <p14:creationId xmlns:p14="http://schemas.microsoft.com/office/powerpoint/2010/main" val="913135345"/>
+        <p14:creationId xmlns:p14="http://schemas.microsoft.com/office/powerpoint/2010/main" val="2916898948"/>
       </p:ext>
     </p:extLst>
   </p:cSld>
@@ -1711,7 +2221,7 @@
           <a:p>
             <a:fld id="{58BF7D01-7D49-4F37-AA30-F04C65571A4A}" type="datetimeFigureOut">
               <a:rPr lang="ru-RU" smtClean="0"/>
-              <a:t>22.09.2024</a:t>
+              <a:t>29.09.2024</a:t>
             </a:fld>
             <a:endParaRPr lang="ru-RU"/>
           </a:p>
@@ -1881,7 +2391,7 @@
           <a:p>
             <a:fld id="{58BF7D01-7D49-4F37-AA30-F04C65571A4A}" type="datetimeFigureOut">
               <a:rPr lang="ru-RU" smtClean="0"/>
-              <a:t>22.09.2024</a:t>
+              <a:t>29.09.2024</a:t>
             </a:fld>
             <a:endParaRPr lang="ru-RU"/>
           </a:p>
@@ -2061,7 +2571,7 @@
           <a:p>
             <a:fld id="{58BF7D01-7D49-4F37-AA30-F04C65571A4A}" type="datetimeFigureOut">
               <a:rPr lang="ru-RU" smtClean="0"/>
-              <a:t>22.09.2024</a:t>
+              <a:t>29.09.2024</a:t>
             </a:fld>
             <a:endParaRPr lang="ru-RU"/>
           </a:p>
@@ -2231,7 +2741,7 @@
           <a:p>
             <a:fld id="{58BF7D01-7D49-4F37-AA30-F04C65571A4A}" type="datetimeFigureOut">
               <a:rPr lang="ru-RU" smtClean="0"/>
-              <a:t>22.09.2024</a:t>
+              <a:t>29.09.2024</a:t>
             </a:fld>
             <a:endParaRPr lang="ru-RU"/>
           </a:p>
@@ -2477,7 +2987,7 @@
           <a:p>
             <a:fld id="{58BF7D01-7D49-4F37-AA30-F04C65571A4A}" type="datetimeFigureOut">
               <a:rPr lang="ru-RU" smtClean="0"/>
-              <a:t>22.09.2024</a:t>
+              <a:t>29.09.2024</a:t>
             </a:fld>
             <a:endParaRPr lang="ru-RU"/>
           </a:p>
@@ -2709,7 +3219,7 @@
           <a:p>
             <a:fld id="{58BF7D01-7D49-4F37-AA30-F04C65571A4A}" type="datetimeFigureOut">
               <a:rPr lang="ru-RU" smtClean="0"/>
-              <a:t>22.09.2024</a:t>
+              <a:t>29.09.2024</a:t>
             </a:fld>
             <a:endParaRPr lang="ru-RU"/>
           </a:p>
@@ -3076,7 +3586,7 @@
           <a:p>
             <a:fld id="{58BF7D01-7D49-4F37-AA30-F04C65571A4A}" type="datetimeFigureOut">
               <a:rPr lang="ru-RU" smtClean="0"/>
-              <a:t>22.09.2024</a:t>
+              <a:t>29.09.2024</a:t>
             </a:fld>
             <a:endParaRPr lang="ru-RU"/>
           </a:p>
@@ -3194,7 +3704,7 @@
           <a:p>
             <a:fld id="{58BF7D01-7D49-4F37-AA30-F04C65571A4A}" type="datetimeFigureOut">
               <a:rPr lang="ru-RU" smtClean="0"/>
-              <a:t>22.09.2024</a:t>
+              <a:t>29.09.2024</a:t>
             </a:fld>
             <a:endParaRPr lang="ru-RU"/>
           </a:p>
@@ -3289,7 +3799,7 @@
           <a:p>
             <a:fld id="{58BF7D01-7D49-4F37-AA30-F04C65571A4A}" type="datetimeFigureOut">
               <a:rPr lang="ru-RU" smtClean="0"/>
-              <a:t>22.09.2024</a:t>
+              <a:t>29.09.2024</a:t>
             </a:fld>
             <a:endParaRPr lang="ru-RU"/>
           </a:p>
@@ -3566,7 +4076,7 @@
           <a:p>
             <a:fld id="{58BF7D01-7D49-4F37-AA30-F04C65571A4A}" type="datetimeFigureOut">
               <a:rPr lang="ru-RU" smtClean="0"/>
-              <a:t>22.09.2024</a:t>
+              <a:t>29.09.2024</a:t>
             </a:fld>
             <a:endParaRPr lang="ru-RU"/>
           </a:p>
@@ -3823,7 +4333,7 @@
           <a:p>
             <a:fld id="{58BF7D01-7D49-4F37-AA30-F04C65571A4A}" type="datetimeFigureOut">
               <a:rPr lang="ru-RU" smtClean="0"/>
-              <a:t>22.09.2024</a:t>
+              <a:t>29.09.2024</a:t>
             </a:fld>
             <a:endParaRPr lang="ru-RU"/>
           </a:p>
@@ -4036,7 +4546,7 @@
           <a:p>
             <a:fld id="{58BF7D01-7D49-4F37-AA30-F04C65571A4A}" type="datetimeFigureOut">
               <a:rPr lang="ru-RU" smtClean="0"/>
-              <a:t>22.09.2024</a:t>
+              <a:t>29.09.2024</a:t>
             </a:fld>
             <a:endParaRPr lang="ru-RU"/>
           </a:p>
@@ -4525,7 +5035,7 @@
         </p:nvSpPr>
         <p:spPr>
           <a:xfrm>
-            <a:off x="1589314" y="136157"/>
+            <a:off x="1589312" y="554481"/>
             <a:ext cx="9013371" cy="1164869"/>
           </a:xfrm>
           <a:prstGeom prst="rect">
@@ -4558,7 +5068,15 @@
           <a:p>
             <a:r>
               <a:rPr lang="en-US" dirty="0"/>
-              <a:t>continue</a:t>
+              <a:t>break, continue</a:t>
+            </a:r>
+            <a:r>
+              <a:rPr lang="ru-RU" dirty="0"/>
+              <a:t> </a:t>
+            </a:r>
+            <a:r>
+              <a:rPr lang="en-US" dirty="0"/>
+              <a:t>example</a:t>
             </a:r>
             <a:endParaRPr lang="ru-RU" dirty="0"/>
           </a:p>
@@ -4566,10 +5084,10 @@
       </p:sp>
       <p:sp>
         <p:nvSpPr>
-          <p:cNvPr id="2" name="TextBox 1">
+          <p:cNvPr id="8" name="TextBox 7">
             <a:extLst>
               <a:ext uri="{FF2B5EF4-FFF2-40B4-BE49-F238E27FC236}">
-                <a16:creationId xmlns:a16="http://schemas.microsoft.com/office/drawing/2014/main" id="{339D0FE2-A696-49A8-A636-A21CE9304E7B}"/>
+                <a16:creationId xmlns:a16="http://schemas.microsoft.com/office/drawing/2014/main" id="{1EE5A0C4-D2FA-F8CF-A054-75ADF9807592}"/>
               </a:ext>
             </a:extLst>
           </p:cNvPr>
@@ -4578,8 +5096,8 @@
         </p:nvSpPr>
         <p:spPr>
           <a:xfrm>
-            <a:off x="2074590" y="1301028"/>
-            <a:ext cx="3956532" cy="2246769"/>
+            <a:off x="4072090" y="2090172"/>
+            <a:ext cx="4047813" cy="2677656"/>
           </a:xfrm>
           <a:prstGeom prst="rect">
             <a:avLst/>
@@ -4587,7 +5105,7 @@
           <a:noFill/>
         </p:spPr>
         <p:txBody>
-          <a:bodyPr wrap="none" rtlCol="0">
+          <a:bodyPr wrap="square">
             <a:spAutoFit/>
           </a:bodyPr>
           <a:lstStyle/>
@@ -4597,10 +5115,62 @@
                 <a:latin typeface="Times New Roman" panose="02020603050405020304" pitchFamily="18" charset="0"/>
                 <a:cs typeface="Times New Roman" panose="02020603050405020304" pitchFamily="18" charset="0"/>
               </a:rPr>
-              <a:t>while (expr) {</a:t>
-            </a:r>
-          </a:p>
-          <a:p>
+              <a:t>int N = 10; </a:t>
+            </a:r>
+          </a:p>
+          <a:p>
+            <a:r>
+              <a:rPr lang="en-US" sz="2800" dirty="0">
+                <a:latin typeface="Times New Roman" panose="02020603050405020304" pitchFamily="18" charset="0"/>
+                <a:cs typeface="Times New Roman" panose="02020603050405020304" pitchFamily="18" charset="0"/>
+              </a:rPr>
+              <a:t>for (int </a:t>
+            </a:r>
+            <a:r>
+              <a:rPr lang="en-US" sz="2800" dirty="0" err="1">
+                <a:latin typeface="Times New Roman" panose="02020603050405020304" pitchFamily="18" charset="0"/>
+                <a:cs typeface="Times New Roman" panose="02020603050405020304" pitchFamily="18" charset="0"/>
+              </a:rPr>
+              <a:t>i</a:t>
+            </a:r>
+            <a:r>
+              <a:rPr lang="en-US" sz="2800" dirty="0">
+                <a:latin typeface="Times New Roman" panose="02020603050405020304" pitchFamily="18" charset="0"/>
+                <a:cs typeface="Times New Roman" panose="02020603050405020304" pitchFamily="18" charset="0"/>
+              </a:rPr>
+              <a:t> = 0; </a:t>
+            </a:r>
+            <a:r>
+              <a:rPr lang="en-US" sz="2800" dirty="0" err="1">
+                <a:latin typeface="Times New Roman" panose="02020603050405020304" pitchFamily="18" charset="0"/>
+                <a:cs typeface="Times New Roman" panose="02020603050405020304" pitchFamily="18" charset="0"/>
+              </a:rPr>
+              <a:t>i</a:t>
+            </a:r>
+            <a:r>
+              <a:rPr lang="en-US" sz="2800" dirty="0">
+                <a:latin typeface="Times New Roman" panose="02020603050405020304" pitchFamily="18" charset="0"/>
+                <a:cs typeface="Times New Roman" panose="02020603050405020304" pitchFamily="18" charset="0"/>
+              </a:rPr>
+              <a:t> &lt; N; </a:t>
+            </a:r>
+            <a:r>
+              <a:rPr lang="en-US" sz="2800" dirty="0" err="1">
+                <a:latin typeface="Times New Roman" panose="02020603050405020304" pitchFamily="18" charset="0"/>
+                <a:cs typeface="Times New Roman" panose="02020603050405020304" pitchFamily="18" charset="0"/>
+              </a:rPr>
+              <a:t>i</a:t>
+            </a:r>
+            <a:r>
+              <a:rPr lang="en-US" sz="2800" dirty="0">
+                <a:latin typeface="Times New Roman" panose="02020603050405020304" pitchFamily="18" charset="0"/>
+                <a:cs typeface="Times New Roman" panose="02020603050405020304" pitchFamily="18" charset="0"/>
+              </a:rPr>
+              <a:t>++) {</a:t>
+            </a:r>
+          </a:p>
+          <a:p>
+            <a:pPr lvl="1"/>
             <a:r>
               <a:rPr lang="en-US" sz="2800" dirty="0">
                 <a:latin typeface="Times New Roman" panose="02020603050405020304" pitchFamily="18" charset="0"/>
@@ -4613,32 +5183,90 @@
                 <a:latin typeface="Times New Roman" panose="02020603050405020304" pitchFamily="18" charset="0"/>
                 <a:cs typeface="Times New Roman" panose="02020603050405020304" pitchFamily="18" charset="0"/>
               </a:rPr>
-              <a:t>expr_to_continue</a:t>
-            </a:r>
-            <a:r>
-              <a:rPr lang="en-US" sz="2800" dirty="0">
-                <a:latin typeface="Times New Roman" panose="02020603050405020304" pitchFamily="18" charset="0"/>
-                <a:cs typeface="Times New Roman" panose="02020603050405020304" pitchFamily="18" charset="0"/>
-              </a:rPr>
-              <a:t>) {</a:t>
-            </a:r>
-          </a:p>
-          <a:p>
-            <a:r>
-              <a:rPr lang="en-US" sz="2800" dirty="0">
-                <a:latin typeface="Times New Roman" panose="02020603050405020304" pitchFamily="18" charset="0"/>
-                <a:cs typeface="Times New Roman" panose="02020603050405020304" pitchFamily="18" charset="0"/>
-              </a:rPr>
-              <a:t>        continue;</a:t>
-            </a:r>
-          </a:p>
-          <a:p>
-            <a:r>
-              <a:rPr lang="en-US" sz="2800" dirty="0">
-                <a:latin typeface="Times New Roman" panose="02020603050405020304" pitchFamily="18" charset="0"/>
-                <a:cs typeface="Times New Roman" panose="02020603050405020304" pitchFamily="18" charset="0"/>
-              </a:rPr>
-              <a:t>    }</a:t>
+              <a:t>i</a:t>
+            </a:r>
+            <a:r>
+              <a:rPr lang="en-US" sz="2800" dirty="0">
+                <a:latin typeface="Times New Roman" panose="02020603050405020304" pitchFamily="18" charset="0"/>
+                <a:cs typeface="Times New Roman" panose="02020603050405020304" pitchFamily="18" charset="0"/>
+              </a:rPr>
+              <a:t> == 1) continue; </a:t>
+            </a:r>
+          </a:p>
+          <a:p>
+            <a:pPr lvl="1"/>
+            <a:r>
+              <a:rPr lang="en-US" sz="2800" dirty="0">
+                <a:latin typeface="Times New Roman" panose="02020603050405020304" pitchFamily="18" charset="0"/>
+                <a:cs typeface="Times New Roman" panose="02020603050405020304" pitchFamily="18" charset="0"/>
+              </a:rPr>
+              <a:t>    if (</a:t>
+            </a:r>
+            <a:r>
+              <a:rPr lang="en-US" sz="2800" dirty="0" err="1">
+                <a:latin typeface="Times New Roman" panose="02020603050405020304" pitchFamily="18" charset="0"/>
+                <a:cs typeface="Times New Roman" panose="02020603050405020304" pitchFamily="18" charset="0"/>
+              </a:rPr>
+              <a:t>i</a:t>
+            </a:r>
+            <a:r>
+              <a:rPr lang="en-US" sz="2800" dirty="0">
+                <a:latin typeface="Times New Roman" panose="02020603050405020304" pitchFamily="18" charset="0"/>
+                <a:cs typeface="Times New Roman" panose="02020603050405020304" pitchFamily="18" charset="0"/>
+              </a:rPr>
+              <a:t> == 8) break;</a:t>
+            </a:r>
+          </a:p>
+          <a:p>
+            <a:pPr lvl="1"/>
+            <a:r>
+              <a:rPr lang="en-US" sz="2800" dirty="0">
+                <a:latin typeface="Times New Roman" panose="02020603050405020304" pitchFamily="18" charset="0"/>
+                <a:cs typeface="Times New Roman" panose="02020603050405020304" pitchFamily="18" charset="0"/>
+              </a:rPr>
+              <a:t>    </a:t>
+            </a:r>
+            <a:r>
+              <a:rPr lang="en-US" sz="2800" dirty="0" err="1">
+                <a:latin typeface="Times New Roman" panose="02020603050405020304" pitchFamily="18" charset="0"/>
+                <a:cs typeface="Times New Roman" panose="02020603050405020304" pitchFamily="18" charset="0"/>
+              </a:rPr>
+              <a:t>printf</a:t>
+            </a:r>
+            <a:r>
+              <a:rPr lang="en-US" sz="2800" dirty="0">
+                <a:latin typeface="Times New Roman" panose="02020603050405020304" pitchFamily="18" charset="0"/>
+                <a:cs typeface="Times New Roman" panose="02020603050405020304" pitchFamily="18" charset="0"/>
+              </a:rPr>
+              <a:t>("</a:t>
+            </a:r>
+            <a:r>
+              <a:rPr lang="en-US" sz="2800" dirty="0" err="1">
+                <a:latin typeface="Times New Roman" panose="02020603050405020304" pitchFamily="18" charset="0"/>
+                <a:cs typeface="Times New Roman" panose="02020603050405020304" pitchFamily="18" charset="0"/>
+              </a:rPr>
+              <a:t>i</a:t>
+            </a:r>
+            <a:r>
+              <a:rPr lang="en-US" sz="2800" dirty="0">
+                <a:latin typeface="Times New Roman" panose="02020603050405020304" pitchFamily="18" charset="0"/>
+                <a:cs typeface="Times New Roman" panose="02020603050405020304" pitchFamily="18" charset="0"/>
+              </a:rPr>
+              <a:t> = %d\n", </a:t>
+            </a:r>
+            <a:r>
+              <a:rPr lang="en-US" sz="2800" dirty="0" err="1">
+                <a:latin typeface="Times New Roman" panose="02020603050405020304" pitchFamily="18" charset="0"/>
+                <a:cs typeface="Times New Roman" panose="02020603050405020304" pitchFamily="18" charset="0"/>
+              </a:rPr>
+              <a:t>i</a:t>
+            </a:r>
+            <a:r>
+              <a:rPr lang="en-US" sz="2800" dirty="0">
+                <a:latin typeface="Times New Roman" panose="02020603050405020304" pitchFamily="18" charset="0"/>
+                <a:cs typeface="Times New Roman" panose="02020603050405020304" pitchFamily="18" charset="0"/>
+              </a:rPr>
+              <a:t>);</a:t>
             </a:r>
           </a:p>
           <a:p>
@@ -4649,350 +5277,13 @@
               </a:rPr>
               <a:t>}</a:t>
             </a:r>
-            <a:endParaRPr lang="ru-RU" sz="2800" dirty="0">
-              <a:latin typeface="Times New Roman" panose="02020603050405020304" pitchFamily="18" charset="0"/>
-              <a:cs typeface="Times New Roman" panose="02020603050405020304" pitchFamily="18" charset="0"/>
-            </a:endParaRPr>
-          </a:p>
-        </p:txBody>
-      </p:sp>
-      <p:sp>
-        <p:nvSpPr>
-          <p:cNvPr id="23" name="TextBox 22">
-            <a:extLst>
-              <a:ext uri="{FF2B5EF4-FFF2-40B4-BE49-F238E27FC236}">
-                <a16:creationId xmlns:a16="http://schemas.microsoft.com/office/drawing/2014/main" id="{A32D6D41-69E0-487E-BFEE-3FD06558A39D}"/>
-              </a:ext>
-            </a:extLst>
-          </p:cNvPr>
-          <p:cNvSpPr txBox="1"/>
-          <p:nvPr/>
-        </p:nvSpPr>
-        <p:spPr>
-          <a:xfrm>
-            <a:off x="7304612" y="1301028"/>
-            <a:ext cx="3956532" cy="2246769"/>
-          </a:xfrm>
-          <a:prstGeom prst="rect">
-            <a:avLst/>
-          </a:prstGeom>
-          <a:noFill/>
-        </p:spPr>
-        <p:txBody>
-          <a:bodyPr wrap="none" rtlCol="0">
-            <a:spAutoFit/>
-          </a:bodyPr>
-          <a:lstStyle/>
-          <a:p>
-            <a:r>
-              <a:rPr lang="en-US" sz="2800" dirty="0">
-                <a:latin typeface="Times New Roman" panose="02020603050405020304" pitchFamily="18" charset="0"/>
-                <a:cs typeface="Times New Roman" panose="02020603050405020304" pitchFamily="18" charset="0"/>
-              </a:rPr>
-              <a:t>do {</a:t>
-            </a:r>
-          </a:p>
-          <a:p>
-            <a:r>
-              <a:rPr lang="en-US" sz="2800" dirty="0">
-                <a:latin typeface="Times New Roman" panose="02020603050405020304" pitchFamily="18" charset="0"/>
-                <a:cs typeface="Times New Roman" panose="02020603050405020304" pitchFamily="18" charset="0"/>
-              </a:rPr>
-              <a:t>    if (</a:t>
-            </a:r>
-            <a:r>
-              <a:rPr lang="en-US" sz="2800" dirty="0" err="1">
-                <a:latin typeface="Times New Roman" panose="02020603050405020304" pitchFamily="18" charset="0"/>
-                <a:cs typeface="Times New Roman" panose="02020603050405020304" pitchFamily="18" charset="0"/>
-              </a:rPr>
-              <a:t>expr_to_continue</a:t>
-            </a:r>
-            <a:r>
-              <a:rPr lang="en-US" sz="2800" dirty="0">
-                <a:latin typeface="Times New Roman" panose="02020603050405020304" pitchFamily="18" charset="0"/>
-                <a:cs typeface="Times New Roman" panose="02020603050405020304" pitchFamily="18" charset="0"/>
-              </a:rPr>
-              <a:t>) {</a:t>
-            </a:r>
-          </a:p>
-          <a:p>
-            <a:r>
-              <a:rPr lang="en-US" sz="2800" dirty="0">
-                <a:latin typeface="Times New Roman" panose="02020603050405020304" pitchFamily="18" charset="0"/>
-                <a:cs typeface="Times New Roman" panose="02020603050405020304" pitchFamily="18" charset="0"/>
-              </a:rPr>
-              <a:t> 	continue;</a:t>
-            </a:r>
-          </a:p>
-          <a:p>
-            <a:r>
-              <a:rPr lang="en-US" sz="2800" dirty="0">
-                <a:latin typeface="Times New Roman" panose="02020603050405020304" pitchFamily="18" charset="0"/>
-                <a:cs typeface="Times New Roman" panose="02020603050405020304" pitchFamily="18" charset="0"/>
-              </a:rPr>
-              <a:t>    }</a:t>
-            </a:r>
-          </a:p>
-          <a:p>
-            <a:r>
-              <a:rPr lang="en-US" sz="2800" dirty="0">
-                <a:latin typeface="Times New Roman" panose="02020603050405020304" pitchFamily="18" charset="0"/>
-                <a:cs typeface="Times New Roman" panose="02020603050405020304" pitchFamily="18" charset="0"/>
-              </a:rPr>
-              <a:t>} while (expr);</a:t>
-            </a:r>
-            <a:endParaRPr lang="ru-RU" sz="2800" dirty="0">
-              <a:latin typeface="Times New Roman" panose="02020603050405020304" pitchFamily="18" charset="0"/>
-              <a:cs typeface="Times New Roman" panose="02020603050405020304" pitchFamily="18" charset="0"/>
-            </a:endParaRPr>
-          </a:p>
-        </p:txBody>
-      </p:sp>
-      <p:cxnSp>
-        <p:nvCxnSpPr>
-          <p:cNvPr id="24" name="Прямая со стрелкой 39">
-            <a:extLst>
-              <a:ext uri="{FF2B5EF4-FFF2-40B4-BE49-F238E27FC236}">
-                <a16:creationId xmlns:a16="http://schemas.microsoft.com/office/drawing/2014/main" id="{7D4DEAD1-6BD3-48DA-880A-BEBCAEB84672}"/>
-              </a:ext>
-            </a:extLst>
-          </p:cNvPr>
-          <p:cNvCxnSpPr>
-            <a:cxnSpLocks/>
-            <a:stCxn id="23" idx="1"/>
-          </p:cNvCxnSpPr>
-          <p:nvPr/>
-        </p:nvCxnSpPr>
-        <p:spPr>
-          <a:xfrm rot="10800000" flipH="1" flipV="1">
-            <a:off x="7304612" y="2424412"/>
-            <a:ext cx="325898" cy="924183"/>
-          </a:xfrm>
-          <a:prstGeom prst="bentConnector4">
-            <a:avLst>
-              <a:gd name="adj1" fmla="val -70145"/>
-              <a:gd name="adj2" fmla="val 101405"/>
-            </a:avLst>
-          </a:prstGeom>
-          <a:ln w="38100">
-            <a:tailEnd type="triangle"/>
-          </a:ln>
-        </p:spPr>
-        <p:style>
-          <a:lnRef idx="2">
-            <a:schemeClr val="accent6"/>
-          </a:lnRef>
-          <a:fillRef idx="0">
-            <a:schemeClr val="accent6"/>
-          </a:fillRef>
-          <a:effectRef idx="1">
-            <a:schemeClr val="accent6"/>
-          </a:effectRef>
-          <a:fontRef idx="minor">
-            <a:schemeClr val="tx1"/>
-          </a:fontRef>
-        </p:style>
-      </p:cxnSp>
-      <p:sp>
-        <p:nvSpPr>
-          <p:cNvPr id="26" name="TextBox 25">
-            <a:extLst>
-              <a:ext uri="{FF2B5EF4-FFF2-40B4-BE49-F238E27FC236}">
-                <a16:creationId xmlns:a16="http://schemas.microsoft.com/office/drawing/2014/main" id="{9C686510-B40D-4674-9E3B-087D7C6ED69A}"/>
-              </a:ext>
-            </a:extLst>
-          </p:cNvPr>
-          <p:cNvSpPr txBox="1"/>
-          <p:nvPr/>
-        </p:nvSpPr>
-        <p:spPr>
-          <a:xfrm>
-            <a:off x="3258080" y="3613457"/>
-            <a:ext cx="3956532" cy="2246769"/>
-          </a:xfrm>
-          <a:prstGeom prst="rect">
-            <a:avLst/>
-          </a:prstGeom>
-          <a:noFill/>
-        </p:spPr>
-        <p:txBody>
-          <a:bodyPr wrap="none" rtlCol="0">
-            <a:spAutoFit/>
-          </a:bodyPr>
-          <a:lstStyle/>
-          <a:p>
-            <a:r>
-              <a:rPr lang="en-US" sz="2800" dirty="0">
-                <a:latin typeface="Times New Roman" panose="02020603050405020304" pitchFamily="18" charset="0"/>
-                <a:cs typeface="Times New Roman" panose="02020603050405020304" pitchFamily="18" charset="0"/>
-              </a:rPr>
-              <a:t>for (</a:t>
-            </a:r>
-            <a:r>
-              <a:rPr lang="en-US" sz="2800" dirty="0" err="1">
-                <a:latin typeface="Times New Roman" panose="02020603050405020304" pitchFamily="18" charset="0"/>
-                <a:cs typeface="Times New Roman" panose="02020603050405020304" pitchFamily="18" charset="0"/>
-              </a:rPr>
-              <a:t>init</a:t>
-            </a:r>
-            <a:r>
-              <a:rPr lang="en-US" sz="2800" dirty="0">
-                <a:latin typeface="Times New Roman" panose="02020603050405020304" pitchFamily="18" charset="0"/>
-                <a:cs typeface="Times New Roman" panose="02020603050405020304" pitchFamily="18" charset="0"/>
-              </a:rPr>
-              <a:t>; expr; step) {</a:t>
-            </a:r>
-          </a:p>
-          <a:p>
-            <a:r>
-              <a:rPr lang="en-US" sz="2800" dirty="0">
-                <a:latin typeface="Times New Roman" panose="02020603050405020304" pitchFamily="18" charset="0"/>
-                <a:cs typeface="Times New Roman" panose="02020603050405020304" pitchFamily="18" charset="0"/>
-              </a:rPr>
-              <a:t>    if (</a:t>
-            </a:r>
-            <a:r>
-              <a:rPr lang="en-US" sz="2800" dirty="0" err="1">
-                <a:latin typeface="Times New Roman" panose="02020603050405020304" pitchFamily="18" charset="0"/>
-                <a:cs typeface="Times New Roman" panose="02020603050405020304" pitchFamily="18" charset="0"/>
-              </a:rPr>
-              <a:t>expr_to_continue</a:t>
-            </a:r>
-            <a:r>
-              <a:rPr lang="en-US" sz="2800" dirty="0">
-                <a:latin typeface="Times New Roman" panose="02020603050405020304" pitchFamily="18" charset="0"/>
-                <a:cs typeface="Times New Roman" panose="02020603050405020304" pitchFamily="18" charset="0"/>
-              </a:rPr>
-              <a:t>) {</a:t>
-            </a:r>
-          </a:p>
-          <a:p>
-            <a:r>
-              <a:rPr lang="en-US" sz="2800" dirty="0">
-                <a:latin typeface="Times New Roman" panose="02020603050405020304" pitchFamily="18" charset="0"/>
-                <a:cs typeface="Times New Roman" panose="02020603050405020304" pitchFamily="18" charset="0"/>
-              </a:rPr>
-              <a:t> 	continue;</a:t>
-            </a:r>
-          </a:p>
-          <a:p>
-            <a:r>
-              <a:rPr lang="en-US" sz="2800" dirty="0">
-                <a:latin typeface="Times New Roman" panose="02020603050405020304" pitchFamily="18" charset="0"/>
-                <a:cs typeface="Times New Roman" panose="02020603050405020304" pitchFamily="18" charset="0"/>
-              </a:rPr>
-              <a:t>    }</a:t>
-            </a:r>
-          </a:p>
-          <a:p>
-            <a:r>
-              <a:rPr lang="en-US" sz="2800" dirty="0">
-                <a:latin typeface="Times New Roman" panose="02020603050405020304" pitchFamily="18" charset="0"/>
-                <a:cs typeface="Times New Roman" panose="02020603050405020304" pitchFamily="18" charset="0"/>
-              </a:rPr>
-              <a:t>}</a:t>
-            </a:r>
-            <a:endParaRPr lang="ru-RU" sz="2800" dirty="0">
-              <a:latin typeface="Times New Roman" panose="02020603050405020304" pitchFamily="18" charset="0"/>
-              <a:cs typeface="Times New Roman" panose="02020603050405020304" pitchFamily="18" charset="0"/>
-            </a:endParaRPr>
-          </a:p>
-        </p:txBody>
-      </p:sp>
-      <p:cxnSp>
-        <p:nvCxnSpPr>
-          <p:cNvPr id="27" name="Прямая со стрелкой 39">
-            <a:extLst>
-              <a:ext uri="{FF2B5EF4-FFF2-40B4-BE49-F238E27FC236}">
-                <a16:creationId xmlns:a16="http://schemas.microsoft.com/office/drawing/2014/main" id="{4F779D52-15B7-4CE5-9A9D-405FE9BE96CA}"/>
-              </a:ext>
-            </a:extLst>
-          </p:cNvPr>
-          <p:cNvCxnSpPr>
-            <a:cxnSpLocks/>
-            <a:stCxn id="26" idx="1"/>
-          </p:cNvCxnSpPr>
-          <p:nvPr/>
-        </p:nvCxnSpPr>
-        <p:spPr>
-          <a:xfrm rot="10800000" flipH="1">
-            <a:off x="3258079" y="3890930"/>
-            <a:ext cx="71597" cy="845912"/>
-          </a:xfrm>
-          <a:prstGeom prst="bentConnector4">
-            <a:avLst>
-              <a:gd name="adj1" fmla="val -319287"/>
-              <a:gd name="adj2" fmla="val 99605"/>
-            </a:avLst>
-          </a:prstGeom>
-          <a:ln w="38100">
-            <a:tailEnd type="triangle"/>
-          </a:ln>
-        </p:spPr>
-        <p:style>
-          <a:lnRef idx="2">
-            <a:schemeClr val="accent6"/>
-          </a:lnRef>
-          <a:fillRef idx="0">
-            <a:schemeClr val="accent6"/>
-          </a:fillRef>
-          <a:effectRef idx="1">
-            <a:schemeClr val="accent6"/>
-          </a:effectRef>
-          <a:fontRef idx="minor">
-            <a:schemeClr val="tx1"/>
-          </a:fontRef>
-        </p:style>
-      </p:cxnSp>
-      <p:cxnSp>
-        <p:nvCxnSpPr>
-          <p:cNvPr id="40" name="Прямая со стрелкой 39">
-            <a:extLst>
-              <a:ext uri="{FF2B5EF4-FFF2-40B4-BE49-F238E27FC236}">
-                <a16:creationId xmlns:a16="http://schemas.microsoft.com/office/drawing/2014/main" id="{D2C0AC43-BAA1-44CE-BB6F-55D83BE0B33F}"/>
-              </a:ext>
-            </a:extLst>
-          </p:cNvPr>
-          <p:cNvCxnSpPr>
-            <a:cxnSpLocks/>
-            <a:stCxn id="2" idx="1"/>
-          </p:cNvCxnSpPr>
-          <p:nvPr/>
-        </p:nvCxnSpPr>
-        <p:spPr>
-          <a:xfrm rot="10800000" flipH="1">
-            <a:off x="2074590" y="1608083"/>
-            <a:ext cx="69520" cy="816330"/>
-          </a:xfrm>
-          <a:prstGeom prst="bentConnector4">
-            <a:avLst>
-              <a:gd name="adj1" fmla="val -328826"/>
-              <a:gd name="adj2" fmla="val 99352"/>
-            </a:avLst>
-          </a:prstGeom>
-          <a:ln w="38100">
-            <a:tailEnd type="triangle"/>
-          </a:ln>
-        </p:spPr>
-        <p:style>
-          <a:lnRef idx="2">
-            <a:schemeClr val="accent6"/>
-          </a:lnRef>
-          <a:fillRef idx="0">
-            <a:schemeClr val="accent6"/>
-          </a:fillRef>
-          <a:effectRef idx="1">
-            <a:schemeClr val="accent6"/>
-          </a:effectRef>
-          <a:fontRef idx="minor">
-            <a:schemeClr val="tx1"/>
-          </a:fontRef>
-        </p:style>
-      </p:cxnSp>
+          </a:p>
+        </p:txBody>
+      </p:sp>
     </p:spTree>
     <p:extLst>
       <p:ext uri="{BB962C8B-B14F-4D97-AF65-F5344CB8AC3E}">
-        <p14:creationId xmlns:p14="http://schemas.microsoft.com/office/powerpoint/2010/main" val="4149975229"/>
+        <p14:creationId xmlns:p14="http://schemas.microsoft.com/office/powerpoint/2010/main" val="3377044680"/>
       </p:ext>
     </p:extLst>
   </p:cSld>
@@ -5035,7 +5326,7 @@
         </p:nvSpPr>
         <p:spPr>
           <a:xfrm>
-            <a:off x="1589312" y="554481"/>
+            <a:off x="1589314" y="280536"/>
             <a:ext cx="9013371" cy="1164869"/>
           </a:xfrm>
           <a:prstGeom prst="rect">
@@ -5068,15 +5359,7 @@
           <a:p>
             <a:r>
               <a:rPr lang="en-US" dirty="0"/>
-              <a:t>break, continue</a:t>
-            </a:r>
-            <a:r>
-              <a:rPr lang="ru-RU" dirty="0"/>
-              <a:t> </a:t>
-            </a:r>
-            <a:r>
-              <a:rPr lang="en-US" dirty="0"/>
-              <a:t>example</a:t>
+              <a:t>for loop variations</a:t>
             </a:r>
             <a:endParaRPr lang="ru-RU" dirty="0"/>
           </a:p>
@@ -5084,10 +5367,10 @@
       </p:sp>
       <p:sp>
         <p:nvSpPr>
-          <p:cNvPr id="8" name="TextBox 7">
+          <p:cNvPr id="22" name="TextBox 21">
             <a:extLst>
               <a:ext uri="{FF2B5EF4-FFF2-40B4-BE49-F238E27FC236}">
-                <a16:creationId xmlns:a16="http://schemas.microsoft.com/office/drawing/2014/main" id="{1EE5A0C4-D2FA-F8CF-A054-75ADF9807592}"/>
+                <a16:creationId xmlns:a16="http://schemas.microsoft.com/office/drawing/2014/main" id="{AC3AFFEF-CF25-45AC-90A7-920955B7E9DE}"/>
               </a:ext>
             </a:extLst>
           </p:cNvPr>
@@ -5096,8 +5379,8 @@
         </p:nvSpPr>
         <p:spPr>
           <a:xfrm>
-            <a:off x="4072090" y="2090172"/>
-            <a:ext cx="4047813" cy="2677656"/>
+            <a:off x="2614031" y="1471084"/>
+            <a:ext cx="5062116" cy="4524315"/>
           </a:xfrm>
           <a:prstGeom prst="rect">
             <a:avLst/>
@@ -5111,179 +5394,163 @@
           <a:lstStyle/>
           <a:p>
             <a:r>
-              <a:rPr lang="en-US" sz="2800" dirty="0">
-                <a:latin typeface="Times New Roman" panose="02020603050405020304" pitchFamily="18" charset="0"/>
-                <a:cs typeface="Times New Roman" panose="02020603050405020304" pitchFamily="18" charset="0"/>
-              </a:rPr>
-              <a:t>int N = 10; </a:t>
-            </a:r>
-          </a:p>
-          <a:p>
-            <a:r>
-              <a:rPr lang="en-US" sz="2800" dirty="0">
-                <a:latin typeface="Times New Roman" panose="02020603050405020304" pitchFamily="18" charset="0"/>
-                <a:cs typeface="Times New Roman" panose="02020603050405020304" pitchFamily="18" charset="0"/>
-              </a:rPr>
-              <a:t>for (int </a:t>
-            </a:r>
-            <a:r>
-              <a:rPr lang="en-US" sz="2800" dirty="0" err="1">
-                <a:latin typeface="Times New Roman" panose="02020603050405020304" pitchFamily="18" charset="0"/>
-                <a:cs typeface="Times New Roman" panose="02020603050405020304" pitchFamily="18" charset="0"/>
-              </a:rPr>
-              <a:t>i</a:t>
-            </a:r>
-            <a:r>
-              <a:rPr lang="en-US" sz="2800" dirty="0">
-                <a:latin typeface="Times New Roman" panose="02020603050405020304" pitchFamily="18" charset="0"/>
-                <a:cs typeface="Times New Roman" panose="02020603050405020304" pitchFamily="18" charset="0"/>
-              </a:rPr>
-              <a:t> = 0; </a:t>
-            </a:r>
-            <a:r>
-              <a:rPr lang="en-US" sz="2800" dirty="0" err="1">
-                <a:latin typeface="Times New Roman" panose="02020603050405020304" pitchFamily="18" charset="0"/>
-                <a:cs typeface="Times New Roman" panose="02020603050405020304" pitchFamily="18" charset="0"/>
-              </a:rPr>
-              <a:t>i</a:t>
-            </a:r>
-            <a:r>
-              <a:rPr lang="en-US" sz="2800" dirty="0">
-                <a:latin typeface="Times New Roman" panose="02020603050405020304" pitchFamily="18" charset="0"/>
-                <a:cs typeface="Times New Roman" panose="02020603050405020304" pitchFamily="18" charset="0"/>
-              </a:rPr>
-              <a:t> &lt; N; </a:t>
-            </a:r>
-            <a:r>
-              <a:rPr lang="en-US" sz="2800" dirty="0" err="1">
-                <a:latin typeface="Times New Roman" panose="02020603050405020304" pitchFamily="18" charset="0"/>
-                <a:cs typeface="Times New Roman" panose="02020603050405020304" pitchFamily="18" charset="0"/>
-              </a:rPr>
-              <a:t>i</a:t>
-            </a:r>
-            <a:r>
-              <a:rPr lang="en-US" sz="2800" dirty="0">
-                <a:latin typeface="Times New Roman" panose="02020603050405020304" pitchFamily="18" charset="0"/>
-                <a:cs typeface="Times New Roman" panose="02020603050405020304" pitchFamily="18" charset="0"/>
-              </a:rPr>
-              <a:t>++) {</a:t>
-            </a:r>
-          </a:p>
-          <a:p>
-            <a:pPr lvl="1"/>
-            <a:r>
-              <a:rPr lang="en-US" sz="2800" dirty="0">
-                <a:latin typeface="Times New Roman" panose="02020603050405020304" pitchFamily="18" charset="0"/>
-                <a:cs typeface="Times New Roman" panose="02020603050405020304" pitchFamily="18" charset="0"/>
-              </a:rPr>
-              <a:t>    if (</a:t>
-            </a:r>
-            <a:r>
-              <a:rPr lang="en-US" sz="2800" dirty="0" err="1">
-                <a:latin typeface="Times New Roman" panose="02020603050405020304" pitchFamily="18" charset="0"/>
-                <a:cs typeface="Times New Roman" panose="02020603050405020304" pitchFamily="18" charset="0"/>
-              </a:rPr>
-              <a:t>i</a:t>
-            </a:r>
-            <a:r>
-              <a:rPr lang="en-US" sz="2800" dirty="0">
-                <a:latin typeface="Times New Roman" panose="02020603050405020304" pitchFamily="18" charset="0"/>
-                <a:cs typeface="Times New Roman" panose="02020603050405020304" pitchFamily="18" charset="0"/>
-              </a:rPr>
-              <a:t> == 1) continue; </a:t>
-            </a:r>
-          </a:p>
-          <a:p>
-            <a:pPr lvl="1"/>
-            <a:r>
-              <a:rPr lang="en-US" sz="2800" dirty="0">
-                <a:latin typeface="Times New Roman" panose="02020603050405020304" pitchFamily="18" charset="0"/>
-                <a:cs typeface="Times New Roman" panose="02020603050405020304" pitchFamily="18" charset="0"/>
-              </a:rPr>
-              <a:t>    if (</a:t>
-            </a:r>
-            <a:r>
-              <a:rPr lang="en-US" sz="2800" dirty="0" err="1">
-                <a:latin typeface="Times New Roman" panose="02020603050405020304" pitchFamily="18" charset="0"/>
-                <a:cs typeface="Times New Roman" panose="02020603050405020304" pitchFamily="18" charset="0"/>
-              </a:rPr>
-              <a:t>i</a:t>
-            </a:r>
-            <a:r>
-              <a:rPr lang="en-US" sz="2800" dirty="0">
-                <a:latin typeface="Times New Roman" panose="02020603050405020304" pitchFamily="18" charset="0"/>
-                <a:cs typeface="Times New Roman" panose="02020603050405020304" pitchFamily="18" charset="0"/>
-              </a:rPr>
-              <a:t> == 8) break;</a:t>
-            </a:r>
-          </a:p>
-          <a:p>
-            <a:pPr lvl="1"/>
-            <a:r>
-              <a:rPr lang="en-US" sz="2800" dirty="0">
-                <a:latin typeface="Times New Roman" panose="02020603050405020304" pitchFamily="18" charset="0"/>
-                <a:cs typeface="Times New Roman" panose="02020603050405020304" pitchFamily="18" charset="0"/>
-              </a:rPr>
-              <a:t>    </a:t>
-            </a:r>
-            <a:r>
-              <a:rPr lang="en-US" sz="2800" dirty="0" err="1">
-                <a:latin typeface="Times New Roman" panose="02020603050405020304" pitchFamily="18" charset="0"/>
-                <a:cs typeface="Times New Roman" panose="02020603050405020304" pitchFamily="18" charset="0"/>
-              </a:rPr>
-              <a:t>printf</a:t>
-            </a:r>
-            <a:r>
-              <a:rPr lang="en-US" sz="2800" dirty="0">
-                <a:latin typeface="Times New Roman" panose="02020603050405020304" pitchFamily="18" charset="0"/>
-                <a:cs typeface="Times New Roman" panose="02020603050405020304" pitchFamily="18" charset="0"/>
-              </a:rPr>
-              <a:t>("</a:t>
-            </a:r>
-            <a:r>
-              <a:rPr lang="en-US" sz="2800" dirty="0" err="1">
-                <a:latin typeface="Times New Roman" panose="02020603050405020304" pitchFamily="18" charset="0"/>
-                <a:cs typeface="Times New Roman" panose="02020603050405020304" pitchFamily="18" charset="0"/>
-              </a:rPr>
-              <a:t>i</a:t>
-            </a:r>
-            <a:r>
-              <a:rPr lang="en-US" sz="2800" dirty="0">
-                <a:latin typeface="Times New Roman" panose="02020603050405020304" pitchFamily="18" charset="0"/>
-                <a:cs typeface="Times New Roman" panose="02020603050405020304" pitchFamily="18" charset="0"/>
-              </a:rPr>
-              <a:t> = %d\n", </a:t>
-            </a:r>
-            <a:r>
-              <a:rPr lang="en-US" sz="2800" dirty="0" err="1">
-                <a:latin typeface="Times New Roman" panose="02020603050405020304" pitchFamily="18" charset="0"/>
-                <a:cs typeface="Times New Roman" panose="02020603050405020304" pitchFamily="18" charset="0"/>
-              </a:rPr>
-              <a:t>i</a:t>
-            </a:r>
-            <a:r>
-              <a:rPr lang="en-US" sz="2800" dirty="0">
-                <a:latin typeface="Times New Roman" panose="02020603050405020304" pitchFamily="18" charset="0"/>
-                <a:cs typeface="Times New Roman" panose="02020603050405020304" pitchFamily="18" charset="0"/>
-              </a:rPr>
-              <a:t>);</a:t>
-            </a:r>
-          </a:p>
-          <a:p>
-            <a:r>
-              <a:rPr lang="en-US" sz="2800" dirty="0">
-                <a:latin typeface="Times New Roman" panose="02020603050405020304" pitchFamily="18" charset="0"/>
-                <a:cs typeface="Times New Roman" panose="02020603050405020304" pitchFamily="18" charset="0"/>
-              </a:rPr>
-              <a:t>}</a:t>
-            </a:r>
+              <a:rPr lang="en-US" sz="3600" dirty="0">
+                <a:latin typeface="Times New Roman" panose="02020603050405020304" pitchFamily="18" charset="0"/>
+                <a:cs typeface="Times New Roman" panose="02020603050405020304" pitchFamily="18" charset="0"/>
+              </a:rPr>
+              <a:t>1. for (s1; s2; s3) { … }</a:t>
+            </a:r>
+          </a:p>
+          <a:p>
+            <a:r>
+              <a:rPr lang="en-US" sz="3600" dirty="0">
+                <a:latin typeface="Times New Roman" panose="02020603050405020304" pitchFamily="18" charset="0"/>
+                <a:cs typeface="Times New Roman" panose="02020603050405020304" pitchFamily="18" charset="0"/>
+              </a:rPr>
+              <a:t>2. for (; s2; s3) { … }</a:t>
+            </a:r>
+          </a:p>
+          <a:p>
+            <a:r>
+              <a:rPr lang="en-US" sz="3600" dirty="0">
+                <a:latin typeface="Times New Roman" panose="02020603050405020304" pitchFamily="18" charset="0"/>
+                <a:cs typeface="Times New Roman" panose="02020603050405020304" pitchFamily="18" charset="0"/>
+              </a:rPr>
+              <a:t>3. for (s1;; s3) { … }</a:t>
+            </a:r>
+          </a:p>
+          <a:p>
+            <a:r>
+              <a:rPr lang="en-US" sz="3600" dirty="0">
+                <a:latin typeface="Times New Roman" panose="02020603050405020304" pitchFamily="18" charset="0"/>
+                <a:cs typeface="Times New Roman" panose="02020603050405020304" pitchFamily="18" charset="0"/>
+              </a:rPr>
+              <a:t>4. for (s1; s2;) { … }</a:t>
+            </a:r>
+          </a:p>
+          <a:p>
+            <a:r>
+              <a:rPr lang="en-US" sz="3600" dirty="0">
+                <a:latin typeface="Times New Roman" panose="02020603050405020304" pitchFamily="18" charset="0"/>
+                <a:cs typeface="Times New Roman" panose="02020603050405020304" pitchFamily="18" charset="0"/>
+              </a:rPr>
+              <a:t>5. for (; s2;) { … }</a:t>
+            </a:r>
+          </a:p>
+          <a:p>
+            <a:r>
+              <a:rPr lang="en-US" sz="3600" dirty="0">
+                <a:latin typeface="Times New Roman" panose="02020603050405020304" pitchFamily="18" charset="0"/>
+                <a:cs typeface="Times New Roman" panose="02020603050405020304" pitchFamily="18" charset="0"/>
+              </a:rPr>
+              <a:t>6. for (s1;;) { … }</a:t>
+            </a:r>
+          </a:p>
+          <a:p>
+            <a:r>
+              <a:rPr lang="en-US" sz="3600" dirty="0">
+                <a:latin typeface="Times New Roman" panose="02020603050405020304" pitchFamily="18" charset="0"/>
+                <a:cs typeface="Times New Roman" panose="02020603050405020304" pitchFamily="18" charset="0"/>
+              </a:rPr>
+              <a:t>7. for (;; s3) { … }</a:t>
+            </a:r>
+          </a:p>
+          <a:p>
+            <a:r>
+              <a:rPr lang="en-US" sz="3600" dirty="0">
+                <a:latin typeface="Times New Roman" panose="02020603050405020304" pitchFamily="18" charset="0"/>
+                <a:cs typeface="Times New Roman" panose="02020603050405020304" pitchFamily="18" charset="0"/>
+              </a:rPr>
+              <a:t>8. for (;;) { … }</a:t>
+            </a:r>
+          </a:p>
+        </p:txBody>
+      </p:sp>
+      <p:sp>
+        <p:nvSpPr>
+          <p:cNvPr id="6" name="TextBox 5">
+            <a:extLst>
+              <a:ext uri="{FF2B5EF4-FFF2-40B4-BE49-F238E27FC236}">
+                <a16:creationId xmlns:a16="http://schemas.microsoft.com/office/drawing/2014/main" id="{C07549F0-9565-4774-A926-77A2175CFE71}"/>
+              </a:ext>
+            </a:extLst>
+          </p:cNvPr>
+          <p:cNvSpPr txBox="1"/>
+          <p:nvPr/>
+        </p:nvSpPr>
+        <p:spPr>
+          <a:xfrm>
+            <a:off x="6826749" y="4610404"/>
+            <a:ext cx="4333032" cy="1384995"/>
+          </a:xfrm>
+          <a:prstGeom prst="rect">
+            <a:avLst/>
+          </a:prstGeom>
+          <a:noFill/>
+        </p:spPr>
+        <p:txBody>
+          <a:bodyPr wrap="square">
+            <a:spAutoFit/>
+          </a:bodyPr>
+          <a:lstStyle/>
+          <a:p>
+            <a:r>
+              <a:rPr lang="en-US" sz="2800" dirty="0">
+                <a:latin typeface="Times New Roman" panose="02020603050405020304" pitchFamily="18" charset="0"/>
+                <a:cs typeface="Times New Roman" panose="02020603050405020304" pitchFamily="18" charset="0"/>
+              </a:rPr>
+              <a:t>s1 </a:t>
+            </a:r>
+            <a:r>
+              <a:rPr lang="ru-RU" sz="2800" dirty="0">
+                <a:latin typeface="Times New Roman" panose="02020603050405020304" pitchFamily="18" charset="0"/>
+                <a:cs typeface="Times New Roman" panose="02020603050405020304" pitchFamily="18" charset="0"/>
+              </a:rPr>
+              <a:t>– блок инициализации</a:t>
+            </a:r>
+          </a:p>
+          <a:p>
+            <a:r>
+              <a:rPr lang="en-US" sz="2800" dirty="0">
+                <a:latin typeface="Times New Roman" panose="02020603050405020304" pitchFamily="18" charset="0"/>
+                <a:cs typeface="Times New Roman" panose="02020603050405020304" pitchFamily="18" charset="0"/>
+              </a:rPr>
+              <a:t>s2 – </a:t>
+            </a:r>
+            <a:r>
+              <a:rPr lang="ru-RU" sz="2800" dirty="0">
+                <a:latin typeface="Times New Roman" panose="02020603050405020304" pitchFamily="18" charset="0"/>
+                <a:cs typeface="Times New Roman" panose="02020603050405020304" pitchFamily="18" charset="0"/>
+              </a:rPr>
+              <a:t>логическое выражение</a:t>
+            </a:r>
+          </a:p>
+          <a:p>
+            <a:r>
+              <a:rPr lang="en-US" sz="2800" dirty="0">
+                <a:latin typeface="Times New Roman" panose="02020603050405020304" pitchFamily="18" charset="0"/>
+                <a:cs typeface="Times New Roman" panose="02020603050405020304" pitchFamily="18" charset="0"/>
+              </a:rPr>
+              <a:t>s3 – </a:t>
+            </a:r>
+            <a:r>
+              <a:rPr lang="ru-RU" sz="2800" dirty="0">
+                <a:latin typeface="Times New Roman" panose="02020603050405020304" pitchFamily="18" charset="0"/>
+                <a:cs typeface="Times New Roman" panose="02020603050405020304" pitchFamily="18" charset="0"/>
+              </a:rPr>
+              <a:t>шаг цикла</a:t>
+            </a:r>
+            <a:endParaRPr lang="en-US" sz="2800" dirty="0">
+              <a:latin typeface="Times New Roman" panose="02020603050405020304" pitchFamily="18" charset="0"/>
+              <a:cs typeface="Times New Roman" panose="02020603050405020304" pitchFamily="18" charset="0"/>
+            </a:endParaRPr>
           </a:p>
         </p:txBody>
       </p:sp>
     </p:spTree>
     <p:extLst>
       <p:ext uri="{BB962C8B-B14F-4D97-AF65-F5344CB8AC3E}">
-        <p14:creationId xmlns:p14="http://schemas.microsoft.com/office/powerpoint/2010/main" val="3377044680"/>
+        <p14:creationId xmlns:p14="http://schemas.microsoft.com/office/powerpoint/2010/main" val="2250868878"/>
       </p:ext>
     </p:extLst>
   </p:cSld>
@@ -5326,6 +5593,253 @@
         </p:nvSpPr>
         <p:spPr>
           <a:xfrm>
+            <a:off x="1589313" y="576927"/>
+            <a:ext cx="9013371" cy="1164869"/>
+          </a:xfrm>
+          <a:prstGeom prst="rect">
+            <a:avLst/>
+          </a:prstGeom>
+        </p:spPr>
+        <p:txBody>
+          <a:bodyPr vert="horz" lIns="91440" tIns="45720" rIns="91440" bIns="45720" rtlCol="0" anchor="b">
+            <a:normAutofit fontScale="77500" lnSpcReduction="20000"/>
+          </a:bodyPr>
+          <a:lstStyle>
+            <a:lvl1pPr algn="ctr" defTabSz="914400" rtl="0" eaLnBrk="1" latinLnBrk="0" hangingPunct="1">
+              <a:lnSpc>
+                <a:spcPct val="90000"/>
+              </a:lnSpc>
+              <a:spcBef>
+                <a:spcPct val="0"/>
+              </a:spcBef>
+              <a:buNone/>
+              <a:defRPr sz="6000" kern="1200">
+                <a:solidFill>
+                  <a:schemeClr val="tx1"/>
+                </a:solidFill>
+                <a:latin typeface="+mj-lt"/>
+                <a:ea typeface="+mj-ea"/>
+                <a:cs typeface="+mj-cs"/>
+              </a:defRPr>
+            </a:lvl1pPr>
+          </a:lstStyle>
+          <a:p>
+            <a:r>
+              <a:rPr lang="en-US" dirty="0"/>
+              <a:t>Nested loops (</a:t>
+            </a:r>
+            <a:r>
+              <a:rPr lang="ru-RU" dirty="0"/>
+              <a:t>Вложенные циклы)</a:t>
+            </a:r>
+          </a:p>
+        </p:txBody>
+      </p:sp>
+      <p:sp>
+        <p:nvSpPr>
+          <p:cNvPr id="7" name="TextBox 6">
+            <a:extLst>
+              <a:ext uri="{FF2B5EF4-FFF2-40B4-BE49-F238E27FC236}">
+                <a16:creationId xmlns:a16="http://schemas.microsoft.com/office/drawing/2014/main" id="{965B9439-3697-4BF0-8C3E-B0E8E18B026F}"/>
+              </a:ext>
+            </a:extLst>
+          </p:cNvPr>
+          <p:cNvSpPr txBox="1"/>
+          <p:nvPr/>
+        </p:nvSpPr>
+        <p:spPr>
+          <a:xfrm>
+            <a:off x="2562658" y="2217026"/>
+            <a:ext cx="3533340" cy="2246769"/>
+          </a:xfrm>
+          <a:prstGeom prst="rect">
+            <a:avLst/>
+          </a:prstGeom>
+          <a:noFill/>
+        </p:spPr>
+        <p:txBody>
+          <a:bodyPr wrap="none" rtlCol="0">
+            <a:spAutoFit/>
+          </a:bodyPr>
+          <a:lstStyle/>
+          <a:p>
+            <a:r>
+              <a:rPr lang="en-US" sz="2800" dirty="0">
+                <a:latin typeface="Times New Roman" panose="02020603050405020304" pitchFamily="18" charset="0"/>
+                <a:cs typeface="Times New Roman" panose="02020603050405020304" pitchFamily="18" charset="0"/>
+              </a:rPr>
+              <a:t>for (s11; s12; s13) {</a:t>
+            </a:r>
+          </a:p>
+          <a:p>
+            <a:pPr lvl="1"/>
+            <a:r>
+              <a:rPr lang="en-US" sz="2800" dirty="0">
+                <a:latin typeface="Times New Roman" panose="02020603050405020304" pitchFamily="18" charset="0"/>
+                <a:cs typeface="Times New Roman" panose="02020603050405020304" pitchFamily="18" charset="0"/>
+              </a:rPr>
+              <a:t>for (s21; s22; s23) {</a:t>
+            </a:r>
+          </a:p>
+          <a:p>
+            <a:pPr lvl="1"/>
+            <a:r>
+              <a:rPr lang="en-US" sz="2800" dirty="0">
+                <a:latin typeface="Times New Roman" panose="02020603050405020304" pitchFamily="18" charset="0"/>
+                <a:cs typeface="Times New Roman" panose="02020603050405020304" pitchFamily="18" charset="0"/>
+              </a:rPr>
+              <a:t>	…</a:t>
+            </a:r>
+          </a:p>
+          <a:p>
+            <a:pPr lvl="1"/>
+            <a:r>
+              <a:rPr lang="en-US" sz="2800" dirty="0">
+                <a:latin typeface="Times New Roman" panose="02020603050405020304" pitchFamily="18" charset="0"/>
+                <a:cs typeface="Times New Roman" panose="02020603050405020304" pitchFamily="18" charset="0"/>
+              </a:rPr>
+              <a:t>}</a:t>
+            </a:r>
+          </a:p>
+          <a:p>
+            <a:r>
+              <a:rPr lang="en-US" sz="2800" dirty="0">
+                <a:latin typeface="Times New Roman" panose="02020603050405020304" pitchFamily="18" charset="0"/>
+                <a:cs typeface="Times New Roman" panose="02020603050405020304" pitchFamily="18" charset="0"/>
+              </a:rPr>
+              <a:t>}</a:t>
+            </a:r>
+            <a:endParaRPr lang="ru-RU" sz="2800" dirty="0">
+              <a:latin typeface="Times New Roman" panose="02020603050405020304" pitchFamily="18" charset="0"/>
+              <a:cs typeface="Times New Roman" panose="02020603050405020304" pitchFamily="18" charset="0"/>
+            </a:endParaRPr>
+          </a:p>
+        </p:txBody>
+      </p:sp>
+      <p:sp>
+        <p:nvSpPr>
+          <p:cNvPr id="9" name="TextBox 8">
+            <a:extLst>
+              <a:ext uri="{FF2B5EF4-FFF2-40B4-BE49-F238E27FC236}">
+                <a16:creationId xmlns:a16="http://schemas.microsoft.com/office/drawing/2014/main" id="{3E460296-043F-47FA-8B87-AE7B7989F1A9}"/>
+              </a:ext>
+            </a:extLst>
+          </p:cNvPr>
+          <p:cNvSpPr txBox="1"/>
+          <p:nvPr/>
+        </p:nvSpPr>
+        <p:spPr>
+          <a:xfrm>
+            <a:off x="6862676" y="2217026"/>
+            <a:ext cx="2836033" cy="2246769"/>
+          </a:xfrm>
+          <a:prstGeom prst="rect">
+            <a:avLst/>
+          </a:prstGeom>
+          <a:noFill/>
+        </p:spPr>
+        <p:txBody>
+          <a:bodyPr wrap="none" rtlCol="0">
+            <a:spAutoFit/>
+          </a:bodyPr>
+          <a:lstStyle/>
+          <a:p>
+            <a:r>
+              <a:rPr lang="en-US" sz="2800" dirty="0">
+                <a:latin typeface="Times New Roman" panose="02020603050405020304" pitchFamily="18" charset="0"/>
+                <a:cs typeface="Times New Roman" panose="02020603050405020304" pitchFamily="18" charset="0"/>
+              </a:rPr>
+              <a:t>while (e1){</a:t>
+            </a:r>
+          </a:p>
+          <a:p>
+            <a:r>
+              <a:rPr lang="en-US" sz="2800" dirty="0">
+                <a:latin typeface="Times New Roman" panose="02020603050405020304" pitchFamily="18" charset="0"/>
+                <a:cs typeface="Times New Roman" panose="02020603050405020304" pitchFamily="18" charset="0"/>
+              </a:rPr>
+              <a:t>	while (e2) {</a:t>
+            </a:r>
+          </a:p>
+          <a:p>
+            <a:r>
+              <a:rPr lang="en-US" sz="2800" dirty="0">
+                <a:latin typeface="Times New Roman" panose="02020603050405020304" pitchFamily="18" charset="0"/>
+                <a:cs typeface="Times New Roman" panose="02020603050405020304" pitchFamily="18" charset="0"/>
+              </a:rPr>
+              <a:t>		…</a:t>
+            </a:r>
+          </a:p>
+          <a:p>
+            <a:r>
+              <a:rPr lang="en-US" sz="2800" dirty="0">
+                <a:latin typeface="Times New Roman" panose="02020603050405020304" pitchFamily="18" charset="0"/>
+                <a:cs typeface="Times New Roman" panose="02020603050405020304" pitchFamily="18" charset="0"/>
+              </a:rPr>
+              <a:t>	}</a:t>
+            </a:r>
+          </a:p>
+          <a:p>
+            <a:r>
+              <a:rPr lang="en-US" sz="2800" dirty="0">
+                <a:latin typeface="Times New Roman" panose="02020603050405020304" pitchFamily="18" charset="0"/>
+                <a:cs typeface="Times New Roman" panose="02020603050405020304" pitchFamily="18" charset="0"/>
+              </a:rPr>
+              <a:t>}</a:t>
+            </a:r>
+            <a:endParaRPr lang="ru-RU" sz="2800" dirty="0">
+              <a:latin typeface="Times New Roman" panose="02020603050405020304" pitchFamily="18" charset="0"/>
+              <a:cs typeface="Times New Roman" panose="02020603050405020304" pitchFamily="18" charset="0"/>
+            </a:endParaRPr>
+          </a:p>
+        </p:txBody>
+      </p:sp>
+    </p:spTree>
+    <p:extLst>
+      <p:ext uri="{BB962C8B-B14F-4D97-AF65-F5344CB8AC3E}">
+        <p14:creationId xmlns:p14="http://schemas.microsoft.com/office/powerpoint/2010/main" val="1993251587"/>
+      </p:ext>
+    </p:extLst>
+  </p:cSld>
+  <p:clrMapOvr>
+    <a:masterClrMapping/>
+  </p:clrMapOvr>
+</p:sld>
+</file>
+
+<file path=ppt/slides/slide13.xml><?xml version="1.0" encoding="utf-8"?>
+<p:sld xmlns:a="http://schemas.openxmlformats.org/drawingml/2006/main" xmlns:r="http://schemas.openxmlformats.org/officeDocument/2006/relationships" xmlns:p="http://schemas.openxmlformats.org/presentationml/2006/main">
+  <p:cSld>
+    <p:spTree>
+      <p:nvGrpSpPr>
+        <p:cNvPr id="1" name=""/>
+        <p:cNvGrpSpPr/>
+        <p:nvPr/>
+      </p:nvGrpSpPr>
+      <p:grpSpPr>
+        <a:xfrm>
+          <a:off x="0" y="0"/>
+          <a:ext cx="0" cy="0"/>
+          <a:chOff x="0" y="0"/>
+          <a:chExt cx="0" cy="0"/>
+        </a:xfrm>
+      </p:grpSpPr>
+      <p:sp>
+        <p:nvSpPr>
+          <p:cNvPr id="5" name="Заголовок 3">
+            <a:extLst>
+              <a:ext uri="{FF2B5EF4-FFF2-40B4-BE49-F238E27FC236}">
+                <a16:creationId xmlns:a16="http://schemas.microsoft.com/office/drawing/2014/main" id="{8259CF3A-AC4E-4FB4-B194-DC7CBFC75277}"/>
+              </a:ext>
+            </a:extLst>
+          </p:cNvPr>
+          <p:cNvSpPr txBox="1">
+            <a:spLocks/>
+          </p:cNvSpPr>
+          <p:nvPr/>
+        </p:nvSpPr>
+        <p:spPr>
+          <a:xfrm>
             <a:off x="1589314" y="280536"/>
             <a:ext cx="9013371" cy="1164869"/>
           </a:xfrm>
@@ -5359,7 +5873,539 @@
           <a:p>
             <a:r>
               <a:rPr lang="en-US" dirty="0"/>
-              <a:t>for loop variations</a:t>
+              <a:t>Nested loops break</a:t>
+            </a:r>
+            <a:endParaRPr lang="ru-RU" dirty="0"/>
+          </a:p>
+        </p:txBody>
+      </p:sp>
+      <p:sp>
+        <p:nvSpPr>
+          <p:cNvPr id="4" name="TextBox 3">
+            <a:extLst>
+              <a:ext uri="{FF2B5EF4-FFF2-40B4-BE49-F238E27FC236}">
+                <a16:creationId xmlns:a16="http://schemas.microsoft.com/office/drawing/2014/main" id="{2800FB05-EA2B-45B9-A6A9-8D5607CD9795}"/>
+              </a:ext>
+            </a:extLst>
+          </p:cNvPr>
+          <p:cNvSpPr txBox="1"/>
+          <p:nvPr/>
+        </p:nvSpPr>
+        <p:spPr>
+          <a:xfrm>
+            <a:off x="2235669" y="2305615"/>
+            <a:ext cx="3533340" cy="2677656"/>
+          </a:xfrm>
+          <a:prstGeom prst="rect">
+            <a:avLst/>
+          </a:prstGeom>
+          <a:noFill/>
+        </p:spPr>
+        <p:txBody>
+          <a:bodyPr wrap="none" rtlCol="0">
+            <a:spAutoFit/>
+          </a:bodyPr>
+          <a:lstStyle/>
+          <a:p>
+            <a:r>
+              <a:rPr lang="en-US" sz="2800" dirty="0">
+                <a:latin typeface="Times New Roman" panose="02020603050405020304" pitchFamily="18" charset="0"/>
+                <a:cs typeface="Times New Roman" panose="02020603050405020304" pitchFamily="18" charset="0"/>
+              </a:rPr>
+              <a:t>for (s11; s12; s13) {</a:t>
+            </a:r>
+          </a:p>
+          <a:p>
+            <a:pPr lvl="1"/>
+            <a:r>
+              <a:rPr lang="en-US" sz="2800" dirty="0">
+                <a:latin typeface="Times New Roman" panose="02020603050405020304" pitchFamily="18" charset="0"/>
+                <a:cs typeface="Times New Roman" panose="02020603050405020304" pitchFamily="18" charset="0"/>
+              </a:rPr>
+              <a:t>for (s21; s22; s23) {</a:t>
+            </a:r>
+          </a:p>
+          <a:p>
+            <a:pPr lvl="1"/>
+            <a:r>
+              <a:rPr lang="en-US" sz="2800" dirty="0">
+                <a:latin typeface="Times New Roman" panose="02020603050405020304" pitchFamily="18" charset="0"/>
+                <a:cs typeface="Times New Roman" panose="02020603050405020304" pitchFamily="18" charset="0"/>
+              </a:rPr>
+              <a:t>	if (e) break;</a:t>
+            </a:r>
+          </a:p>
+          <a:p>
+            <a:pPr lvl="1"/>
+            <a:r>
+              <a:rPr lang="en-US" sz="2800" dirty="0">
+                <a:latin typeface="Times New Roman" panose="02020603050405020304" pitchFamily="18" charset="0"/>
+                <a:cs typeface="Times New Roman" panose="02020603050405020304" pitchFamily="18" charset="0"/>
+              </a:rPr>
+              <a:t>	…</a:t>
+            </a:r>
+          </a:p>
+          <a:p>
+            <a:pPr lvl="1"/>
+            <a:r>
+              <a:rPr lang="en-US" sz="2800" dirty="0">
+                <a:latin typeface="Times New Roman" panose="02020603050405020304" pitchFamily="18" charset="0"/>
+                <a:cs typeface="Times New Roman" panose="02020603050405020304" pitchFamily="18" charset="0"/>
+              </a:rPr>
+              <a:t>}</a:t>
+            </a:r>
+          </a:p>
+          <a:p>
+            <a:r>
+              <a:rPr lang="en-US" sz="2800" dirty="0">
+                <a:latin typeface="Times New Roman" panose="02020603050405020304" pitchFamily="18" charset="0"/>
+                <a:cs typeface="Times New Roman" panose="02020603050405020304" pitchFamily="18" charset="0"/>
+              </a:rPr>
+              <a:t>}</a:t>
+            </a:r>
+            <a:endParaRPr lang="ru-RU" sz="2800" dirty="0">
+              <a:latin typeface="Times New Roman" panose="02020603050405020304" pitchFamily="18" charset="0"/>
+              <a:cs typeface="Times New Roman" panose="02020603050405020304" pitchFamily="18" charset="0"/>
+            </a:endParaRPr>
+          </a:p>
+        </p:txBody>
+      </p:sp>
+      <p:sp>
+        <p:nvSpPr>
+          <p:cNvPr id="6" name="TextBox 5">
+            <a:extLst>
+              <a:ext uri="{FF2B5EF4-FFF2-40B4-BE49-F238E27FC236}">
+                <a16:creationId xmlns:a16="http://schemas.microsoft.com/office/drawing/2014/main" id="{287B18F9-7AFE-453A-9F19-11D380F17D86}"/>
+              </a:ext>
+            </a:extLst>
+          </p:cNvPr>
+          <p:cNvSpPr txBox="1"/>
+          <p:nvPr/>
+        </p:nvSpPr>
+        <p:spPr>
+          <a:xfrm>
+            <a:off x="6422993" y="2305614"/>
+            <a:ext cx="3889353" cy="2677656"/>
+          </a:xfrm>
+          <a:prstGeom prst="rect">
+            <a:avLst/>
+          </a:prstGeom>
+          <a:noFill/>
+        </p:spPr>
+        <p:txBody>
+          <a:bodyPr wrap="square">
+            <a:spAutoFit/>
+          </a:bodyPr>
+          <a:lstStyle/>
+          <a:p>
+            <a:r>
+              <a:rPr lang="en-US" sz="2800" dirty="0">
+                <a:latin typeface="Times New Roman" panose="02020603050405020304" pitchFamily="18" charset="0"/>
+                <a:cs typeface="Times New Roman" panose="02020603050405020304" pitchFamily="18" charset="0"/>
+              </a:rPr>
+              <a:t>for (s11; s12; s13) {</a:t>
+            </a:r>
+          </a:p>
+          <a:p>
+            <a:r>
+              <a:rPr lang="en-US" sz="2800" dirty="0">
+                <a:latin typeface="Times New Roman" panose="02020603050405020304" pitchFamily="18" charset="0"/>
+                <a:cs typeface="Times New Roman" panose="02020603050405020304" pitchFamily="18" charset="0"/>
+              </a:rPr>
+              <a:t>     if (e) break;</a:t>
+            </a:r>
+          </a:p>
+          <a:p>
+            <a:pPr lvl="1"/>
+            <a:r>
+              <a:rPr lang="en-US" sz="2800" dirty="0">
+                <a:latin typeface="Times New Roman" panose="02020603050405020304" pitchFamily="18" charset="0"/>
+                <a:cs typeface="Times New Roman" panose="02020603050405020304" pitchFamily="18" charset="0"/>
+              </a:rPr>
+              <a:t>for (s21; s22; s23) {</a:t>
+            </a:r>
+          </a:p>
+          <a:p>
+            <a:pPr lvl="1"/>
+            <a:r>
+              <a:rPr lang="en-US" sz="2800" dirty="0">
+                <a:latin typeface="Times New Roman" panose="02020603050405020304" pitchFamily="18" charset="0"/>
+                <a:cs typeface="Times New Roman" panose="02020603050405020304" pitchFamily="18" charset="0"/>
+              </a:rPr>
+              <a:t>	…</a:t>
+            </a:r>
+          </a:p>
+          <a:p>
+            <a:pPr lvl="1"/>
+            <a:r>
+              <a:rPr lang="en-US" sz="2800" dirty="0">
+                <a:latin typeface="Times New Roman" panose="02020603050405020304" pitchFamily="18" charset="0"/>
+                <a:cs typeface="Times New Roman" panose="02020603050405020304" pitchFamily="18" charset="0"/>
+              </a:rPr>
+              <a:t>}</a:t>
+            </a:r>
+          </a:p>
+          <a:p>
+            <a:r>
+              <a:rPr lang="en-US" sz="2800" dirty="0">
+                <a:latin typeface="Times New Roman" panose="02020603050405020304" pitchFamily="18" charset="0"/>
+                <a:cs typeface="Times New Roman" panose="02020603050405020304" pitchFamily="18" charset="0"/>
+              </a:rPr>
+              <a:t>}</a:t>
+            </a:r>
+            <a:endParaRPr lang="ru-RU" sz="2800" dirty="0">
+              <a:latin typeface="Times New Roman" panose="02020603050405020304" pitchFamily="18" charset="0"/>
+              <a:cs typeface="Times New Roman" panose="02020603050405020304" pitchFamily="18" charset="0"/>
+            </a:endParaRPr>
+          </a:p>
+        </p:txBody>
+      </p:sp>
+    </p:spTree>
+    <p:extLst>
+      <p:ext uri="{BB962C8B-B14F-4D97-AF65-F5344CB8AC3E}">
+        <p14:creationId xmlns:p14="http://schemas.microsoft.com/office/powerpoint/2010/main" val="3222610403"/>
+      </p:ext>
+    </p:extLst>
+  </p:cSld>
+  <p:clrMapOvr>
+    <a:masterClrMapping/>
+  </p:clrMapOvr>
+</p:sld>
+</file>
+
+<file path=ppt/slides/slide14.xml><?xml version="1.0" encoding="utf-8"?>
+<p:sld xmlns:a="http://schemas.openxmlformats.org/drawingml/2006/main" xmlns:r="http://schemas.openxmlformats.org/officeDocument/2006/relationships" xmlns:p="http://schemas.openxmlformats.org/presentationml/2006/main">
+  <p:cSld>
+    <p:spTree>
+      <p:nvGrpSpPr>
+        <p:cNvPr id="1" name=""/>
+        <p:cNvGrpSpPr/>
+        <p:nvPr/>
+      </p:nvGrpSpPr>
+      <p:grpSpPr>
+        <a:xfrm>
+          <a:off x="0" y="0"/>
+          <a:ext cx="0" cy="0"/>
+          <a:chOff x="0" y="0"/>
+          <a:chExt cx="0" cy="0"/>
+        </a:xfrm>
+      </p:grpSpPr>
+      <p:sp>
+        <p:nvSpPr>
+          <p:cNvPr id="5" name="Заголовок 3">
+            <a:extLst>
+              <a:ext uri="{FF2B5EF4-FFF2-40B4-BE49-F238E27FC236}">
+                <a16:creationId xmlns:a16="http://schemas.microsoft.com/office/drawing/2014/main" id="{8259CF3A-AC4E-4FB4-B194-DC7CBFC75277}"/>
+              </a:ext>
+            </a:extLst>
+          </p:cNvPr>
+          <p:cNvSpPr txBox="1">
+            <a:spLocks/>
+          </p:cNvSpPr>
+          <p:nvPr/>
+        </p:nvSpPr>
+        <p:spPr>
+          <a:xfrm>
+            <a:off x="1589314" y="280536"/>
+            <a:ext cx="9013371" cy="1164869"/>
+          </a:xfrm>
+          <a:prstGeom prst="rect">
+            <a:avLst/>
+          </a:prstGeom>
+        </p:spPr>
+        <p:txBody>
+          <a:bodyPr vert="horz" lIns="91440" tIns="45720" rIns="91440" bIns="45720" rtlCol="0" anchor="b">
+            <a:normAutofit/>
+          </a:bodyPr>
+          <a:lstStyle>
+            <a:lvl1pPr algn="ctr" defTabSz="914400" rtl="0" eaLnBrk="1" latinLnBrk="0" hangingPunct="1">
+              <a:lnSpc>
+                <a:spcPct val="90000"/>
+              </a:lnSpc>
+              <a:spcBef>
+                <a:spcPct val="0"/>
+              </a:spcBef>
+              <a:buNone/>
+              <a:defRPr sz="6000" kern="1200">
+                <a:solidFill>
+                  <a:schemeClr val="tx1"/>
+                </a:solidFill>
+                <a:latin typeface="+mj-lt"/>
+                <a:ea typeface="+mj-ea"/>
+                <a:cs typeface="+mj-cs"/>
+              </a:defRPr>
+            </a:lvl1pPr>
+          </a:lstStyle>
+          <a:p>
+            <a:r>
+              <a:rPr lang="en-US" dirty="0"/>
+              <a:t>Nested loops continue</a:t>
+            </a:r>
+            <a:endParaRPr lang="ru-RU" dirty="0"/>
+          </a:p>
+        </p:txBody>
+      </p:sp>
+      <p:sp>
+        <p:nvSpPr>
+          <p:cNvPr id="4" name="TextBox 3">
+            <a:extLst>
+              <a:ext uri="{FF2B5EF4-FFF2-40B4-BE49-F238E27FC236}">
+                <a16:creationId xmlns:a16="http://schemas.microsoft.com/office/drawing/2014/main" id="{2F93C8BC-7BA4-4FE8-BB46-BEF95DD601ED}"/>
+              </a:ext>
+            </a:extLst>
+          </p:cNvPr>
+          <p:cNvSpPr txBox="1"/>
+          <p:nvPr/>
+        </p:nvSpPr>
+        <p:spPr>
+          <a:xfrm>
+            <a:off x="2235669" y="2305615"/>
+            <a:ext cx="3533340" cy="2677656"/>
+          </a:xfrm>
+          <a:prstGeom prst="rect">
+            <a:avLst/>
+          </a:prstGeom>
+          <a:noFill/>
+        </p:spPr>
+        <p:txBody>
+          <a:bodyPr wrap="none" rtlCol="0">
+            <a:spAutoFit/>
+          </a:bodyPr>
+          <a:lstStyle/>
+          <a:p>
+            <a:r>
+              <a:rPr lang="en-US" sz="2800" dirty="0">
+                <a:latin typeface="Times New Roman" panose="02020603050405020304" pitchFamily="18" charset="0"/>
+                <a:cs typeface="Times New Roman" panose="02020603050405020304" pitchFamily="18" charset="0"/>
+              </a:rPr>
+              <a:t>for (s11; s12; s13) {</a:t>
+            </a:r>
+          </a:p>
+          <a:p>
+            <a:pPr lvl="1"/>
+            <a:r>
+              <a:rPr lang="en-US" sz="2800" dirty="0">
+                <a:latin typeface="Times New Roman" panose="02020603050405020304" pitchFamily="18" charset="0"/>
+                <a:cs typeface="Times New Roman" panose="02020603050405020304" pitchFamily="18" charset="0"/>
+              </a:rPr>
+              <a:t>for (s21; s22; s23) {</a:t>
+            </a:r>
+          </a:p>
+          <a:p>
+            <a:pPr lvl="1"/>
+            <a:r>
+              <a:rPr lang="en-US" sz="2800" dirty="0">
+                <a:latin typeface="Times New Roman" panose="02020603050405020304" pitchFamily="18" charset="0"/>
+                <a:cs typeface="Times New Roman" panose="02020603050405020304" pitchFamily="18" charset="0"/>
+              </a:rPr>
+              <a:t>	if (e) continue;</a:t>
+            </a:r>
+          </a:p>
+          <a:p>
+            <a:pPr lvl="1"/>
+            <a:r>
+              <a:rPr lang="en-US" sz="2800" dirty="0">
+                <a:latin typeface="Times New Roman" panose="02020603050405020304" pitchFamily="18" charset="0"/>
+                <a:cs typeface="Times New Roman" panose="02020603050405020304" pitchFamily="18" charset="0"/>
+              </a:rPr>
+              <a:t>	…</a:t>
+            </a:r>
+          </a:p>
+          <a:p>
+            <a:pPr lvl="1"/>
+            <a:r>
+              <a:rPr lang="en-US" sz="2800" dirty="0">
+                <a:latin typeface="Times New Roman" panose="02020603050405020304" pitchFamily="18" charset="0"/>
+                <a:cs typeface="Times New Roman" panose="02020603050405020304" pitchFamily="18" charset="0"/>
+              </a:rPr>
+              <a:t>}</a:t>
+            </a:r>
+          </a:p>
+          <a:p>
+            <a:r>
+              <a:rPr lang="en-US" sz="2800" dirty="0">
+                <a:latin typeface="Times New Roman" panose="02020603050405020304" pitchFamily="18" charset="0"/>
+                <a:cs typeface="Times New Roman" panose="02020603050405020304" pitchFamily="18" charset="0"/>
+              </a:rPr>
+              <a:t>}</a:t>
+            </a:r>
+            <a:endParaRPr lang="ru-RU" sz="2800" dirty="0">
+              <a:latin typeface="Times New Roman" panose="02020603050405020304" pitchFamily="18" charset="0"/>
+              <a:cs typeface="Times New Roman" panose="02020603050405020304" pitchFamily="18" charset="0"/>
+            </a:endParaRPr>
+          </a:p>
+        </p:txBody>
+      </p:sp>
+      <p:sp>
+        <p:nvSpPr>
+          <p:cNvPr id="6" name="TextBox 5">
+            <a:extLst>
+              <a:ext uri="{FF2B5EF4-FFF2-40B4-BE49-F238E27FC236}">
+                <a16:creationId xmlns:a16="http://schemas.microsoft.com/office/drawing/2014/main" id="{E08198BF-A362-499A-9967-3E2C05782E96}"/>
+              </a:ext>
+            </a:extLst>
+          </p:cNvPr>
+          <p:cNvSpPr txBox="1"/>
+          <p:nvPr/>
+        </p:nvSpPr>
+        <p:spPr>
+          <a:xfrm>
+            <a:off x="6422993" y="2305614"/>
+            <a:ext cx="3889353" cy="2677656"/>
+          </a:xfrm>
+          <a:prstGeom prst="rect">
+            <a:avLst/>
+          </a:prstGeom>
+          <a:noFill/>
+        </p:spPr>
+        <p:txBody>
+          <a:bodyPr wrap="square">
+            <a:spAutoFit/>
+          </a:bodyPr>
+          <a:lstStyle/>
+          <a:p>
+            <a:r>
+              <a:rPr lang="en-US" sz="2800" dirty="0">
+                <a:latin typeface="Times New Roman" panose="02020603050405020304" pitchFamily="18" charset="0"/>
+                <a:cs typeface="Times New Roman" panose="02020603050405020304" pitchFamily="18" charset="0"/>
+              </a:rPr>
+              <a:t>for (s11; s12; s13) {</a:t>
+            </a:r>
+          </a:p>
+          <a:p>
+            <a:r>
+              <a:rPr lang="en-US" sz="2800" dirty="0">
+                <a:latin typeface="Times New Roman" panose="02020603050405020304" pitchFamily="18" charset="0"/>
+                <a:cs typeface="Times New Roman" panose="02020603050405020304" pitchFamily="18" charset="0"/>
+              </a:rPr>
+              <a:t>      if (e) continue;</a:t>
+            </a:r>
+          </a:p>
+          <a:p>
+            <a:pPr lvl="1"/>
+            <a:r>
+              <a:rPr lang="en-US" sz="2800" dirty="0">
+                <a:latin typeface="Times New Roman" panose="02020603050405020304" pitchFamily="18" charset="0"/>
+                <a:cs typeface="Times New Roman" panose="02020603050405020304" pitchFamily="18" charset="0"/>
+              </a:rPr>
+              <a:t>for (s21; s22; s23) {</a:t>
+            </a:r>
+          </a:p>
+          <a:p>
+            <a:pPr lvl="1"/>
+            <a:r>
+              <a:rPr lang="en-US" sz="2800" dirty="0">
+                <a:latin typeface="Times New Roman" panose="02020603050405020304" pitchFamily="18" charset="0"/>
+                <a:cs typeface="Times New Roman" panose="02020603050405020304" pitchFamily="18" charset="0"/>
+              </a:rPr>
+              <a:t>	…</a:t>
+            </a:r>
+          </a:p>
+          <a:p>
+            <a:pPr lvl="1"/>
+            <a:r>
+              <a:rPr lang="en-US" sz="2800" dirty="0">
+                <a:latin typeface="Times New Roman" panose="02020603050405020304" pitchFamily="18" charset="0"/>
+                <a:cs typeface="Times New Roman" panose="02020603050405020304" pitchFamily="18" charset="0"/>
+              </a:rPr>
+              <a:t>}</a:t>
+            </a:r>
+          </a:p>
+          <a:p>
+            <a:r>
+              <a:rPr lang="en-US" sz="2800" dirty="0">
+                <a:latin typeface="Times New Roman" panose="02020603050405020304" pitchFamily="18" charset="0"/>
+                <a:cs typeface="Times New Roman" panose="02020603050405020304" pitchFamily="18" charset="0"/>
+              </a:rPr>
+              <a:t>}</a:t>
+            </a:r>
+            <a:endParaRPr lang="ru-RU" sz="2800" dirty="0">
+              <a:latin typeface="Times New Roman" panose="02020603050405020304" pitchFamily="18" charset="0"/>
+              <a:cs typeface="Times New Roman" panose="02020603050405020304" pitchFamily="18" charset="0"/>
+            </a:endParaRPr>
+          </a:p>
+        </p:txBody>
+      </p:sp>
+    </p:spTree>
+    <p:extLst>
+      <p:ext uri="{BB962C8B-B14F-4D97-AF65-F5344CB8AC3E}">
+        <p14:creationId xmlns:p14="http://schemas.microsoft.com/office/powerpoint/2010/main" val="4057813941"/>
+      </p:ext>
+    </p:extLst>
+  </p:cSld>
+  <p:clrMapOvr>
+    <a:masterClrMapping/>
+  </p:clrMapOvr>
+</p:sld>
+</file>
+
+<file path=ppt/slides/slide15.xml><?xml version="1.0" encoding="utf-8"?>
+<p:sld xmlns:a="http://schemas.openxmlformats.org/drawingml/2006/main" xmlns:r="http://schemas.openxmlformats.org/officeDocument/2006/relationships" xmlns:p="http://schemas.openxmlformats.org/presentationml/2006/main">
+  <p:cSld>
+    <p:spTree>
+      <p:nvGrpSpPr>
+        <p:cNvPr id="1" name=""/>
+        <p:cNvGrpSpPr/>
+        <p:nvPr/>
+      </p:nvGrpSpPr>
+      <p:grpSpPr>
+        <a:xfrm>
+          <a:off x="0" y="0"/>
+          <a:ext cx="0" cy="0"/>
+          <a:chOff x="0" y="0"/>
+          <a:chExt cx="0" cy="0"/>
+        </a:xfrm>
+      </p:grpSpPr>
+      <p:sp>
+        <p:nvSpPr>
+          <p:cNvPr id="5" name="Заголовок 3">
+            <a:extLst>
+              <a:ext uri="{FF2B5EF4-FFF2-40B4-BE49-F238E27FC236}">
+                <a16:creationId xmlns:a16="http://schemas.microsoft.com/office/drawing/2014/main" id="{8259CF3A-AC4E-4FB4-B194-DC7CBFC75277}"/>
+              </a:ext>
+            </a:extLst>
+          </p:cNvPr>
+          <p:cNvSpPr txBox="1">
+            <a:spLocks/>
+          </p:cNvSpPr>
+          <p:nvPr/>
+        </p:nvSpPr>
+        <p:spPr>
+          <a:xfrm>
+            <a:off x="2100446" y="291003"/>
+            <a:ext cx="9013371" cy="1164869"/>
+          </a:xfrm>
+          <a:prstGeom prst="rect">
+            <a:avLst/>
+          </a:prstGeom>
+        </p:spPr>
+        <p:txBody>
+          <a:bodyPr vert="horz" lIns="91440" tIns="45720" rIns="91440" bIns="45720" rtlCol="0" anchor="b">
+            <a:normAutofit/>
+          </a:bodyPr>
+          <a:lstStyle>
+            <a:lvl1pPr algn="ctr" defTabSz="914400" rtl="0" eaLnBrk="1" latinLnBrk="0" hangingPunct="1">
+              <a:lnSpc>
+                <a:spcPct val="90000"/>
+              </a:lnSpc>
+              <a:spcBef>
+                <a:spcPct val="0"/>
+              </a:spcBef>
+              <a:buNone/>
+              <a:defRPr sz="6000" kern="1200">
+                <a:solidFill>
+                  <a:schemeClr val="tx1"/>
+                </a:solidFill>
+                <a:latin typeface="+mj-lt"/>
+                <a:ea typeface="+mj-ea"/>
+                <a:cs typeface="+mj-cs"/>
+              </a:defRPr>
+            </a:lvl1pPr>
+          </a:lstStyle>
+          <a:p>
+            <a:r>
+              <a:rPr lang="en-US" dirty="0"/>
+              <a:t>for loop optimization</a:t>
             </a:r>
             <a:endParaRPr lang="ru-RU" dirty="0"/>
           </a:p>
@@ -5379,8 +6425,8 @@
         </p:nvSpPr>
         <p:spPr>
           <a:xfrm>
-            <a:off x="2614031" y="1471084"/>
-            <a:ext cx="5062116" cy="4524315"/>
+            <a:off x="3758023" y="2148820"/>
+            <a:ext cx="5698216" cy="2862322"/>
           </a:xfrm>
           <a:prstGeom prst="rect">
             <a:avLst/>
@@ -5398,34 +6444,49 @@
                 <a:latin typeface="Times New Roman" panose="02020603050405020304" pitchFamily="18" charset="0"/>
                 <a:cs typeface="Times New Roman" panose="02020603050405020304" pitchFamily="18" charset="0"/>
               </a:rPr>
-              <a:t>1. for (s1; s2; s3) { … }</a:t>
-            </a:r>
-          </a:p>
-          <a:p>
+              <a:t>for (</a:t>
+            </a:r>
+            <a:r>
+              <a:rPr lang="en-US" sz="3600" dirty="0" err="1">
+                <a:latin typeface="Times New Roman" panose="02020603050405020304" pitchFamily="18" charset="0"/>
+                <a:cs typeface="Times New Roman" panose="02020603050405020304" pitchFamily="18" charset="0"/>
+              </a:rPr>
+              <a:t>i</a:t>
+            </a:r>
             <a:r>
               <a:rPr lang="en-US" sz="3600" dirty="0">
                 <a:latin typeface="Times New Roman" panose="02020603050405020304" pitchFamily="18" charset="0"/>
                 <a:cs typeface="Times New Roman" panose="02020603050405020304" pitchFamily="18" charset="0"/>
               </a:rPr>
-              <a:t>2. for (; s2; s3) { … }</a:t>
-            </a:r>
-          </a:p>
-          <a:p>
+              <a:t> = 1; </a:t>
+            </a:r>
+            <a:r>
+              <a:rPr lang="en-US" sz="3600" dirty="0" err="1">
+                <a:latin typeface="Times New Roman" panose="02020603050405020304" pitchFamily="18" charset="0"/>
+                <a:cs typeface="Times New Roman" panose="02020603050405020304" pitchFamily="18" charset="0"/>
+              </a:rPr>
+              <a:t>i</a:t>
+            </a:r>
             <a:r>
               <a:rPr lang="en-US" sz="3600" dirty="0">
                 <a:latin typeface="Times New Roman" panose="02020603050405020304" pitchFamily="18" charset="0"/>
                 <a:cs typeface="Times New Roman" panose="02020603050405020304" pitchFamily="18" charset="0"/>
               </a:rPr>
-              <a:t>3. for (s1;; s3) { … }</a:t>
-            </a:r>
-          </a:p>
-          <a:p>
+              <a:t> &lt;= 10; </a:t>
+            </a:r>
+            <a:r>
+              <a:rPr lang="en-US" sz="3600" dirty="0" err="1">
+                <a:latin typeface="Times New Roman" panose="02020603050405020304" pitchFamily="18" charset="0"/>
+                <a:cs typeface="Times New Roman" panose="02020603050405020304" pitchFamily="18" charset="0"/>
+              </a:rPr>
+              <a:t>i</a:t>
+            </a:r>
             <a:r>
               <a:rPr lang="en-US" sz="3600" dirty="0">
                 <a:latin typeface="Times New Roman" panose="02020603050405020304" pitchFamily="18" charset="0"/>
                 <a:cs typeface="Times New Roman" panose="02020603050405020304" pitchFamily="18" charset="0"/>
               </a:rPr>
-              <a:t>4. for (s1; s2;) { … }</a:t>
+              <a:t>++) {</a:t>
             </a:r>
           </a:p>
           <a:p>
@@ -5434,16 +6495,21 @@
                 <a:latin typeface="Times New Roman" panose="02020603050405020304" pitchFamily="18" charset="0"/>
                 <a:cs typeface="Times New Roman" panose="02020603050405020304" pitchFamily="18" charset="0"/>
               </a:rPr>
-              <a:t>5. for (; s2;) { … }</a:t>
-            </a:r>
-          </a:p>
-          <a:p>
+              <a:t>	a = a + </a:t>
+            </a:r>
+            <a:r>
+              <a:rPr lang="en-US" sz="3600" dirty="0" err="1">
+                <a:latin typeface="Times New Roman" panose="02020603050405020304" pitchFamily="18" charset="0"/>
+                <a:cs typeface="Times New Roman" panose="02020603050405020304" pitchFamily="18" charset="0"/>
+              </a:rPr>
+              <a:t>i</a:t>
+            </a:r>
             <a:r>
               <a:rPr lang="en-US" sz="3600" dirty="0">
                 <a:latin typeface="Times New Roman" panose="02020603050405020304" pitchFamily="18" charset="0"/>
                 <a:cs typeface="Times New Roman" panose="02020603050405020304" pitchFamily="18" charset="0"/>
               </a:rPr>
-              <a:t>6. for (s1;;) { … }</a:t>
+              <a:t>;</a:t>
             </a:r>
           </a:p>
           <a:p>
@@ -5452,105 +6518,34 @@
                 <a:latin typeface="Times New Roman" panose="02020603050405020304" pitchFamily="18" charset="0"/>
                 <a:cs typeface="Times New Roman" panose="02020603050405020304" pitchFamily="18" charset="0"/>
               </a:rPr>
-              <a:t>7. for (;; s3) { … }</a:t>
-            </a:r>
-          </a:p>
-          <a:p>
-            <a:r>
-              <a:rPr lang="en-US" sz="3600" dirty="0">
-                <a:latin typeface="Times New Roman" panose="02020603050405020304" pitchFamily="18" charset="0"/>
-                <a:cs typeface="Times New Roman" panose="02020603050405020304" pitchFamily="18" charset="0"/>
-              </a:rPr>
-              <a:t>8. for (;;) { … }</a:t>
-            </a:r>
-          </a:p>
-        </p:txBody>
-      </p:sp>
-      <p:sp>
-        <p:nvSpPr>
-          <p:cNvPr id="6" name="TextBox 5">
-            <a:extLst>
-              <a:ext uri="{FF2B5EF4-FFF2-40B4-BE49-F238E27FC236}">
-                <a16:creationId xmlns:a16="http://schemas.microsoft.com/office/drawing/2014/main" id="{C07549F0-9565-4774-A926-77A2175CFE71}"/>
-              </a:ext>
-            </a:extLst>
-          </p:cNvPr>
-          <p:cNvSpPr txBox="1"/>
-          <p:nvPr/>
-        </p:nvSpPr>
-        <p:spPr>
-          <a:xfrm>
-            <a:off x="6826749" y="4610404"/>
-            <a:ext cx="4333032" cy="1384995"/>
-          </a:xfrm>
-          <a:prstGeom prst="rect">
-            <a:avLst/>
-          </a:prstGeom>
-          <a:noFill/>
-        </p:spPr>
-        <p:txBody>
-          <a:bodyPr wrap="square">
-            <a:spAutoFit/>
-          </a:bodyPr>
-          <a:lstStyle/>
-          <a:p>
-            <a:r>
-              <a:rPr lang="en-US" sz="2800" dirty="0">
-                <a:latin typeface="Times New Roman" panose="02020603050405020304" pitchFamily="18" charset="0"/>
-                <a:cs typeface="Times New Roman" panose="02020603050405020304" pitchFamily="18" charset="0"/>
-              </a:rPr>
-              <a:t>s1 </a:t>
-            </a:r>
-            <a:r>
-              <a:rPr lang="ru-RU" sz="2800" dirty="0">
-                <a:latin typeface="Times New Roman" panose="02020603050405020304" pitchFamily="18" charset="0"/>
-                <a:cs typeface="Times New Roman" panose="02020603050405020304" pitchFamily="18" charset="0"/>
-              </a:rPr>
-              <a:t>– блок инициализации</a:t>
-            </a:r>
-          </a:p>
-          <a:p>
-            <a:r>
-              <a:rPr lang="en-US" sz="2800" dirty="0">
-                <a:latin typeface="Times New Roman" panose="02020603050405020304" pitchFamily="18" charset="0"/>
-                <a:cs typeface="Times New Roman" panose="02020603050405020304" pitchFamily="18" charset="0"/>
-              </a:rPr>
-              <a:t>s2 – </a:t>
-            </a:r>
-            <a:r>
-              <a:rPr lang="ru-RU" sz="2800" dirty="0">
-                <a:latin typeface="Times New Roman" panose="02020603050405020304" pitchFamily="18" charset="0"/>
-                <a:cs typeface="Times New Roman" panose="02020603050405020304" pitchFamily="18" charset="0"/>
-              </a:rPr>
-              <a:t>логическое выражение</a:t>
-            </a:r>
-          </a:p>
-          <a:p>
-            <a:r>
-              <a:rPr lang="en-US" sz="2800" dirty="0">
-                <a:latin typeface="Times New Roman" panose="02020603050405020304" pitchFamily="18" charset="0"/>
-                <a:cs typeface="Times New Roman" panose="02020603050405020304" pitchFamily="18" charset="0"/>
-              </a:rPr>
-              <a:t>s3 – </a:t>
-            </a:r>
-            <a:r>
-              <a:rPr lang="ru-RU" sz="2800" dirty="0">
-                <a:latin typeface="Times New Roman" panose="02020603050405020304" pitchFamily="18" charset="0"/>
-                <a:cs typeface="Times New Roman" panose="02020603050405020304" pitchFamily="18" charset="0"/>
-              </a:rPr>
-              <a:t>шаг цикла</a:t>
-            </a:r>
-            <a:endParaRPr lang="en-US" sz="2800" dirty="0">
+              <a:t>}</a:t>
+            </a:r>
+          </a:p>
+          <a:p>
+            <a:endParaRPr lang="en-US" sz="3600" dirty="0">
               <a:latin typeface="Times New Roman" panose="02020603050405020304" pitchFamily="18" charset="0"/>
               <a:cs typeface="Times New Roman" panose="02020603050405020304" pitchFamily="18" charset="0"/>
             </a:endParaRPr>
           </a:p>
+          <a:p>
+            <a:r>
+              <a:rPr lang="ru-RU" sz="3600" dirty="0">
+                <a:latin typeface="Times New Roman" panose="02020603050405020304" pitchFamily="18" charset="0"/>
+                <a:cs typeface="Times New Roman" panose="02020603050405020304" pitchFamily="18" charset="0"/>
+              </a:rPr>
+              <a:t>Количество инструкций ?</a:t>
+            </a:r>
+            <a:endParaRPr lang="en-US" sz="3600" dirty="0">
+              <a:latin typeface="Times New Roman" panose="02020603050405020304" pitchFamily="18" charset="0"/>
+              <a:cs typeface="Times New Roman" panose="02020603050405020304" pitchFamily="18" charset="0"/>
+            </a:endParaRPr>
+          </a:p>
         </p:txBody>
       </p:sp>
     </p:spTree>
     <p:extLst>
       <p:ext uri="{BB962C8B-B14F-4D97-AF65-F5344CB8AC3E}">
-        <p14:creationId xmlns:p14="http://schemas.microsoft.com/office/powerpoint/2010/main" val="2250868878"/>
+        <p14:creationId xmlns:p14="http://schemas.microsoft.com/office/powerpoint/2010/main" val="2673484223"/>
       </p:ext>
     </p:extLst>
   </p:cSld>
@@ -5560,7 +6555,1102 @@
 </p:sld>
 </file>
 
-<file path=ppt/slides/slide13.xml><?xml version="1.0" encoding="utf-8"?>
+<file path=ppt/slides/slide16.xml><?xml version="1.0" encoding="utf-8"?>
+<p:sld xmlns:a="http://schemas.openxmlformats.org/drawingml/2006/main" xmlns:r="http://schemas.openxmlformats.org/officeDocument/2006/relationships" xmlns:p="http://schemas.openxmlformats.org/presentationml/2006/main">
+  <p:cSld>
+    <p:spTree>
+      <p:nvGrpSpPr>
+        <p:cNvPr id="1" name=""/>
+        <p:cNvGrpSpPr/>
+        <p:nvPr/>
+      </p:nvGrpSpPr>
+      <p:grpSpPr>
+        <a:xfrm>
+          <a:off x="0" y="0"/>
+          <a:ext cx="0" cy="0"/>
+          <a:chOff x="0" y="0"/>
+          <a:chExt cx="0" cy="0"/>
+        </a:xfrm>
+      </p:grpSpPr>
+      <p:sp>
+        <p:nvSpPr>
+          <p:cNvPr id="5" name="Заголовок 3">
+            <a:extLst>
+              <a:ext uri="{FF2B5EF4-FFF2-40B4-BE49-F238E27FC236}">
+                <a16:creationId xmlns:a16="http://schemas.microsoft.com/office/drawing/2014/main" id="{8259CF3A-AC4E-4FB4-B194-DC7CBFC75277}"/>
+              </a:ext>
+            </a:extLst>
+          </p:cNvPr>
+          <p:cNvSpPr txBox="1">
+            <a:spLocks/>
+          </p:cNvSpPr>
+          <p:nvPr/>
+        </p:nvSpPr>
+        <p:spPr>
+          <a:xfrm>
+            <a:off x="2100446" y="291003"/>
+            <a:ext cx="9013371" cy="1164869"/>
+          </a:xfrm>
+          <a:prstGeom prst="rect">
+            <a:avLst/>
+          </a:prstGeom>
+        </p:spPr>
+        <p:txBody>
+          <a:bodyPr vert="horz" lIns="91440" tIns="45720" rIns="91440" bIns="45720" rtlCol="0" anchor="b">
+            <a:normAutofit/>
+          </a:bodyPr>
+          <a:lstStyle>
+            <a:lvl1pPr algn="ctr" defTabSz="914400" rtl="0" eaLnBrk="1" latinLnBrk="0" hangingPunct="1">
+              <a:lnSpc>
+                <a:spcPct val="90000"/>
+              </a:lnSpc>
+              <a:spcBef>
+                <a:spcPct val="0"/>
+              </a:spcBef>
+              <a:buNone/>
+              <a:defRPr sz="6000" kern="1200">
+                <a:solidFill>
+                  <a:schemeClr val="tx1"/>
+                </a:solidFill>
+                <a:latin typeface="+mj-lt"/>
+                <a:ea typeface="+mj-ea"/>
+                <a:cs typeface="+mj-cs"/>
+              </a:defRPr>
+            </a:lvl1pPr>
+          </a:lstStyle>
+          <a:p>
+            <a:r>
+              <a:rPr lang="en-US" dirty="0"/>
+              <a:t>for loop optimization</a:t>
+            </a:r>
+            <a:endParaRPr lang="ru-RU" dirty="0"/>
+          </a:p>
+        </p:txBody>
+      </p:sp>
+      <p:sp>
+        <p:nvSpPr>
+          <p:cNvPr id="22" name="TextBox 21">
+            <a:extLst>
+              <a:ext uri="{FF2B5EF4-FFF2-40B4-BE49-F238E27FC236}">
+                <a16:creationId xmlns:a16="http://schemas.microsoft.com/office/drawing/2014/main" id="{AC3AFFEF-CF25-45AC-90A7-920955B7E9DE}"/>
+              </a:ext>
+            </a:extLst>
+          </p:cNvPr>
+          <p:cNvSpPr txBox="1"/>
+          <p:nvPr/>
+        </p:nvSpPr>
+        <p:spPr>
+          <a:xfrm>
+            <a:off x="3420559" y="1669549"/>
+            <a:ext cx="6373143" cy="4524315"/>
+          </a:xfrm>
+          <a:prstGeom prst="rect">
+            <a:avLst/>
+          </a:prstGeom>
+          <a:noFill/>
+        </p:spPr>
+        <p:txBody>
+          <a:bodyPr wrap="square">
+            <a:spAutoFit/>
+          </a:bodyPr>
+          <a:lstStyle/>
+          <a:p>
+            <a:r>
+              <a:rPr lang="en-US" sz="3600" dirty="0">
+                <a:latin typeface="Times New Roman" panose="02020603050405020304" pitchFamily="18" charset="0"/>
+                <a:cs typeface="Times New Roman" panose="02020603050405020304" pitchFamily="18" charset="0"/>
+              </a:rPr>
+              <a:t>for (</a:t>
+            </a:r>
+            <a:r>
+              <a:rPr lang="en-US" sz="3600" dirty="0" err="1">
+                <a:latin typeface="Times New Roman" panose="02020603050405020304" pitchFamily="18" charset="0"/>
+                <a:cs typeface="Times New Roman" panose="02020603050405020304" pitchFamily="18" charset="0"/>
+              </a:rPr>
+              <a:t>i</a:t>
+            </a:r>
+            <a:r>
+              <a:rPr lang="en-US" sz="3600" dirty="0">
+                <a:latin typeface="Times New Roman" panose="02020603050405020304" pitchFamily="18" charset="0"/>
+                <a:cs typeface="Times New Roman" panose="02020603050405020304" pitchFamily="18" charset="0"/>
+              </a:rPr>
+              <a:t> = 1; </a:t>
+            </a:r>
+            <a:r>
+              <a:rPr lang="en-US" sz="3600" dirty="0" err="1">
+                <a:latin typeface="Times New Roman" panose="02020603050405020304" pitchFamily="18" charset="0"/>
+                <a:cs typeface="Times New Roman" panose="02020603050405020304" pitchFamily="18" charset="0"/>
+              </a:rPr>
+              <a:t>i</a:t>
+            </a:r>
+            <a:r>
+              <a:rPr lang="en-US" sz="3600" dirty="0">
+                <a:latin typeface="Times New Roman" panose="02020603050405020304" pitchFamily="18" charset="0"/>
+                <a:cs typeface="Times New Roman" panose="02020603050405020304" pitchFamily="18" charset="0"/>
+              </a:rPr>
+              <a:t> &lt;= 10; </a:t>
+            </a:r>
+            <a:r>
+              <a:rPr lang="en-US" sz="3600" dirty="0" err="1">
+                <a:latin typeface="Times New Roman" panose="02020603050405020304" pitchFamily="18" charset="0"/>
+                <a:cs typeface="Times New Roman" panose="02020603050405020304" pitchFamily="18" charset="0"/>
+              </a:rPr>
+              <a:t>i</a:t>
+            </a:r>
+            <a:r>
+              <a:rPr lang="en-US" sz="3600" dirty="0">
+                <a:latin typeface="Times New Roman" panose="02020603050405020304" pitchFamily="18" charset="0"/>
+                <a:cs typeface="Times New Roman" panose="02020603050405020304" pitchFamily="18" charset="0"/>
+              </a:rPr>
+              <a:t>++) {</a:t>
+            </a:r>
+          </a:p>
+          <a:p>
+            <a:r>
+              <a:rPr lang="en-US" sz="3600" dirty="0">
+                <a:latin typeface="Times New Roman" panose="02020603050405020304" pitchFamily="18" charset="0"/>
+                <a:cs typeface="Times New Roman" panose="02020603050405020304" pitchFamily="18" charset="0"/>
+              </a:rPr>
+              <a:t>	a = a + </a:t>
+            </a:r>
+            <a:r>
+              <a:rPr lang="en-US" sz="3600" dirty="0" err="1">
+                <a:latin typeface="Times New Roman" panose="02020603050405020304" pitchFamily="18" charset="0"/>
+                <a:cs typeface="Times New Roman" panose="02020603050405020304" pitchFamily="18" charset="0"/>
+              </a:rPr>
+              <a:t>i</a:t>
+            </a:r>
+            <a:r>
+              <a:rPr lang="en-US" sz="3600" dirty="0">
+                <a:latin typeface="Times New Roman" panose="02020603050405020304" pitchFamily="18" charset="0"/>
+                <a:cs typeface="Times New Roman" panose="02020603050405020304" pitchFamily="18" charset="0"/>
+              </a:rPr>
+              <a:t>;</a:t>
+            </a:r>
+          </a:p>
+          <a:p>
+            <a:r>
+              <a:rPr lang="en-US" sz="3600" dirty="0">
+                <a:latin typeface="Times New Roman" panose="02020603050405020304" pitchFamily="18" charset="0"/>
+                <a:cs typeface="Times New Roman" panose="02020603050405020304" pitchFamily="18" charset="0"/>
+              </a:rPr>
+              <a:t>}</a:t>
+            </a:r>
+          </a:p>
+          <a:p>
+            <a:r>
+              <a:rPr lang="ru-RU" sz="3600" dirty="0">
+                <a:latin typeface="Times New Roman" panose="02020603050405020304" pitchFamily="18" charset="0"/>
+                <a:cs typeface="Times New Roman" panose="02020603050405020304" pitchFamily="18" charset="0"/>
+              </a:rPr>
+              <a:t>Всего инструкций</a:t>
+            </a:r>
+            <a:r>
+              <a:rPr lang="en-US" sz="3600" dirty="0">
+                <a:latin typeface="Times New Roman" panose="02020603050405020304" pitchFamily="18" charset="0"/>
+                <a:cs typeface="Times New Roman" panose="02020603050405020304" pitchFamily="18" charset="0"/>
+              </a:rPr>
+              <a:t>: 3</a:t>
+            </a:r>
+            <a:r>
+              <a:rPr lang="ru-RU" sz="3600" dirty="0">
+                <a:latin typeface="Times New Roman" panose="02020603050405020304" pitchFamily="18" charset="0"/>
+                <a:cs typeface="Times New Roman" panose="02020603050405020304" pitchFamily="18" charset="0"/>
+              </a:rPr>
+              <a:t>2 </a:t>
+            </a:r>
+            <a:endParaRPr lang="en-US" sz="3600" dirty="0">
+              <a:latin typeface="Times New Roman" panose="02020603050405020304" pitchFamily="18" charset="0"/>
+              <a:cs typeface="Times New Roman" panose="02020603050405020304" pitchFamily="18" charset="0"/>
+            </a:endParaRPr>
+          </a:p>
+          <a:p>
+            <a:r>
+              <a:rPr lang="en-US" sz="3600" dirty="0" err="1">
+                <a:latin typeface="Times New Roman" panose="02020603050405020304" pitchFamily="18" charset="0"/>
+                <a:cs typeface="Times New Roman" panose="02020603050405020304" pitchFamily="18" charset="0"/>
+              </a:rPr>
+              <a:t>i</a:t>
+            </a:r>
+            <a:r>
+              <a:rPr lang="en-US" sz="3600" dirty="0">
+                <a:latin typeface="Times New Roman" panose="02020603050405020304" pitchFamily="18" charset="0"/>
+                <a:cs typeface="Times New Roman" panose="02020603050405020304" pitchFamily="18" charset="0"/>
+              </a:rPr>
+              <a:t> = 1:        	1</a:t>
+            </a:r>
+          </a:p>
+          <a:p>
+            <a:r>
+              <a:rPr lang="en-US" sz="3600" dirty="0" err="1">
+                <a:latin typeface="Times New Roman" panose="02020603050405020304" pitchFamily="18" charset="0"/>
+                <a:cs typeface="Times New Roman" panose="02020603050405020304" pitchFamily="18" charset="0"/>
+              </a:rPr>
+              <a:t>i</a:t>
+            </a:r>
+            <a:r>
+              <a:rPr lang="en-US" sz="3600" dirty="0">
+                <a:latin typeface="Times New Roman" panose="02020603050405020304" pitchFamily="18" charset="0"/>
+                <a:cs typeface="Times New Roman" panose="02020603050405020304" pitchFamily="18" charset="0"/>
+              </a:rPr>
+              <a:t> &lt;= 10:    	11 </a:t>
+            </a:r>
+          </a:p>
+          <a:p>
+            <a:r>
+              <a:rPr lang="en-US" sz="3600" dirty="0" err="1">
+                <a:latin typeface="Times New Roman" panose="02020603050405020304" pitchFamily="18" charset="0"/>
+                <a:cs typeface="Times New Roman" panose="02020603050405020304" pitchFamily="18" charset="0"/>
+              </a:rPr>
+              <a:t>i</a:t>
+            </a:r>
+            <a:r>
+              <a:rPr lang="en-US" sz="3600" dirty="0">
+                <a:latin typeface="Times New Roman" panose="02020603050405020304" pitchFamily="18" charset="0"/>
+                <a:cs typeface="Times New Roman" panose="02020603050405020304" pitchFamily="18" charset="0"/>
+              </a:rPr>
+              <a:t>++:          	10</a:t>
+            </a:r>
+          </a:p>
+          <a:p>
+            <a:r>
+              <a:rPr lang="en-US" sz="3600" dirty="0">
+                <a:latin typeface="Times New Roman" panose="02020603050405020304" pitchFamily="18" charset="0"/>
+                <a:cs typeface="Times New Roman" panose="02020603050405020304" pitchFamily="18" charset="0"/>
+              </a:rPr>
+              <a:t>a=</a:t>
+            </a:r>
+            <a:r>
+              <a:rPr lang="en-US" sz="3600" dirty="0" err="1">
+                <a:latin typeface="Times New Roman" panose="02020603050405020304" pitchFamily="18" charset="0"/>
+                <a:cs typeface="Times New Roman" panose="02020603050405020304" pitchFamily="18" charset="0"/>
+              </a:rPr>
+              <a:t>a+i</a:t>
+            </a:r>
+            <a:r>
+              <a:rPr lang="en-US" sz="3600" dirty="0">
+                <a:latin typeface="Times New Roman" panose="02020603050405020304" pitchFamily="18" charset="0"/>
+                <a:cs typeface="Times New Roman" panose="02020603050405020304" pitchFamily="18" charset="0"/>
+              </a:rPr>
+              <a:t>:      	10</a:t>
+            </a:r>
+          </a:p>
+        </p:txBody>
+      </p:sp>
+    </p:spTree>
+    <p:extLst>
+      <p:ext uri="{BB962C8B-B14F-4D97-AF65-F5344CB8AC3E}">
+        <p14:creationId xmlns:p14="http://schemas.microsoft.com/office/powerpoint/2010/main" val="587380483"/>
+      </p:ext>
+    </p:extLst>
+  </p:cSld>
+  <p:clrMapOvr>
+    <a:masterClrMapping/>
+  </p:clrMapOvr>
+</p:sld>
+</file>
+
+<file path=ppt/slides/slide17.xml><?xml version="1.0" encoding="utf-8"?>
+<p:sld xmlns:a="http://schemas.openxmlformats.org/drawingml/2006/main" xmlns:r="http://schemas.openxmlformats.org/officeDocument/2006/relationships" xmlns:p="http://schemas.openxmlformats.org/presentationml/2006/main">
+  <p:cSld>
+    <p:spTree>
+      <p:nvGrpSpPr>
+        <p:cNvPr id="1" name=""/>
+        <p:cNvGrpSpPr/>
+        <p:nvPr/>
+      </p:nvGrpSpPr>
+      <p:grpSpPr>
+        <a:xfrm>
+          <a:off x="0" y="0"/>
+          <a:ext cx="0" cy="0"/>
+          <a:chOff x="0" y="0"/>
+          <a:chExt cx="0" cy="0"/>
+        </a:xfrm>
+      </p:grpSpPr>
+      <p:sp>
+        <p:nvSpPr>
+          <p:cNvPr id="5" name="Заголовок 3">
+            <a:extLst>
+              <a:ext uri="{FF2B5EF4-FFF2-40B4-BE49-F238E27FC236}">
+                <a16:creationId xmlns:a16="http://schemas.microsoft.com/office/drawing/2014/main" id="{8259CF3A-AC4E-4FB4-B194-DC7CBFC75277}"/>
+              </a:ext>
+            </a:extLst>
+          </p:cNvPr>
+          <p:cNvSpPr txBox="1">
+            <a:spLocks/>
+          </p:cNvSpPr>
+          <p:nvPr/>
+        </p:nvSpPr>
+        <p:spPr>
+          <a:xfrm>
+            <a:off x="1871846" y="563537"/>
+            <a:ext cx="9013371" cy="1164869"/>
+          </a:xfrm>
+          <a:prstGeom prst="rect">
+            <a:avLst/>
+          </a:prstGeom>
+        </p:spPr>
+        <p:txBody>
+          <a:bodyPr vert="horz" lIns="91440" tIns="45720" rIns="91440" bIns="45720" rtlCol="0" anchor="b">
+            <a:normAutofit/>
+          </a:bodyPr>
+          <a:lstStyle>
+            <a:lvl1pPr algn="ctr" defTabSz="914400" rtl="0" eaLnBrk="1" latinLnBrk="0" hangingPunct="1">
+              <a:lnSpc>
+                <a:spcPct val="90000"/>
+              </a:lnSpc>
+              <a:spcBef>
+                <a:spcPct val="0"/>
+              </a:spcBef>
+              <a:buNone/>
+              <a:defRPr sz="6000" kern="1200">
+                <a:solidFill>
+                  <a:schemeClr val="tx1"/>
+                </a:solidFill>
+                <a:latin typeface="+mj-lt"/>
+                <a:ea typeface="+mj-ea"/>
+                <a:cs typeface="+mj-cs"/>
+              </a:defRPr>
+            </a:lvl1pPr>
+          </a:lstStyle>
+          <a:p>
+            <a:r>
+              <a:rPr lang="en-US" dirty="0"/>
+              <a:t>for loop unroll</a:t>
+            </a:r>
+            <a:endParaRPr lang="ru-RU" dirty="0"/>
+          </a:p>
+        </p:txBody>
+      </p:sp>
+      <p:sp>
+        <p:nvSpPr>
+          <p:cNvPr id="22" name="TextBox 21">
+            <a:extLst>
+              <a:ext uri="{FF2B5EF4-FFF2-40B4-BE49-F238E27FC236}">
+                <a16:creationId xmlns:a16="http://schemas.microsoft.com/office/drawing/2014/main" id="{AC3AFFEF-CF25-45AC-90A7-920955B7E9DE}"/>
+              </a:ext>
+            </a:extLst>
+          </p:cNvPr>
+          <p:cNvSpPr txBox="1"/>
+          <p:nvPr/>
+        </p:nvSpPr>
+        <p:spPr>
+          <a:xfrm>
+            <a:off x="1539395" y="2214954"/>
+            <a:ext cx="4448321" cy="3539430"/>
+          </a:xfrm>
+          <a:prstGeom prst="rect">
+            <a:avLst/>
+          </a:prstGeom>
+          <a:noFill/>
+        </p:spPr>
+        <p:txBody>
+          <a:bodyPr wrap="square">
+            <a:spAutoFit/>
+          </a:bodyPr>
+          <a:lstStyle/>
+          <a:p>
+            <a:r>
+              <a:rPr lang="en-US" sz="3200" dirty="0">
+                <a:latin typeface="Times New Roman" panose="02020603050405020304" pitchFamily="18" charset="0"/>
+                <a:cs typeface="Times New Roman" panose="02020603050405020304" pitchFamily="18" charset="0"/>
+              </a:rPr>
+              <a:t>for (</a:t>
+            </a:r>
+            <a:r>
+              <a:rPr lang="en-US" sz="3200" dirty="0" err="1">
+                <a:latin typeface="Times New Roman" panose="02020603050405020304" pitchFamily="18" charset="0"/>
+                <a:cs typeface="Times New Roman" panose="02020603050405020304" pitchFamily="18" charset="0"/>
+              </a:rPr>
+              <a:t>i</a:t>
+            </a:r>
+            <a:r>
+              <a:rPr lang="en-US" sz="3200" dirty="0">
+                <a:latin typeface="Times New Roman" panose="02020603050405020304" pitchFamily="18" charset="0"/>
+                <a:cs typeface="Times New Roman" panose="02020603050405020304" pitchFamily="18" charset="0"/>
+              </a:rPr>
+              <a:t> = 1; </a:t>
+            </a:r>
+            <a:r>
+              <a:rPr lang="en-US" sz="3200" dirty="0" err="1">
+                <a:latin typeface="Times New Roman" panose="02020603050405020304" pitchFamily="18" charset="0"/>
+                <a:cs typeface="Times New Roman" panose="02020603050405020304" pitchFamily="18" charset="0"/>
+              </a:rPr>
+              <a:t>i</a:t>
+            </a:r>
+            <a:r>
+              <a:rPr lang="en-US" sz="3200" dirty="0">
+                <a:latin typeface="Times New Roman" panose="02020603050405020304" pitchFamily="18" charset="0"/>
+                <a:cs typeface="Times New Roman" panose="02020603050405020304" pitchFamily="18" charset="0"/>
+              </a:rPr>
+              <a:t> &lt;= 10; </a:t>
+            </a:r>
+            <a:r>
+              <a:rPr lang="en-US" sz="3200" dirty="0" err="1">
+                <a:latin typeface="Times New Roman" panose="02020603050405020304" pitchFamily="18" charset="0"/>
+                <a:cs typeface="Times New Roman" panose="02020603050405020304" pitchFamily="18" charset="0"/>
+              </a:rPr>
+              <a:t>i</a:t>
+            </a:r>
+            <a:r>
+              <a:rPr lang="en-US" sz="3200" dirty="0">
+                <a:latin typeface="Times New Roman" panose="02020603050405020304" pitchFamily="18" charset="0"/>
+                <a:cs typeface="Times New Roman" panose="02020603050405020304" pitchFamily="18" charset="0"/>
+              </a:rPr>
+              <a:t>++) {</a:t>
+            </a:r>
+          </a:p>
+          <a:p>
+            <a:r>
+              <a:rPr lang="en-US" sz="3200" dirty="0">
+                <a:latin typeface="Times New Roman" panose="02020603050405020304" pitchFamily="18" charset="0"/>
+                <a:cs typeface="Times New Roman" panose="02020603050405020304" pitchFamily="18" charset="0"/>
+              </a:rPr>
+              <a:t>	a = a + </a:t>
+            </a:r>
+            <a:r>
+              <a:rPr lang="en-US" sz="3200" dirty="0" err="1">
+                <a:latin typeface="Times New Roman" panose="02020603050405020304" pitchFamily="18" charset="0"/>
+                <a:cs typeface="Times New Roman" panose="02020603050405020304" pitchFamily="18" charset="0"/>
+              </a:rPr>
+              <a:t>i</a:t>
+            </a:r>
+            <a:r>
+              <a:rPr lang="en-US" sz="3200" dirty="0">
+                <a:latin typeface="Times New Roman" panose="02020603050405020304" pitchFamily="18" charset="0"/>
+                <a:cs typeface="Times New Roman" panose="02020603050405020304" pitchFamily="18" charset="0"/>
+              </a:rPr>
+              <a:t>;</a:t>
+            </a:r>
+          </a:p>
+          <a:p>
+            <a:r>
+              <a:rPr lang="en-US" sz="3200" dirty="0">
+                <a:latin typeface="Times New Roman" panose="02020603050405020304" pitchFamily="18" charset="0"/>
+                <a:cs typeface="Times New Roman" panose="02020603050405020304" pitchFamily="18" charset="0"/>
+              </a:rPr>
+              <a:t>}</a:t>
+            </a:r>
+          </a:p>
+          <a:p>
+            <a:endParaRPr lang="en-US" sz="3200" dirty="0">
+              <a:latin typeface="Times New Roman" panose="02020603050405020304" pitchFamily="18" charset="0"/>
+              <a:cs typeface="Times New Roman" panose="02020603050405020304" pitchFamily="18" charset="0"/>
+            </a:endParaRPr>
+          </a:p>
+          <a:p>
+            <a:endParaRPr lang="en-US" sz="3200" dirty="0">
+              <a:latin typeface="Times New Roman" panose="02020603050405020304" pitchFamily="18" charset="0"/>
+              <a:cs typeface="Times New Roman" panose="02020603050405020304" pitchFamily="18" charset="0"/>
+            </a:endParaRPr>
+          </a:p>
+          <a:p>
+            <a:r>
+              <a:rPr lang="ru-RU" sz="3200" dirty="0">
+                <a:latin typeface="Times New Roman" panose="02020603050405020304" pitchFamily="18" charset="0"/>
+                <a:cs typeface="Times New Roman" panose="02020603050405020304" pitchFamily="18" charset="0"/>
+              </a:rPr>
+              <a:t>Количество инструкций </a:t>
+            </a:r>
+            <a:endParaRPr lang="en-US" sz="3200" dirty="0">
+              <a:latin typeface="Times New Roman" panose="02020603050405020304" pitchFamily="18" charset="0"/>
+              <a:cs typeface="Times New Roman" panose="02020603050405020304" pitchFamily="18" charset="0"/>
+            </a:endParaRPr>
+          </a:p>
+          <a:p>
+            <a:r>
+              <a:rPr lang="en-US" sz="3200" dirty="0">
+                <a:latin typeface="Times New Roman" panose="02020603050405020304" pitchFamily="18" charset="0"/>
+                <a:cs typeface="Times New Roman" panose="02020603050405020304" pitchFamily="18" charset="0"/>
+              </a:rPr>
+              <a:t>1 + 11 + 10 + 10 = 32</a:t>
+            </a:r>
+          </a:p>
+        </p:txBody>
+      </p:sp>
+      <p:sp>
+        <p:nvSpPr>
+          <p:cNvPr id="4" name="TextBox 3">
+            <a:extLst>
+              <a:ext uri="{FF2B5EF4-FFF2-40B4-BE49-F238E27FC236}">
+                <a16:creationId xmlns:a16="http://schemas.microsoft.com/office/drawing/2014/main" id="{A2C3B530-79A5-4B2C-938C-1AE83FB2168D}"/>
+              </a:ext>
+            </a:extLst>
+          </p:cNvPr>
+          <p:cNvSpPr txBox="1"/>
+          <p:nvPr/>
+        </p:nvSpPr>
+        <p:spPr>
+          <a:xfrm>
+            <a:off x="6665495" y="2214954"/>
+            <a:ext cx="4448322" cy="3539430"/>
+          </a:xfrm>
+          <a:prstGeom prst="rect">
+            <a:avLst/>
+          </a:prstGeom>
+          <a:noFill/>
+        </p:spPr>
+        <p:txBody>
+          <a:bodyPr wrap="square">
+            <a:spAutoFit/>
+          </a:bodyPr>
+          <a:lstStyle/>
+          <a:p>
+            <a:r>
+              <a:rPr lang="en-US" sz="3200" dirty="0">
+                <a:latin typeface="Times New Roman" panose="02020603050405020304" pitchFamily="18" charset="0"/>
+                <a:cs typeface="Times New Roman" panose="02020603050405020304" pitchFamily="18" charset="0"/>
+              </a:rPr>
+              <a:t>for (</a:t>
+            </a:r>
+            <a:r>
+              <a:rPr lang="en-US" sz="3200" dirty="0" err="1">
+                <a:latin typeface="Times New Roman" panose="02020603050405020304" pitchFamily="18" charset="0"/>
+                <a:cs typeface="Times New Roman" panose="02020603050405020304" pitchFamily="18" charset="0"/>
+              </a:rPr>
+              <a:t>i</a:t>
+            </a:r>
+            <a:r>
+              <a:rPr lang="en-US" sz="3200" dirty="0">
+                <a:latin typeface="Times New Roman" panose="02020603050405020304" pitchFamily="18" charset="0"/>
+                <a:cs typeface="Times New Roman" panose="02020603050405020304" pitchFamily="18" charset="0"/>
+              </a:rPr>
+              <a:t> = 1; </a:t>
+            </a:r>
+            <a:r>
+              <a:rPr lang="en-US" sz="3200" dirty="0" err="1">
+                <a:latin typeface="Times New Roman" panose="02020603050405020304" pitchFamily="18" charset="0"/>
+                <a:cs typeface="Times New Roman" panose="02020603050405020304" pitchFamily="18" charset="0"/>
+              </a:rPr>
+              <a:t>i</a:t>
+            </a:r>
+            <a:r>
+              <a:rPr lang="en-US" sz="3200" dirty="0">
+                <a:latin typeface="Times New Roman" panose="02020603050405020304" pitchFamily="18" charset="0"/>
+                <a:cs typeface="Times New Roman" panose="02020603050405020304" pitchFamily="18" charset="0"/>
+              </a:rPr>
+              <a:t> &lt;= </a:t>
+            </a:r>
+            <a:r>
+              <a:rPr lang="ru-RU" sz="3200" dirty="0">
+                <a:latin typeface="Times New Roman" panose="02020603050405020304" pitchFamily="18" charset="0"/>
+                <a:cs typeface="Times New Roman" panose="02020603050405020304" pitchFamily="18" charset="0"/>
+              </a:rPr>
+              <a:t>5</a:t>
+            </a:r>
+            <a:r>
+              <a:rPr lang="en-US" sz="3200" dirty="0">
+                <a:latin typeface="Times New Roman" panose="02020603050405020304" pitchFamily="18" charset="0"/>
+                <a:cs typeface="Times New Roman" panose="02020603050405020304" pitchFamily="18" charset="0"/>
+              </a:rPr>
+              <a:t>; </a:t>
+            </a:r>
+            <a:r>
+              <a:rPr lang="en-US" sz="3200" dirty="0" err="1">
+                <a:latin typeface="Times New Roman" panose="02020603050405020304" pitchFamily="18" charset="0"/>
+                <a:cs typeface="Times New Roman" panose="02020603050405020304" pitchFamily="18" charset="0"/>
+              </a:rPr>
+              <a:t>i</a:t>
+            </a:r>
+            <a:r>
+              <a:rPr lang="en-US" sz="3200" dirty="0">
+                <a:latin typeface="Times New Roman" panose="02020603050405020304" pitchFamily="18" charset="0"/>
+                <a:cs typeface="Times New Roman" panose="02020603050405020304" pitchFamily="18" charset="0"/>
+              </a:rPr>
+              <a:t>++) {</a:t>
+            </a:r>
+          </a:p>
+          <a:p>
+            <a:r>
+              <a:rPr lang="en-US" sz="3200" dirty="0">
+                <a:latin typeface="Times New Roman" panose="02020603050405020304" pitchFamily="18" charset="0"/>
+                <a:cs typeface="Times New Roman" panose="02020603050405020304" pitchFamily="18" charset="0"/>
+              </a:rPr>
+              <a:t>	a = a + </a:t>
+            </a:r>
+            <a:r>
+              <a:rPr lang="en-US" sz="3200" dirty="0" err="1">
+                <a:latin typeface="Times New Roman" panose="02020603050405020304" pitchFamily="18" charset="0"/>
+                <a:cs typeface="Times New Roman" panose="02020603050405020304" pitchFamily="18" charset="0"/>
+              </a:rPr>
+              <a:t>i</a:t>
+            </a:r>
+            <a:r>
+              <a:rPr lang="en-US" sz="3200" dirty="0">
+                <a:latin typeface="Times New Roman" panose="02020603050405020304" pitchFamily="18" charset="0"/>
+                <a:cs typeface="Times New Roman" panose="02020603050405020304" pitchFamily="18" charset="0"/>
+              </a:rPr>
+              <a:t>;</a:t>
+            </a:r>
+            <a:endParaRPr lang="ru-RU" sz="3200" dirty="0">
+              <a:latin typeface="Times New Roman" panose="02020603050405020304" pitchFamily="18" charset="0"/>
+              <a:cs typeface="Times New Roman" panose="02020603050405020304" pitchFamily="18" charset="0"/>
+            </a:endParaRPr>
+          </a:p>
+          <a:p>
+            <a:r>
+              <a:rPr lang="ru-RU" sz="3200" dirty="0">
+                <a:latin typeface="Times New Roman" panose="02020603050405020304" pitchFamily="18" charset="0"/>
+                <a:cs typeface="Times New Roman" panose="02020603050405020304" pitchFamily="18" charset="0"/>
+              </a:rPr>
+              <a:t>	</a:t>
+            </a:r>
+            <a:r>
+              <a:rPr lang="en-US" sz="3200" dirty="0">
+                <a:latin typeface="Times New Roman" panose="02020603050405020304" pitchFamily="18" charset="0"/>
+                <a:cs typeface="Times New Roman" panose="02020603050405020304" pitchFamily="18" charset="0"/>
+              </a:rPr>
+              <a:t>a = a + (5 + </a:t>
+            </a:r>
+            <a:r>
+              <a:rPr lang="en-US" sz="3200" dirty="0" err="1">
+                <a:latin typeface="Times New Roman" panose="02020603050405020304" pitchFamily="18" charset="0"/>
+                <a:cs typeface="Times New Roman" panose="02020603050405020304" pitchFamily="18" charset="0"/>
+              </a:rPr>
+              <a:t>i</a:t>
+            </a:r>
+            <a:r>
+              <a:rPr lang="en-US" sz="3200" dirty="0">
+                <a:latin typeface="Times New Roman" panose="02020603050405020304" pitchFamily="18" charset="0"/>
+                <a:cs typeface="Times New Roman" panose="02020603050405020304" pitchFamily="18" charset="0"/>
+              </a:rPr>
+              <a:t>);</a:t>
+            </a:r>
+          </a:p>
+          <a:p>
+            <a:r>
+              <a:rPr lang="en-US" sz="3200" dirty="0">
+                <a:latin typeface="Times New Roman" panose="02020603050405020304" pitchFamily="18" charset="0"/>
+                <a:cs typeface="Times New Roman" panose="02020603050405020304" pitchFamily="18" charset="0"/>
+              </a:rPr>
+              <a:t>}</a:t>
+            </a:r>
+          </a:p>
+          <a:p>
+            <a:endParaRPr lang="en-US" sz="3200" dirty="0">
+              <a:latin typeface="Times New Roman" panose="02020603050405020304" pitchFamily="18" charset="0"/>
+              <a:cs typeface="Times New Roman" panose="02020603050405020304" pitchFamily="18" charset="0"/>
+            </a:endParaRPr>
+          </a:p>
+          <a:p>
+            <a:r>
+              <a:rPr lang="ru-RU" sz="3200" dirty="0">
+                <a:latin typeface="Times New Roman" panose="02020603050405020304" pitchFamily="18" charset="0"/>
+                <a:cs typeface="Times New Roman" panose="02020603050405020304" pitchFamily="18" charset="0"/>
+              </a:rPr>
+              <a:t>Количество инструкций </a:t>
+            </a:r>
+            <a:r>
+              <a:rPr lang="en-US" sz="3200" dirty="0">
+                <a:latin typeface="Times New Roman" panose="02020603050405020304" pitchFamily="18" charset="0"/>
+                <a:cs typeface="Times New Roman" panose="02020603050405020304" pitchFamily="18" charset="0"/>
+              </a:rPr>
+              <a:t>1 + 6 + 5 + 10 = 22</a:t>
+            </a:r>
+          </a:p>
+        </p:txBody>
+      </p:sp>
+    </p:spTree>
+    <p:extLst>
+      <p:ext uri="{BB962C8B-B14F-4D97-AF65-F5344CB8AC3E}">
+        <p14:creationId xmlns:p14="http://schemas.microsoft.com/office/powerpoint/2010/main" val="3506853754"/>
+      </p:ext>
+    </p:extLst>
+  </p:cSld>
+  <p:clrMapOvr>
+    <a:masterClrMapping/>
+  </p:clrMapOvr>
+</p:sld>
+</file>
+
+<file path=ppt/slides/slide18.xml><?xml version="1.0" encoding="utf-8"?>
+<p:sld xmlns:a="http://schemas.openxmlformats.org/drawingml/2006/main" xmlns:r="http://schemas.openxmlformats.org/officeDocument/2006/relationships" xmlns:p="http://schemas.openxmlformats.org/presentationml/2006/main">
+  <p:cSld>
+    <p:spTree>
+      <p:nvGrpSpPr>
+        <p:cNvPr id="1" name=""/>
+        <p:cNvGrpSpPr/>
+        <p:nvPr/>
+      </p:nvGrpSpPr>
+      <p:grpSpPr>
+        <a:xfrm>
+          <a:off x="0" y="0"/>
+          <a:ext cx="0" cy="0"/>
+          <a:chOff x="0" y="0"/>
+          <a:chExt cx="0" cy="0"/>
+        </a:xfrm>
+      </p:grpSpPr>
+      <p:sp>
+        <p:nvSpPr>
+          <p:cNvPr id="4" name="Rectangle 1">
+            <a:extLst>
+              <a:ext uri="{FF2B5EF4-FFF2-40B4-BE49-F238E27FC236}">
+                <a16:creationId xmlns:a16="http://schemas.microsoft.com/office/drawing/2014/main" id="{2E0D6B0E-2565-4C08-9911-5AB313FD391A}"/>
+              </a:ext>
+            </a:extLst>
+          </p:cNvPr>
+          <p:cNvSpPr>
+            <a:spLocks noChangeArrowheads="1"/>
+          </p:cNvSpPr>
+          <p:nvPr/>
+        </p:nvSpPr>
+        <p:spPr bwMode="auto">
+          <a:xfrm>
+            <a:off x="2525713" y="1825625"/>
+            <a:ext cx="12192000" cy="0"/>
+          </a:xfrm>
+          <a:prstGeom prst="rect">
+            <a:avLst/>
+          </a:prstGeom>
+          <a:noFill/>
+          <a:ln>
+            <a:noFill/>
+          </a:ln>
+          <a:effectLst/>
+          <a:extLst>
+            <a:ext uri="{909E8E84-426E-40DD-AFC4-6F175D3DCCD1}">
+              <a14:hiddenFill xmlns:a14="http://schemas.microsoft.com/office/drawing/2010/main">
+                <a:solidFill>
+                  <a:schemeClr val="accent1"/>
+                </a:solidFill>
+              </a14:hiddenFill>
+            </a:ext>
+            <a:ext uri="{91240B29-F687-4F45-9708-019B960494DF}">
+              <a14:hiddenLine xmlns:a14="http://schemas.microsoft.com/office/drawing/2010/main" w="9525">
+                <a:solidFill>
+                  <a:schemeClr val="tx1"/>
+                </a:solidFill>
+                <a:miter lim="800000"/>
+                <a:headEnd/>
+                <a:tailEnd/>
+              </a14:hiddenLine>
+            </a:ext>
+            <a:ext uri="{AF507438-7753-43E0-B8FC-AC1667EBCBE1}">
+              <a14:hiddenEffects xmlns:a14="http://schemas.microsoft.com/office/drawing/2010/main">
+                <a:effectLst>
+                  <a:outerShdw dist="35921" dir="2700000" algn="ctr" rotWithShape="0">
+                    <a:schemeClr val="bg2"/>
+                  </a:outerShdw>
+                </a:effectLst>
+              </a14:hiddenEffects>
+            </a:ext>
+          </a:extLst>
+        </p:spPr>
+        <p:txBody>
+          <a:bodyPr vert="horz" wrap="none" lIns="91440" tIns="45720" rIns="91440" bIns="45720" numCol="1" anchor="ctr" anchorCtr="0" compatLnSpc="1">
+            <a:prstTxWarp prst="textNoShape">
+              <a:avLst/>
+            </a:prstTxWarp>
+            <a:spAutoFit/>
+          </a:bodyPr>
+          <a:lstStyle/>
+          <a:p>
+            <a:pPr marL="0" marR="0" lvl="0" indent="0" algn="l" defTabSz="914400" rtl="0" eaLnBrk="0" fontAlgn="base" latinLnBrk="0" hangingPunct="0">
+              <a:lnSpc>
+                <a:spcPct val="100000"/>
+              </a:lnSpc>
+              <a:spcBef>
+                <a:spcPct val="0"/>
+              </a:spcBef>
+              <a:spcAft>
+                <a:spcPct val="0"/>
+              </a:spcAft>
+              <a:buClrTx/>
+              <a:buSzTx/>
+              <a:buFontTx/>
+              <a:buNone/>
+              <a:tabLst/>
+            </a:pPr>
+            <a:br>
+              <a:rPr kumimoji="0" lang="ru-RU" altLang="ru-RU" sz="1800" b="0" i="0" u="none" strike="noStrike" cap="none" normalizeH="0" baseline="0">
+                <a:ln>
+                  <a:noFill/>
+                </a:ln>
+                <a:solidFill>
+                  <a:schemeClr val="tx1"/>
+                </a:solidFill>
+                <a:effectLst/>
+                <a:latin typeface="Arial" panose="020B0604020202020204" pitchFamily="34" charset="0"/>
+              </a:rPr>
+            </a:br>
+            <a:endParaRPr kumimoji="0" lang="ru-RU" altLang="ru-RU" sz="1800" b="0" i="0" u="none" strike="noStrike" cap="none" normalizeH="0" baseline="0">
+              <a:ln>
+                <a:noFill/>
+              </a:ln>
+              <a:solidFill>
+                <a:schemeClr val="tx1"/>
+              </a:solidFill>
+              <a:effectLst/>
+              <a:latin typeface="Arial" panose="020B0604020202020204" pitchFamily="34" charset="0"/>
+            </a:endParaRPr>
+          </a:p>
+        </p:txBody>
+      </p:sp>
+      <p:sp>
+        <p:nvSpPr>
+          <p:cNvPr id="7" name="Заголовок 3">
+            <a:extLst>
+              <a:ext uri="{FF2B5EF4-FFF2-40B4-BE49-F238E27FC236}">
+                <a16:creationId xmlns:a16="http://schemas.microsoft.com/office/drawing/2014/main" id="{44D9C8AE-0A3E-4056-813F-36670D18429A}"/>
+              </a:ext>
+            </a:extLst>
+          </p:cNvPr>
+          <p:cNvSpPr txBox="1">
+            <a:spLocks/>
+          </p:cNvSpPr>
+          <p:nvPr/>
+        </p:nvSpPr>
+        <p:spPr>
+          <a:xfrm>
+            <a:off x="1589314" y="341221"/>
+            <a:ext cx="9013371" cy="1164869"/>
+          </a:xfrm>
+          <a:prstGeom prst="rect">
+            <a:avLst/>
+          </a:prstGeom>
+        </p:spPr>
+        <p:txBody>
+          <a:bodyPr vert="horz" lIns="91440" tIns="45720" rIns="91440" bIns="45720" rtlCol="0" anchor="b">
+            <a:normAutofit/>
+          </a:bodyPr>
+          <a:lstStyle>
+            <a:lvl1pPr algn="ctr" defTabSz="914400" rtl="0" eaLnBrk="1" latinLnBrk="0" hangingPunct="1">
+              <a:lnSpc>
+                <a:spcPct val="90000"/>
+              </a:lnSpc>
+              <a:spcBef>
+                <a:spcPct val="0"/>
+              </a:spcBef>
+              <a:buNone/>
+              <a:defRPr sz="6000" kern="1200">
+                <a:solidFill>
+                  <a:schemeClr val="tx1"/>
+                </a:solidFill>
+                <a:latin typeface="+mj-lt"/>
+                <a:ea typeface="+mj-ea"/>
+                <a:cs typeface="+mj-cs"/>
+              </a:defRPr>
+            </a:lvl1pPr>
+          </a:lstStyle>
+          <a:p>
+            <a:r>
+              <a:rPr lang="en-US" dirty="0"/>
+              <a:t>switch .. case</a:t>
+            </a:r>
+            <a:endParaRPr lang="ru-RU" dirty="0"/>
+          </a:p>
+        </p:txBody>
+      </p:sp>
+      <p:sp>
+        <p:nvSpPr>
+          <p:cNvPr id="6" name="TextBox 5">
+            <a:extLst>
+              <a:ext uri="{FF2B5EF4-FFF2-40B4-BE49-F238E27FC236}">
+                <a16:creationId xmlns:a16="http://schemas.microsoft.com/office/drawing/2014/main" id="{9A5F2FB4-06B2-4D9F-B9F4-E49C37A634A1}"/>
+              </a:ext>
+            </a:extLst>
+          </p:cNvPr>
+          <p:cNvSpPr txBox="1"/>
+          <p:nvPr/>
+        </p:nvSpPr>
+        <p:spPr>
+          <a:xfrm>
+            <a:off x="4370687" y="1825625"/>
+            <a:ext cx="3450624" cy="3785652"/>
+          </a:xfrm>
+          <a:prstGeom prst="rect">
+            <a:avLst/>
+          </a:prstGeom>
+          <a:noFill/>
+        </p:spPr>
+        <p:txBody>
+          <a:bodyPr wrap="square">
+            <a:spAutoFit/>
+          </a:bodyPr>
+          <a:lstStyle/>
+          <a:p>
+            <a:r>
+              <a:rPr lang="en-US" sz="2000" dirty="0">
+                <a:latin typeface="Times New Roman" panose="02020603050405020304" pitchFamily="18" charset="0"/>
+                <a:cs typeface="Times New Roman" panose="02020603050405020304" pitchFamily="18" charset="0"/>
+              </a:rPr>
+              <a:t>switch (e) {</a:t>
+            </a:r>
+          </a:p>
+          <a:p>
+            <a:r>
+              <a:rPr lang="en-US" sz="2000" dirty="0">
+                <a:latin typeface="Times New Roman" panose="02020603050405020304" pitchFamily="18" charset="0"/>
+                <a:cs typeface="Times New Roman" panose="02020603050405020304" pitchFamily="18" charset="0"/>
+              </a:rPr>
+              <a:t>	case c1: </a:t>
+            </a:r>
+          </a:p>
+          <a:p>
+            <a:r>
+              <a:rPr lang="en-US" sz="2000" dirty="0">
+                <a:latin typeface="Times New Roman" panose="02020603050405020304" pitchFamily="18" charset="0"/>
+                <a:cs typeface="Times New Roman" panose="02020603050405020304" pitchFamily="18" charset="0"/>
+              </a:rPr>
+              <a:t>		…</a:t>
+            </a:r>
+          </a:p>
+          <a:p>
+            <a:r>
+              <a:rPr lang="en-US" sz="2000" dirty="0">
+                <a:latin typeface="Times New Roman" panose="02020603050405020304" pitchFamily="18" charset="0"/>
+                <a:cs typeface="Times New Roman" panose="02020603050405020304" pitchFamily="18" charset="0"/>
+              </a:rPr>
+              <a:t>	case c2:</a:t>
+            </a:r>
+          </a:p>
+          <a:p>
+            <a:r>
+              <a:rPr lang="en-US" sz="2000" dirty="0">
+                <a:latin typeface="Times New Roman" panose="02020603050405020304" pitchFamily="18" charset="0"/>
+                <a:cs typeface="Times New Roman" panose="02020603050405020304" pitchFamily="18" charset="0"/>
+              </a:rPr>
+              <a:t>		…</a:t>
+            </a:r>
+          </a:p>
+          <a:p>
+            <a:r>
+              <a:rPr lang="en-US" sz="2000" dirty="0">
+                <a:latin typeface="Times New Roman" panose="02020603050405020304" pitchFamily="18" charset="0"/>
+                <a:cs typeface="Times New Roman" panose="02020603050405020304" pitchFamily="18" charset="0"/>
+              </a:rPr>
+              <a:t>		break;</a:t>
+            </a:r>
+          </a:p>
+          <a:p>
+            <a:r>
+              <a:rPr lang="en-US" sz="2000" dirty="0">
+                <a:latin typeface="Times New Roman" panose="02020603050405020304" pitchFamily="18" charset="0"/>
+                <a:cs typeface="Times New Roman" panose="02020603050405020304" pitchFamily="18" charset="0"/>
+              </a:rPr>
+              <a:t>	case c3:</a:t>
+            </a:r>
+          </a:p>
+          <a:p>
+            <a:r>
+              <a:rPr lang="en-US" sz="2000" dirty="0">
+                <a:latin typeface="Times New Roman" panose="02020603050405020304" pitchFamily="18" charset="0"/>
+                <a:cs typeface="Times New Roman" panose="02020603050405020304" pitchFamily="18" charset="0"/>
+              </a:rPr>
+              <a:t>		break;</a:t>
+            </a:r>
+          </a:p>
+          <a:p>
+            <a:r>
+              <a:rPr lang="en-US" sz="2000" dirty="0">
+                <a:latin typeface="Times New Roman" panose="02020603050405020304" pitchFamily="18" charset="0"/>
+                <a:cs typeface="Times New Roman" panose="02020603050405020304" pitchFamily="18" charset="0"/>
+              </a:rPr>
+              <a:t>	default:</a:t>
+            </a:r>
+          </a:p>
+          <a:p>
+            <a:r>
+              <a:rPr lang="en-US" sz="2000" dirty="0">
+                <a:latin typeface="Times New Roman" panose="02020603050405020304" pitchFamily="18" charset="0"/>
+                <a:cs typeface="Times New Roman" panose="02020603050405020304" pitchFamily="18" charset="0"/>
+              </a:rPr>
+              <a:t>		…</a:t>
+            </a:r>
+          </a:p>
+          <a:p>
+            <a:r>
+              <a:rPr lang="en-US" sz="2000" dirty="0">
+                <a:latin typeface="Times New Roman" panose="02020603050405020304" pitchFamily="18" charset="0"/>
+                <a:cs typeface="Times New Roman" panose="02020603050405020304" pitchFamily="18" charset="0"/>
+              </a:rPr>
+              <a:t>}</a:t>
+            </a:r>
+            <a:endParaRPr lang="ru-RU" sz="2000" dirty="0">
+              <a:latin typeface="Times New Roman" panose="02020603050405020304" pitchFamily="18" charset="0"/>
+              <a:cs typeface="Times New Roman" panose="02020603050405020304" pitchFamily="18" charset="0"/>
+            </a:endParaRPr>
+          </a:p>
+          <a:p>
+            <a:endParaRPr lang="ru-RU" sz="2000" dirty="0">
+              <a:latin typeface="Times New Roman" panose="02020603050405020304" pitchFamily="18" charset="0"/>
+              <a:cs typeface="Times New Roman" panose="02020603050405020304" pitchFamily="18" charset="0"/>
+            </a:endParaRPr>
+          </a:p>
+        </p:txBody>
+      </p:sp>
+      <p:sp>
+        <p:nvSpPr>
+          <p:cNvPr id="2" name="TextBox 1">
+            <a:extLst>
+              <a:ext uri="{FF2B5EF4-FFF2-40B4-BE49-F238E27FC236}">
+                <a16:creationId xmlns:a16="http://schemas.microsoft.com/office/drawing/2014/main" id="{4FBE3FDF-627F-4616-AC64-F16E232BA7CD}"/>
+              </a:ext>
+            </a:extLst>
+          </p:cNvPr>
+          <p:cNvSpPr txBox="1"/>
+          <p:nvPr/>
+        </p:nvSpPr>
+        <p:spPr>
+          <a:xfrm>
+            <a:off x="7846050" y="4949557"/>
+            <a:ext cx="3337132" cy="646331"/>
+          </a:xfrm>
+          <a:prstGeom prst="rect">
+            <a:avLst/>
+          </a:prstGeom>
+          <a:noFill/>
+        </p:spPr>
+        <p:txBody>
+          <a:bodyPr wrap="none" rtlCol="0">
+            <a:spAutoFit/>
+          </a:bodyPr>
+          <a:lstStyle/>
+          <a:p>
+            <a:r>
+              <a:rPr lang="en-US" dirty="0"/>
+              <a:t>c</a:t>
+            </a:r>
+            <a:r>
+              <a:rPr lang="ru-RU" dirty="0"/>
+              <a:t>1</a:t>
+            </a:r>
+            <a:r>
+              <a:rPr lang="en-US" dirty="0"/>
+              <a:t>, c2, c3 - </a:t>
+            </a:r>
+            <a:r>
+              <a:rPr lang="ru-RU" dirty="0"/>
+              <a:t>константа</a:t>
+            </a:r>
+            <a:r>
+              <a:rPr lang="en-US" dirty="0"/>
+              <a:t>, </a:t>
+            </a:r>
+            <a:endParaRPr lang="ru-RU" dirty="0"/>
+          </a:p>
+          <a:p>
+            <a:r>
+              <a:rPr lang="ru-RU" dirty="0"/>
+              <a:t>целочисленная или символьная</a:t>
+            </a:r>
+          </a:p>
+        </p:txBody>
+      </p:sp>
+    </p:spTree>
+    <p:extLst>
+      <p:ext uri="{BB962C8B-B14F-4D97-AF65-F5344CB8AC3E}">
+        <p14:creationId xmlns:p14="http://schemas.microsoft.com/office/powerpoint/2010/main" val="1165264177"/>
+      </p:ext>
+    </p:extLst>
+  </p:cSld>
+  <p:clrMapOvr>
+    <a:masterClrMapping/>
+  </p:clrMapOvr>
+</p:sld>
+</file>
+
+<file path=ppt/slides/slide19.xml><?xml version="1.0" encoding="utf-8"?>
 <p:sld xmlns:a="http://schemas.openxmlformats.org/drawingml/2006/main" xmlns:r="http://schemas.openxmlformats.org/officeDocument/2006/relationships" xmlns:p="http://schemas.openxmlformats.org/presentationml/2006/main">
   <p:cSld>
     <p:spTree>
@@ -6085,8 +8175,8 @@
         </p:nvSpPr>
         <p:spPr>
           <a:xfrm>
-            <a:off x="2785314" y="2347082"/>
-            <a:ext cx="3754450" cy="3416320"/>
+            <a:off x="2785313" y="2347082"/>
+            <a:ext cx="4031461" cy="3416320"/>
           </a:xfrm>
           <a:prstGeom prst="rect">
             <a:avLst/>
@@ -6126,12 +8216,6 @@
             </a:r>
           </a:p>
           <a:p>
-            <a:endParaRPr lang="en-US" sz="3600" dirty="0">
-              <a:latin typeface="Times New Roman" panose="02020603050405020304" pitchFamily="18" charset="0"/>
-              <a:cs typeface="Times New Roman" panose="02020603050405020304" pitchFamily="18" charset="0"/>
-            </a:endParaRPr>
-          </a:p>
-          <a:p>
             <a:r>
               <a:rPr lang="en-US" sz="3600" dirty="0">
                 <a:latin typeface="Times New Roman" panose="02020603050405020304" pitchFamily="18" charset="0"/>
@@ -6146,7 +8230,9 @@
               </a:rPr>
               <a:t>логическое выражение</a:t>
             </a:r>
-            <a:endParaRPr lang="en-US" sz="3600" dirty="0">
+          </a:p>
+          <a:p>
+            <a:endParaRPr lang="ru-RU" sz="3600" dirty="0">
               <a:latin typeface="Times New Roman" panose="02020603050405020304" pitchFamily="18" charset="0"/>
               <a:cs typeface="Times New Roman" panose="02020603050405020304" pitchFamily="18" charset="0"/>
             </a:endParaRPr>
@@ -7007,112 +9093,6 @@
 </file>
 
 <file path=ppt/slides/slide5.xml><?xml version="1.0" encoding="utf-8"?>
-<p:sld xmlns:a="http://schemas.openxmlformats.org/drawingml/2006/main" xmlns:r="http://schemas.openxmlformats.org/officeDocument/2006/relationships" xmlns:p="http://schemas.openxmlformats.org/presentationml/2006/main">
-  <p:cSld>
-    <p:spTree>
-      <p:nvGrpSpPr>
-        <p:cNvPr id="1" name=""/>
-        <p:cNvGrpSpPr/>
-        <p:nvPr/>
-      </p:nvGrpSpPr>
-      <p:grpSpPr>
-        <a:xfrm>
-          <a:off x="0" y="0"/>
-          <a:ext cx="0" cy="0"/>
-          <a:chOff x="0" y="0"/>
-          <a:chExt cx="0" cy="0"/>
-        </a:xfrm>
-      </p:grpSpPr>
-      <p:sp>
-        <p:nvSpPr>
-          <p:cNvPr id="5" name="Заголовок 3">
-            <a:extLst>
-              <a:ext uri="{FF2B5EF4-FFF2-40B4-BE49-F238E27FC236}">
-                <a16:creationId xmlns:a16="http://schemas.microsoft.com/office/drawing/2014/main" id="{8259CF3A-AC4E-4FB4-B194-DC7CBFC75277}"/>
-              </a:ext>
-            </a:extLst>
-          </p:cNvPr>
-          <p:cNvSpPr txBox="1">
-            <a:spLocks/>
-          </p:cNvSpPr>
-          <p:nvPr/>
-        </p:nvSpPr>
-        <p:spPr>
-          <a:xfrm>
-            <a:off x="3042782" y="2846565"/>
-            <a:ext cx="6106436" cy="1164869"/>
-          </a:xfrm>
-          <a:prstGeom prst="rect">
-            <a:avLst/>
-          </a:prstGeom>
-        </p:spPr>
-        <p:txBody>
-          <a:bodyPr vert="horz" lIns="91440" tIns="45720" rIns="91440" bIns="45720" rtlCol="0" anchor="b">
-            <a:normAutofit fontScale="40000" lnSpcReduction="20000"/>
-          </a:bodyPr>
-          <a:lstStyle>
-            <a:lvl1pPr algn="ctr" defTabSz="914400" rtl="0" eaLnBrk="1" latinLnBrk="0" hangingPunct="1">
-              <a:lnSpc>
-                <a:spcPct val="90000"/>
-              </a:lnSpc>
-              <a:spcBef>
-                <a:spcPct val="0"/>
-              </a:spcBef>
-              <a:buNone/>
-              <a:defRPr sz="6000" kern="1200">
-                <a:solidFill>
-                  <a:schemeClr val="tx1"/>
-                </a:solidFill>
-                <a:latin typeface="+mj-lt"/>
-                <a:ea typeface="+mj-ea"/>
-                <a:cs typeface="+mj-cs"/>
-              </a:defRPr>
-            </a:lvl1pPr>
-          </a:lstStyle>
-          <a:p>
-            <a:r>
-              <a:rPr lang="en-US" sz="11000" dirty="0"/>
-              <a:t>while </a:t>
-            </a:r>
-            <a:r>
-              <a:rPr lang="en-US" sz="11000" dirty="0" err="1"/>
-              <a:t>scanf</a:t>
-            </a:r>
-            <a:r>
-              <a:rPr lang="en-US" sz="11000" dirty="0"/>
-              <a:t> example</a:t>
-            </a:r>
-          </a:p>
-          <a:p>
-            <a:endParaRPr lang="en-US" dirty="0"/>
-          </a:p>
-          <a:p>
-            <a:r>
-              <a:rPr lang="en-US" dirty="0"/>
-              <a:t>3_loops/</a:t>
-            </a:r>
-            <a:r>
-              <a:rPr lang="en-US" dirty="0" err="1"/>
-              <a:t>while_negative.c</a:t>
-            </a:r>
-            <a:endParaRPr lang="ru-RU" dirty="0"/>
-          </a:p>
-        </p:txBody>
-      </p:sp>
-    </p:spTree>
-    <p:extLst>
-      <p:ext uri="{BB962C8B-B14F-4D97-AF65-F5344CB8AC3E}">
-        <p14:creationId xmlns:p14="http://schemas.microsoft.com/office/powerpoint/2010/main" val="1568981913"/>
-      </p:ext>
-    </p:extLst>
-  </p:cSld>
-  <p:clrMapOvr>
-    <a:masterClrMapping/>
-  </p:clrMapOvr>
-</p:sld>
-</file>
-
-<file path=ppt/slides/slide6.xml><?xml version="1.0" encoding="utf-8"?>
 <p:sld xmlns:a="http://schemas.openxmlformats.org/drawingml/2006/main" xmlns:r="http://schemas.openxmlformats.org/officeDocument/2006/relationships" xmlns:p="http://schemas.openxmlformats.org/presentationml/2006/main">
   <p:cSld>
     <p:spTree>
@@ -7855,7 +9835,7 @@
 </p:sld>
 </file>
 
-<file path=ppt/slides/slide7.xml><?xml version="1.0" encoding="utf-8"?>
+<file path=ppt/slides/slide6.xml><?xml version="1.0" encoding="utf-8"?>
 <p:sld xmlns:a="http://schemas.openxmlformats.org/drawingml/2006/main" xmlns:r="http://schemas.openxmlformats.org/officeDocument/2006/relationships" xmlns:p="http://schemas.openxmlformats.org/presentationml/2006/main">
   <p:cSld>
     <p:spTree>
@@ -8185,7 +10165,7 @@
 </p:sld>
 </file>
 
-<file path=ppt/slides/slide8.xml><?xml version="1.0" encoding="utf-8"?>
+<file path=ppt/slides/slide7.xml><?xml version="1.0" encoding="utf-8"?>
 <p:sld xmlns:a="http://schemas.openxmlformats.org/drawingml/2006/main" xmlns:r="http://schemas.openxmlformats.org/officeDocument/2006/relationships" xmlns:p="http://schemas.openxmlformats.org/presentationml/2006/main">
   <p:cSld>
     <p:spTree>
@@ -8707,7 +10687,7 @@
 </p:sld>
 </file>
 
-<file path=ppt/slides/slide9.xml><?xml version="1.0" encoding="utf-8"?>
+<file path=ppt/slides/slide8.xml><?xml version="1.0" encoding="utf-8"?>
 <p:sld xmlns:a="http://schemas.openxmlformats.org/drawingml/2006/main" xmlns:r="http://schemas.openxmlformats.org/officeDocument/2006/relationships" xmlns:p="http://schemas.openxmlformats.org/presentationml/2006/main">
   <p:cSld>
     <p:spTree>
@@ -9208,6 +11188,517 @@
     <p:extLst>
       <p:ext uri="{BB962C8B-B14F-4D97-AF65-F5344CB8AC3E}">
         <p14:creationId xmlns:p14="http://schemas.microsoft.com/office/powerpoint/2010/main" val="1581478934"/>
+      </p:ext>
+    </p:extLst>
+  </p:cSld>
+  <p:clrMapOvr>
+    <a:masterClrMapping/>
+  </p:clrMapOvr>
+</p:sld>
+</file>
+
+<file path=ppt/slides/slide9.xml><?xml version="1.0" encoding="utf-8"?>
+<p:sld xmlns:a="http://schemas.openxmlformats.org/drawingml/2006/main" xmlns:r="http://schemas.openxmlformats.org/officeDocument/2006/relationships" xmlns:p="http://schemas.openxmlformats.org/presentationml/2006/main">
+  <p:cSld>
+    <p:spTree>
+      <p:nvGrpSpPr>
+        <p:cNvPr id="1" name=""/>
+        <p:cNvGrpSpPr/>
+        <p:nvPr/>
+      </p:nvGrpSpPr>
+      <p:grpSpPr>
+        <a:xfrm>
+          <a:off x="0" y="0"/>
+          <a:ext cx="0" cy="0"/>
+          <a:chOff x="0" y="0"/>
+          <a:chExt cx="0" cy="0"/>
+        </a:xfrm>
+      </p:grpSpPr>
+      <p:sp>
+        <p:nvSpPr>
+          <p:cNvPr id="5" name="Заголовок 3">
+            <a:extLst>
+              <a:ext uri="{FF2B5EF4-FFF2-40B4-BE49-F238E27FC236}">
+                <a16:creationId xmlns:a16="http://schemas.microsoft.com/office/drawing/2014/main" id="{8259CF3A-AC4E-4FB4-B194-DC7CBFC75277}"/>
+              </a:ext>
+            </a:extLst>
+          </p:cNvPr>
+          <p:cNvSpPr txBox="1">
+            <a:spLocks/>
+          </p:cNvSpPr>
+          <p:nvPr/>
+        </p:nvSpPr>
+        <p:spPr>
+          <a:xfrm>
+            <a:off x="1589314" y="136157"/>
+            <a:ext cx="9013371" cy="1164869"/>
+          </a:xfrm>
+          <a:prstGeom prst="rect">
+            <a:avLst/>
+          </a:prstGeom>
+        </p:spPr>
+        <p:txBody>
+          <a:bodyPr vert="horz" lIns="91440" tIns="45720" rIns="91440" bIns="45720" rtlCol="0" anchor="b">
+            <a:normAutofit/>
+          </a:bodyPr>
+          <a:lstStyle>
+            <a:lvl1pPr algn="ctr" defTabSz="914400" rtl="0" eaLnBrk="1" latinLnBrk="0" hangingPunct="1">
+              <a:lnSpc>
+                <a:spcPct val="90000"/>
+              </a:lnSpc>
+              <a:spcBef>
+                <a:spcPct val="0"/>
+              </a:spcBef>
+              <a:buNone/>
+              <a:defRPr sz="6000" kern="1200">
+                <a:solidFill>
+                  <a:schemeClr val="tx1"/>
+                </a:solidFill>
+                <a:latin typeface="+mj-lt"/>
+                <a:ea typeface="+mj-ea"/>
+                <a:cs typeface="+mj-cs"/>
+              </a:defRPr>
+            </a:lvl1pPr>
+          </a:lstStyle>
+          <a:p>
+            <a:r>
+              <a:rPr lang="en-US" dirty="0"/>
+              <a:t>continue</a:t>
+            </a:r>
+            <a:endParaRPr lang="ru-RU" dirty="0"/>
+          </a:p>
+        </p:txBody>
+      </p:sp>
+      <p:sp>
+        <p:nvSpPr>
+          <p:cNvPr id="2" name="TextBox 1">
+            <a:extLst>
+              <a:ext uri="{FF2B5EF4-FFF2-40B4-BE49-F238E27FC236}">
+                <a16:creationId xmlns:a16="http://schemas.microsoft.com/office/drawing/2014/main" id="{339D0FE2-A696-49A8-A636-A21CE9304E7B}"/>
+              </a:ext>
+            </a:extLst>
+          </p:cNvPr>
+          <p:cNvSpPr txBox="1"/>
+          <p:nvPr/>
+        </p:nvSpPr>
+        <p:spPr>
+          <a:xfrm>
+            <a:off x="2074590" y="1301028"/>
+            <a:ext cx="3956532" cy="2246769"/>
+          </a:xfrm>
+          <a:prstGeom prst="rect">
+            <a:avLst/>
+          </a:prstGeom>
+          <a:noFill/>
+        </p:spPr>
+        <p:txBody>
+          <a:bodyPr wrap="none" rtlCol="0">
+            <a:spAutoFit/>
+          </a:bodyPr>
+          <a:lstStyle/>
+          <a:p>
+            <a:r>
+              <a:rPr lang="en-US" sz="2800" dirty="0">
+                <a:latin typeface="Times New Roman" panose="02020603050405020304" pitchFamily="18" charset="0"/>
+                <a:cs typeface="Times New Roman" panose="02020603050405020304" pitchFamily="18" charset="0"/>
+              </a:rPr>
+              <a:t>while (expr) {</a:t>
+            </a:r>
+          </a:p>
+          <a:p>
+            <a:r>
+              <a:rPr lang="en-US" sz="2800" dirty="0">
+                <a:latin typeface="Times New Roman" panose="02020603050405020304" pitchFamily="18" charset="0"/>
+                <a:cs typeface="Times New Roman" panose="02020603050405020304" pitchFamily="18" charset="0"/>
+              </a:rPr>
+              <a:t>    if (</a:t>
+            </a:r>
+            <a:r>
+              <a:rPr lang="en-US" sz="2800" dirty="0" err="1">
+                <a:latin typeface="Times New Roman" panose="02020603050405020304" pitchFamily="18" charset="0"/>
+                <a:cs typeface="Times New Roman" panose="02020603050405020304" pitchFamily="18" charset="0"/>
+              </a:rPr>
+              <a:t>expr_to_continue</a:t>
+            </a:r>
+            <a:r>
+              <a:rPr lang="en-US" sz="2800" dirty="0">
+                <a:latin typeface="Times New Roman" panose="02020603050405020304" pitchFamily="18" charset="0"/>
+                <a:cs typeface="Times New Roman" panose="02020603050405020304" pitchFamily="18" charset="0"/>
+              </a:rPr>
+              <a:t>) {</a:t>
+            </a:r>
+          </a:p>
+          <a:p>
+            <a:r>
+              <a:rPr lang="en-US" sz="2800" dirty="0">
+                <a:latin typeface="Times New Roman" panose="02020603050405020304" pitchFamily="18" charset="0"/>
+                <a:cs typeface="Times New Roman" panose="02020603050405020304" pitchFamily="18" charset="0"/>
+              </a:rPr>
+              <a:t>        continue;</a:t>
+            </a:r>
+          </a:p>
+          <a:p>
+            <a:r>
+              <a:rPr lang="en-US" sz="2800" dirty="0">
+                <a:latin typeface="Times New Roman" panose="02020603050405020304" pitchFamily="18" charset="0"/>
+                <a:cs typeface="Times New Roman" panose="02020603050405020304" pitchFamily="18" charset="0"/>
+              </a:rPr>
+              <a:t>    }</a:t>
+            </a:r>
+          </a:p>
+          <a:p>
+            <a:r>
+              <a:rPr lang="en-US" sz="2800" dirty="0">
+                <a:latin typeface="Times New Roman" panose="02020603050405020304" pitchFamily="18" charset="0"/>
+                <a:cs typeface="Times New Roman" panose="02020603050405020304" pitchFamily="18" charset="0"/>
+              </a:rPr>
+              <a:t>}</a:t>
+            </a:r>
+            <a:endParaRPr lang="ru-RU" sz="2800" dirty="0">
+              <a:latin typeface="Times New Roman" panose="02020603050405020304" pitchFamily="18" charset="0"/>
+              <a:cs typeface="Times New Roman" panose="02020603050405020304" pitchFamily="18" charset="0"/>
+            </a:endParaRPr>
+          </a:p>
+        </p:txBody>
+      </p:sp>
+      <p:sp>
+        <p:nvSpPr>
+          <p:cNvPr id="23" name="TextBox 22">
+            <a:extLst>
+              <a:ext uri="{FF2B5EF4-FFF2-40B4-BE49-F238E27FC236}">
+                <a16:creationId xmlns:a16="http://schemas.microsoft.com/office/drawing/2014/main" id="{A32D6D41-69E0-487E-BFEE-3FD06558A39D}"/>
+              </a:ext>
+            </a:extLst>
+          </p:cNvPr>
+          <p:cNvSpPr txBox="1"/>
+          <p:nvPr/>
+        </p:nvSpPr>
+        <p:spPr>
+          <a:xfrm>
+            <a:off x="7304612" y="1301028"/>
+            <a:ext cx="3956532" cy="2246769"/>
+          </a:xfrm>
+          <a:prstGeom prst="rect">
+            <a:avLst/>
+          </a:prstGeom>
+          <a:noFill/>
+        </p:spPr>
+        <p:txBody>
+          <a:bodyPr wrap="none" rtlCol="0">
+            <a:spAutoFit/>
+          </a:bodyPr>
+          <a:lstStyle/>
+          <a:p>
+            <a:r>
+              <a:rPr lang="en-US" sz="2800" dirty="0">
+                <a:latin typeface="Times New Roman" panose="02020603050405020304" pitchFamily="18" charset="0"/>
+                <a:cs typeface="Times New Roman" panose="02020603050405020304" pitchFamily="18" charset="0"/>
+              </a:rPr>
+              <a:t>do {</a:t>
+            </a:r>
+          </a:p>
+          <a:p>
+            <a:r>
+              <a:rPr lang="en-US" sz="2800" dirty="0">
+                <a:latin typeface="Times New Roman" panose="02020603050405020304" pitchFamily="18" charset="0"/>
+                <a:cs typeface="Times New Roman" panose="02020603050405020304" pitchFamily="18" charset="0"/>
+              </a:rPr>
+              <a:t>    if (</a:t>
+            </a:r>
+            <a:r>
+              <a:rPr lang="en-US" sz="2800" dirty="0" err="1">
+                <a:latin typeface="Times New Roman" panose="02020603050405020304" pitchFamily="18" charset="0"/>
+                <a:cs typeface="Times New Roman" panose="02020603050405020304" pitchFamily="18" charset="0"/>
+              </a:rPr>
+              <a:t>expr_to_continue</a:t>
+            </a:r>
+            <a:r>
+              <a:rPr lang="en-US" sz="2800" dirty="0">
+                <a:latin typeface="Times New Roman" panose="02020603050405020304" pitchFamily="18" charset="0"/>
+                <a:cs typeface="Times New Roman" panose="02020603050405020304" pitchFamily="18" charset="0"/>
+              </a:rPr>
+              <a:t>) {</a:t>
+            </a:r>
+          </a:p>
+          <a:p>
+            <a:r>
+              <a:rPr lang="en-US" sz="2800" dirty="0">
+                <a:latin typeface="Times New Roman" panose="02020603050405020304" pitchFamily="18" charset="0"/>
+                <a:cs typeface="Times New Roman" panose="02020603050405020304" pitchFamily="18" charset="0"/>
+              </a:rPr>
+              <a:t> 	continue;</a:t>
+            </a:r>
+          </a:p>
+          <a:p>
+            <a:r>
+              <a:rPr lang="en-US" sz="2800" dirty="0">
+                <a:latin typeface="Times New Roman" panose="02020603050405020304" pitchFamily="18" charset="0"/>
+                <a:cs typeface="Times New Roman" panose="02020603050405020304" pitchFamily="18" charset="0"/>
+              </a:rPr>
+              <a:t>    }</a:t>
+            </a:r>
+          </a:p>
+          <a:p>
+            <a:r>
+              <a:rPr lang="en-US" sz="2800" dirty="0">
+                <a:latin typeface="Times New Roman" panose="02020603050405020304" pitchFamily="18" charset="0"/>
+                <a:cs typeface="Times New Roman" panose="02020603050405020304" pitchFamily="18" charset="0"/>
+              </a:rPr>
+              <a:t>} while (expr);</a:t>
+            </a:r>
+            <a:endParaRPr lang="ru-RU" sz="2800" dirty="0">
+              <a:latin typeface="Times New Roman" panose="02020603050405020304" pitchFamily="18" charset="0"/>
+              <a:cs typeface="Times New Roman" panose="02020603050405020304" pitchFamily="18" charset="0"/>
+            </a:endParaRPr>
+          </a:p>
+        </p:txBody>
+      </p:sp>
+      <p:cxnSp>
+        <p:nvCxnSpPr>
+          <p:cNvPr id="24" name="Прямая со стрелкой 39">
+            <a:extLst>
+              <a:ext uri="{FF2B5EF4-FFF2-40B4-BE49-F238E27FC236}">
+                <a16:creationId xmlns:a16="http://schemas.microsoft.com/office/drawing/2014/main" id="{7D4DEAD1-6BD3-48DA-880A-BEBCAEB84672}"/>
+              </a:ext>
+            </a:extLst>
+          </p:cNvPr>
+          <p:cNvCxnSpPr>
+            <a:cxnSpLocks/>
+            <a:stCxn id="23" idx="1"/>
+          </p:cNvCxnSpPr>
+          <p:nvPr/>
+        </p:nvCxnSpPr>
+        <p:spPr>
+          <a:xfrm rot="10800000" flipH="1" flipV="1">
+            <a:off x="7304612" y="2424412"/>
+            <a:ext cx="325898" cy="924183"/>
+          </a:xfrm>
+          <a:prstGeom prst="bentConnector4">
+            <a:avLst>
+              <a:gd name="adj1" fmla="val -70145"/>
+              <a:gd name="adj2" fmla="val 101405"/>
+            </a:avLst>
+          </a:prstGeom>
+          <a:ln w="38100">
+            <a:tailEnd type="triangle"/>
+          </a:ln>
+        </p:spPr>
+        <p:style>
+          <a:lnRef idx="2">
+            <a:schemeClr val="accent6"/>
+          </a:lnRef>
+          <a:fillRef idx="0">
+            <a:schemeClr val="accent6"/>
+          </a:fillRef>
+          <a:effectRef idx="1">
+            <a:schemeClr val="accent6"/>
+          </a:effectRef>
+          <a:fontRef idx="minor">
+            <a:schemeClr val="tx1"/>
+          </a:fontRef>
+        </p:style>
+      </p:cxnSp>
+      <p:sp>
+        <p:nvSpPr>
+          <p:cNvPr id="26" name="TextBox 25">
+            <a:extLst>
+              <a:ext uri="{FF2B5EF4-FFF2-40B4-BE49-F238E27FC236}">
+                <a16:creationId xmlns:a16="http://schemas.microsoft.com/office/drawing/2014/main" id="{9C686510-B40D-4674-9E3B-087D7C6ED69A}"/>
+              </a:ext>
+            </a:extLst>
+          </p:cNvPr>
+          <p:cNvSpPr txBox="1"/>
+          <p:nvPr/>
+        </p:nvSpPr>
+        <p:spPr>
+          <a:xfrm>
+            <a:off x="3258080" y="3613457"/>
+            <a:ext cx="3956532" cy="2246769"/>
+          </a:xfrm>
+          <a:prstGeom prst="rect">
+            <a:avLst/>
+          </a:prstGeom>
+          <a:noFill/>
+        </p:spPr>
+        <p:txBody>
+          <a:bodyPr wrap="square" rtlCol="0">
+            <a:spAutoFit/>
+          </a:bodyPr>
+          <a:lstStyle/>
+          <a:p>
+            <a:r>
+              <a:rPr lang="en-US" sz="2800" dirty="0">
+                <a:latin typeface="Times New Roman" panose="02020603050405020304" pitchFamily="18" charset="0"/>
+                <a:cs typeface="Times New Roman" panose="02020603050405020304" pitchFamily="18" charset="0"/>
+              </a:rPr>
+              <a:t>for (</a:t>
+            </a:r>
+            <a:r>
+              <a:rPr lang="en-US" sz="2800" dirty="0" err="1">
+                <a:latin typeface="Times New Roman" panose="02020603050405020304" pitchFamily="18" charset="0"/>
+                <a:cs typeface="Times New Roman" panose="02020603050405020304" pitchFamily="18" charset="0"/>
+              </a:rPr>
+              <a:t>init</a:t>
+            </a:r>
+            <a:r>
+              <a:rPr lang="en-US" sz="2800" dirty="0">
+                <a:latin typeface="Times New Roman" panose="02020603050405020304" pitchFamily="18" charset="0"/>
+                <a:cs typeface="Times New Roman" panose="02020603050405020304" pitchFamily="18" charset="0"/>
+              </a:rPr>
+              <a:t>; expr; step) {</a:t>
+            </a:r>
+          </a:p>
+          <a:p>
+            <a:r>
+              <a:rPr lang="en-US" sz="2800" dirty="0">
+                <a:latin typeface="Times New Roman" panose="02020603050405020304" pitchFamily="18" charset="0"/>
+                <a:cs typeface="Times New Roman" panose="02020603050405020304" pitchFamily="18" charset="0"/>
+              </a:rPr>
+              <a:t>    if (</a:t>
+            </a:r>
+            <a:r>
+              <a:rPr lang="en-US" sz="2800" dirty="0" err="1">
+                <a:latin typeface="Times New Roman" panose="02020603050405020304" pitchFamily="18" charset="0"/>
+                <a:cs typeface="Times New Roman" panose="02020603050405020304" pitchFamily="18" charset="0"/>
+              </a:rPr>
+              <a:t>expr_to_continue</a:t>
+            </a:r>
+            <a:r>
+              <a:rPr lang="en-US" sz="2800" dirty="0">
+                <a:latin typeface="Times New Roman" panose="02020603050405020304" pitchFamily="18" charset="0"/>
+                <a:cs typeface="Times New Roman" panose="02020603050405020304" pitchFamily="18" charset="0"/>
+              </a:rPr>
+              <a:t>) {</a:t>
+            </a:r>
+          </a:p>
+          <a:p>
+            <a:r>
+              <a:rPr lang="en-US" sz="2800" dirty="0">
+                <a:latin typeface="Times New Roman" panose="02020603050405020304" pitchFamily="18" charset="0"/>
+                <a:cs typeface="Times New Roman" panose="02020603050405020304" pitchFamily="18" charset="0"/>
+              </a:rPr>
+              <a:t> 	continue;</a:t>
+            </a:r>
+          </a:p>
+          <a:p>
+            <a:r>
+              <a:rPr lang="en-US" sz="2800" dirty="0">
+                <a:latin typeface="Times New Roman" panose="02020603050405020304" pitchFamily="18" charset="0"/>
+                <a:cs typeface="Times New Roman" panose="02020603050405020304" pitchFamily="18" charset="0"/>
+              </a:rPr>
+              <a:t>    }</a:t>
+            </a:r>
+          </a:p>
+          <a:p>
+            <a:r>
+              <a:rPr lang="en-US" sz="2800" dirty="0">
+                <a:latin typeface="Times New Roman" panose="02020603050405020304" pitchFamily="18" charset="0"/>
+                <a:cs typeface="Times New Roman" panose="02020603050405020304" pitchFamily="18" charset="0"/>
+              </a:rPr>
+              <a:t>}</a:t>
+            </a:r>
+            <a:endParaRPr lang="ru-RU" sz="2800" dirty="0">
+              <a:latin typeface="Times New Roman" panose="02020603050405020304" pitchFamily="18" charset="0"/>
+              <a:cs typeface="Times New Roman" panose="02020603050405020304" pitchFamily="18" charset="0"/>
+            </a:endParaRPr>
+          </a:p>
+        </p:txBody>
+      </p:sp>
+      <p:cxnSp>
+        <p:nvCxnSpPr>
+          <p:cNvPr id="27" name="Прямая со стрелкой 39">
+            <a:extLst>
+              <a:ext uri="{FF2B5EF4-FFF2-40B4-BE49-F238E27FC236}">
+                <a16:creationId xmlns:a16="http://schemas.microsoft.com/office/drawing/2014/main" id="{4F779D52-15B7-4CE5-9A9D-405FE9BE96CA}"/>
+              </a:ext>
+            </a:extLst>
+          </p:cNvPr>
+          <p:cNvCxnSpPr>
+            <a:cxnSpLocks/>
+            <a:stCxn id="26" idx="1"/>
+            <a:endCxn id="26" idx="0"/>
+          </p:cNvCxnSpPr>
+          <p:nvPr/>
+        </p:nvCxnSpPr>
+        <p:spPr>
+          <a:xfrm rot="10800000" flipH="1">
+            <a:off x="3258080" y="3613458"/>
+            <a:ext cx="1978266" cy="1123385"/>
+          </a:xfrm>
+          <a:prstGeom prst="bentConnector4">
+            <a:avLst>
+              <a:gd name="adj1" fmla="val -11556"/>
+              <a:gd name="adj2" fmla="val 120349"/>
+            </a:avLst>
+          </a:prstGeom>
+          <a:ln w="38100">
+            <a:tailEnd type="triangle"/>
+          </a:ln>
+        </p:spPr>
+        <p:style>
+          <a:lnRef idx="2">
+            <a:schemeClr val="accent6"/>
+          </a:lnRef>
+          <a:fillRef idx="0">
+            <a:schemeClr val="accent6"/>
+          </a:fillRef>
+          <a:effectRef idx="1">
+            <a:schemeClr val="accent6"/>
+          </a:effectRef>
+          <a:fontRef idx="minor">
+            <a:schemeClr val="tx1"/>
+          </a:fontRef>
+        </p:style>
+      </p:cxnSp>
+      <p:cxnSp>
+        <p:nvCxnSpPr>
+          <p:cNvPr id="40" name="Прямая со стрелкой 39">
+            <a:extLst>
+              <a:ext uri="{FF2B5EF4-FFF2-40B4-BE49-F238E27FC236}">
+                <a16:creationId xmlns:a16="http://schemas.microsoft.com/office/drawing/2014/main" id="{D2C0AC43-BAA1-44CE-BB6F-55D83BE0B33F}"/>
+              </a:ext>
+            </a:extLst>
+          </p:cNvPr>
+          <p:cNvCxnSpPr>
+            <a:cxnSpLocks/>
+            <a:stCxn id="2" idx="1"/>
+          </p:cNvCxnSpPr>
+          <p:nvPr/>
+        </p:nvCxnSpPr>
+        <p:spPr>
+          <a:xfrm rot="10800000" flipH="1">
+            <a:off x="2074590" y="1608083"/>
+            <a:ext cx="69520" cy="816330"/>
+          </a:xfrm>
+          <a:prstGeom prst="bentConnector4">
+            <a:avLst>
+              <a:gd name="adj1" fmla="val -328826"/>
+              <a:gd name="adj2" fmla="val 99352"/>
+            </a:avLst>
+          </a:prstGeom>
+          <a:ln w="38100">
+            <a:tailEnd type="triangle"/>
+          </a:ln>
+        </p:spPr>
+        <p:style>
+          <a:lnRef idx="2">
+            <a:schemeClr val="accent6"/>
+          </a:lnRef>
+          <a:fillRef idx="0">
+            <a:schemeClr val="accent6"/>
+          </a:fillRef>
+          <a:effectRef idx="1">
+            <a:schemeClr val="accent6"/>
+          </a:effectRef>
+          <a:fontRef idx="minor">
+            <a:schemeClr val="tx1"/>
+          </a:fontRef>
+        </p:style>
+      </p:cxnSp>
+    </p:spTree>
+    <p:extLst>
+      <p:ext uri="{BB962C8B-B14F-4D97-AF65-F5344CB8AC3E}">
+        <p14:creationId xmlns:p14="http://schemas.microsoft.com/office/powerpoint/2010/main" val="4149975229"/>
       </p:ext>
     </p:extLst>
   </p:cSld>

</xml_diff>